<commit_message>
Update Bayesian Modeling lecture
</commit_message>
<xml_diff>
--- a/Bayesian_Modeling_Lecture/Adv_Data_Analysis_Bayesian_Modeling.pptx
+++ b/Bayesian_Modeling_Lecture/Adv_Data_Analysis_Bayesian_Modeling.pptx
@@ -5,7 +5,7 @@
     <p:sldMasterId id="2147483712" r:id="rId1"/>
   </p:sldMasterIdLst>
   <p:notesMasterIdLst>
-    <p:notesMasterId r:id="rId22"/>
+    <p:notesMasterId r:id="rId30"/>
   </p:notesMasterIdLst>
   <p:sldIdLst>
     <p:sldId id="256" r:id="rId2"/>
@@ -17,17 +17,25 @@
     <p:sldId id="261" r:id="rId8"/>
     <p:sldId id="264" r:id="rId9"/>
     <p:sldId id="277" r:id="rId10"/>
-    <p:sldId id="266" r:id="rId11"/>
-    <p:sldId id="267" r:id="rId12"/>
-    <p:sldId id="268" r:id="rId13"/>
-    <p:sldId id="269" r:id="rId14"/>
-    <p:sldId id="270" r:id="rId15"/>
-    <p:sldId id="271" r:id="rId16"/>
-    <p:sldId id="265" r:id="rId17"/>
-    <p:sldId id="272" r:id="rId18"/>
-    <p:sldId id="273" r:id="rId19"/>
-    <p:sldId id="274" r:id="rId20"/>
-    <p:sldId id="275" r:id="rId21"/>
+    <p:sldId id="285" r:id="rId11"/>
+    <p:sldId id="266" r:id="rId12"/>
+    <p:sldId id="267" r:id="rId13"/>
+    <p:sldId id="278" r:id="rId14"/>
+    <p:sldId id="268" r:id="rId15"/>
+    <p:sldId id="269" r:id="rId16"/>
+    <p:sldId id="270" r:id="rId17"/>
+    <p:sldId id="271" r:id="rId18"/>
+    <p:sldId id="279" r:id="rId19"/>
+    <p:sldId id="283" r:id="rId20"/>
+    <p:sldId id="284" r:id="rId21"/>
+    <p:sldId id="282" r:id="rId22"/>
+    <p:sldId id="286" r:id="rId23"/>
+    <p:sldId id="265" r:id="rId24"/>
+    <p:sldId id="272" r:id="rId25"/>
+    <p:sldId id="273" r:id="rId26"/>
+    <p:sldId id="287" r:id="rId27"/>
+    <p:sldId id="274" r:id="rId28"/>
+    <p:sldId id="275" r:id="rId29"/>
   </p:sldIdLst>
   <p:sldSz cx="12192000" cy="6858000"/>
   <p:notesSz cx="6858000" cy="9144000"/>
@@ -227,7 +235,7 @@
           <a:p>
             <a:fld id="{10D9A30E-5D9F-4D60-9956-127E77FCC0DB}" type="datetimeFigureOut">
               <a:rPr lang="en-US" smtClean="0"/>
-              <a:t>4/14/2021</a:t>
+              <a:t>8/17/2022</a:t>
             </a:fld>
             <a:endParaRPr lang="en-US"/>
           </a:p>
@@ -631,16 +639,7 @@
           <a:bodyPr/>
           <a:lstStyle/>
           <a:p>
-            <a:r>
-              <a:rPr lang="en-US" dirty="0"/>
-              <a:t>In theory, we could add a prior over the exponential lambda parameter too…hyperprior</a:t>
-            </a:r>
-          </a:p>
-          <a:p>
-            <a:r>
-              <a:rPr lang="en-US" dirty="0"/>
-              <a:t>But we don’t need to</a:t>
-            </a:r>
+            <a:endParaRPr lang="en-US" dirty="0"/>
           </a:p>
         </p:txBody>
       </p:sp>
@@ -661,7 +660,7 @@
           <a:p>
             <a:fld id="{6C6651D9-4C53-49B2-A8BF-8107848A4D5F}" type="slidenum">
               <a:rPr lang="en-US" smtClean="0"/>
-              <a:t>19</a:t>
+              <a:t>24</a:t>
             </a:fld>
             <a:endParaRPr lang="en-US"/>
           </a:p>
@@ -670,7 +669,7 @@
     </p:spTree>
     <p:extLst>
       <p:ext uri="{BB962C8B-B14F-4D97-AF65-F5344CB8AC3E}">
-        <p14:creationId xmlns:p14="http://schemas.microsoft.com/office/powerpoint/2010/main" val="3519957345"/>
+        <p14:creationId xmlns:p14="http://schemas.microsoft.com/office/powerpoint/2010/main" val="61985911"/>
       </p:ext>
     </p:extLst>
   </p:cSld>
@@ -726,19 +725,14 @@
           <a:p>
             <a:r>
               <a:rPr lang="en-US" dirty="0"/>
-              <a:t>Timeseries…need to account for monotony of time. Can’t treat as spatial random variable</a:t>
+              <a:t>In theory, we could add a prior over the exponential lambda parameter too…hyperprior</a:t>
             </a:r>
           </a:p>
           <a:p>
             <a:r>
               <a:rPr lang="en-US" dirty="0"/>
-              <a:t>Use </a:t>
-            </a:r>
-            <a:r>
-              <a:rPr lang="en-US"/>
-              <a:t>switch statement</a:t>
-            </a:r>
-            <a:endParaRPr lang="en-US" dirty="0"/>
+              <a:t>But we don’t need to</a:t>
+            </a:r>
           </a:p>
         </p:txBody>
       </p:sp>
@@ -759,7 +753,105 @@
           <a:p>
             <a:fld id="{6C6651D9-4C53-49B2-A8BF-8107848A4D5F}" type="slidenum">
               <a:rPr lang="en-US" smtClean="0"/>
-              <a:t>20</a:t>
+              <a:t>27</a:t>
+            </a:fld>
+            <a:endParaRPr lang="en-US"/>
+          </a:p>
+        </p:txBody>
+      </p:sp>
+    </p:spTree>
+    <p:extLst>
+      <p:ext uri="{BB962C8B-B14F-4D97-AF65-F5344CB8AC3E}">
+        <p14:creationId xmlns:p14="http://schemas.microsoft.com/office/powerpoint/2010/main" val="3519957345"/>
+      </p:ext>
+    </p:extLst>
+  </p:cSld>
+  <p:clrMapOvr>
+    <a:masterClrMapping/>
+  </p:clrMapOvr>
+</p:notes>
+</file>
+
+<file path=ppt/notesSlides/notesSlide12.xml><?xml version="1.0" encoding="utf-8"?>
+<p:notes xmlns:a="http://schemas.openxmlformats.org/drawingml/2006/main" xmlns:r="http://schemas.openxmlformats.org/officeDocument/2006/relationships" xmlns:p="http://schemas.openxmlformats.org/presentationml/2006/main">
+  <p:cSld>
+    <p:spTree>
+      <p:nvGrpSpPr>
+        <p:cNvPr id="1" name=""/>
+        <p:cNvGrpSpPr/>
+        <p:nvPr/>
+      </p:nvGrpSpPr>
+      <p:grpSpPr>
+        <a:xfrm>
+          <a:off x="0" y="0"/>
+          <a:ext cx="0" cy="0"/>
+          <a:chOff x="0" y="0"/>
+          <a:chExt cx="0" cy="0"/>
+        </a:xfrm>
+      </p:grpSpPr>
+      <p:sp>
+        <p:nvSpPr>
+          <p:cNvPr id="2" name="Slide Image Placeholder 1"/>
+          <p:cNvSpPr>
+            <a:spLocks noGrp="1" noRot="1" noChangeAspect="1"/>
+          </p:cNvSpPr>
+          <p:nvPr>
+            <p:ph type="sldImg"/>
+          </p:nvPr>
+        </p:nvSpPr>
+        <p:spPr/>
+      </p:sp>
+      <p:sp>
+        <p:nvSpPr>
+          <p:cNvPr id="3" name="Notes Placeholder 2"/>
+          <p:cNvSpPr>
+            <a:spLocks noGrp="1"/>
+          </p:cNvSpPr>
+          <p:nvPr>
+            <p:ph type="body" idx="1"/>
+          </p:nvPr>
+        </p:nvSpPr>
+        <p:spPr/>
+        <p:txBody>
+          <a:bodyPr/>
+          <a:lstStyle/>
+          <a:p>
+            <a:r>
+              <a:rPr lang="en-US" dirty="0"/>
+              <a:t>Timeseries…need to account for monotony of time. Can’t treat as spatial random variable</a:t>
+            </a:r>
+          </a:p>
+          <a:p>
+            <a:r>
+              <a:rPr lang="en-US" dirty="0"/>
+              <a:t>Use </a:t>
+            </a:r>
+            <a:r>
+              <a:rPr lang="en-US"/>
+              <a:t>switch statement</a:t>
+            </a:r>
+            <a:endParaRPr lang="en-US" dirty="0"/>
+          </a:p>
+        </p:txBody>
+      </p:sp>
+      <p:sp>
+        <p:nvSpPr>
+          <p:cNvPr id="4" name="Slide Number Placeholder 3"/>
+          <p:cNvSpPr>
+            <a:spLocks noGrp="1"/>
+          </p:cNvSpPr>
+          <p:nvPr>
+            <p:ph type="sldNum" sz="quarter" idx="5"/>
+          </p:nvPr>
+        </p:nvSpPr>
+        <p:spPr/>
+        <p:txBody>
+          <a:bodyPr/>
+          <a:lstStyle/>
+          <a:p>
+            <a:fld id="{6C6651D9-4C53-49B2-A8BF-8107848A4D5F}" type="slidenum">
+              <a:rPr lang="en-US" smtClean="0"/>
+              <a:t>28</a:t>
             </a:fld>
             <a:endParaRPr lang="en-US"/>
           </a:p>
@@ -1026,7 +1118,7 @@
           <a:p>
             <a:fld id="{6C6651D9-4C53-49B2-A8BF-8107848A4D5F}" type="slidenum">
               <a:rPr lang="en-US" smtClean="0"/>
-              <a:t>10</a:t>
+              <a:t>11</a:t>
             </a:fld>
             <a:endParaRPr lang="en-US"/>
           </a:p>
@@ -1117,7 +1209,7 @@
           <a:p>
             <a:fld id="{6C6651D9-4C53-49B2-A8BF-8107848A4D5F}" type="slidenum">
               <a:rPr lang="en-US" smtClean="0"/>
-              <a:t>11</a:t>
+              <a:t>12</a:t>
             </a:fld>
             <a:endParaRPr lang="en-US"/>
           </a:p>
@@ -1231,7 +1323,7 @@
           <a:p>
             <a:fld id="{6C6651D9-4C53-49B2-A8BF-8107848A4D5F}" type="slidenum">
               <a:rPr lang="en-US" smtClean="0"/>
-              <a:t>12</a:t>
+              <a:t>14</a:t>
             </a:fld>
             <a:endParaRPr lang="en-US"/>
           </a:p>
@@ -1324,7 +1416,7 @@
           <a:p>
             <a:fld id="{6C6651D9-4C53-49B2-A8BF-8107848A4D5F}" type="slidenum">
               <a:rPr lang="en-US" smtClean="0"/>
-              <a:t>13</a:t>
+              <a:t>15</a:t>
             </a:fld>
             <a:endParaRPr lang="en-US"/>
           </a:p>
@@ -1387,22 +1479,7 @@
           <a:bodyPr/>
           <a:lstStyle/>
           <a:p>
-            <a:r>
-              <a:rPr lang="en-US" dirty="0"/>
-              <a:t>If your model breaks, try a different distribution</a:t>
-            </a:r>
-          </a:p>
-          <a:p>
-            <a:r>
-              <a:rPr lang="en-US" dirty="0"/>
-              <a:t>As long as the support of your distribution, and the chain of values in and out of distributions works…things will work…even if not optimally</a:t>
-            </a:r>
-          </a:p>
-          <a:p>
-            <a:r>
-              <a:rPr lang="en-US" dirty="0"/>
-              <a:t>Once I have m and b, I can find the regression line…from there, I have to model the noisy data with a gaussian</a:t>
-            </a:r>
+            <a:endParaRPr lang="en-US" dirty="0"/>
           </a:p>
         </p:txBody>
       </p:sp>
@@ -1423,7 +1500,7 @@
           <a:p>
             <a:fld id="{6C6651D9-4C53-49B2-A8BF-8107848A4D5F}" type="slidenum">
               <a:rPr lang="en-US" smtClean="0"/>
-              <a:t>16</a:t>
+              <a:t>19</a:t>
             </a:fld>
             <a:endParaRPr lang="en-US"/>
           </a:p>
@@ -1432,7 +1509,7 @@
     </p:spTree>
     <p:extLst>
       <p:ext uri="{BB962C8B-B14F-4D97-AF65-F5344CB8AC3E}">
-        <p14:creationId xmlns:p14="http://schemas.microsoft.com/office/powerpoint/2010/main" val="2098423405"/>
+        <p14:creationId xmlns:p14="http://schemas.microsoft.com/office/powerpoint/2010/main" val="1004462220"/>
       </p:ext>
     </p:extLst>
   </p:cSld>
@@ -1486,7 +1563,22 @@
           <a:bodyPr/>
           <a:lstStyle/>
           <a:p>
-            <a:endParaRPr lang="en-US" dirty="0"/>
+            <a:r>
+              <a:rPr lang="en-US" dirty="0"/>
+              <a:t>If your model breaks, try a different distribution</a:t>
+            </a:r>
+          </a:p>
+          <a:p>
+            <a:r>
+              <a:rPr lang="en-US" dirty="0"/>
+              <a:t>As long as the support of your distribution, and the chain of values in and out of distributions works…things will work…even if not optimally</a:t>
+            </a:r>
+          </a:p>
+          <a:p>
+            <a:r>
+              <a:rPr lang="en-US" dirty="0"/>
+              <a:t>Once I have m and b, I can find the regression line…from there, I have to model the noisy data with a gaussian</a:t>
+            </a:r>
           </a:p>
         </p:txBody>
       </p:sp>
@@ -1507,7 +1599,7 @@
           <a:p>
             <a:fld id="{6C6651D9-4C53-49B2-A8BF-8107848A4D5F}" type="slidenum">
               <a:rPr lang="en-US" smtClean="0"/>
-              <a:t>17</a:t>
+              <a:t>23</a:t>
             </a:fld>
             <a:endParaRPr lang="en-US"/>
           </a:p>
@@ -1516,7 +1608,7 @@
     </p:spTree>
     <p:extLst>
       <p:ext uri="{BB962C8B-B14F-4D97-AF65-F5344CB8AC3E}">
-        <p14:creationId xmlns:p14="http://schemas.microsoft.com/office/powerpoint/2010/main" val="61985911"/>
+        <p14:creationId xmlns:p14="http://schemas.microsoft.com/office/powerpoint/2010/main" val="2098423405"/>
       </p:ext>
     </p:extLst>
   </p:cSld>
@@ -1752,7 +1844,7 @@
           <a:p>
             <a:fld id="{9184DA70-C731-4C70-880D-CCD4705E623C}" type="datetime1">
               <a:rPr lang="en-US" smtClean="0"/>
-              <a:t>4/14/2021</a:t>
+              <a:t>8/17/2022</a:t>
             </a:fld>
             <a:endParaRPr lang="en-US" dirty="0"/>
           </a:p>
@@ -1960,7 +2052,7 @@
           <a:p>
             <a:fld id="{B612A279-0833-481D-8C56-F67FD0AC6C50}" type="datetime1">
               <a:rPr lang="en-US" smtClean="0"/>
-              <a:t>4/14/2021</a:t>
+              <a:t>8/17/2022</a:t>
             </a:fld>
             <a:endParaRPr lang="en-US" dirty="0"/>
           </a:p>
@@ -2216,7 +2308,7 @@
           <a:p>
             <a:fld id="{6587DA83-5663-4C9C-B9AA-0B40A3DAFF81}" type="datetime1">
               <a:rPr lang="en-US" smtClean="0"/>
-              <a:t>4/14/2021</a:t>
+              <a:t>8/17/2022</a:t>
             </a:fld>
             <a:endParaRPr lang="en-US" dirty="0"/>
           </a:p>
@@ -2390,7 +2482,7 @@
           <a:p>
             <a:fld id="{4BE1D723-8F53-4F53-90B0-1982A396982E}" type="datetime1">
               <a:rPr lang="en-US" smtClean="0"/>
-              <a:t>4/14/2021</a:t>
+              <a:t>8/17/2022</a:t>
             </a:fld>
             <a:endParaRPr lang="en-US" dirty="0"/>
           </a:p>
@@ -2733,7 +2825,7 @@
           <a:p>
             <a:fld id="{97669AF7-7BEB-44E4-9852-375E34362B5B}" type="datetime1">
               <a:rPr lang="en-US" smtClean="0"/>
-              <a:t>4/14/2021</a:t>
+              <a:t>8/17/2022</a:t>
             </a:fld>
             <a:endParaRPr lang="en-US" dirty="0"/>
           </a:p>
@@ -3008,7 +3100,7 @@
           <a:p>
             <a:fld id="{BAAAC38D-0552-4C82-B593-E6124DFADBE2}" type="datetime1">
               <a:rPr lang="en-US" smtClean="0"/>
-              <a:t>4/14/2021</a:t>
+              <a:t>8/17/2022</a:t>
             </a:fld>
             <a:endParaRPr lang="en-US" dirty="0"/>
           </a:p>
@@ -3387,7 +3479,7 @@
           <a:p>
             <a:fld id="{D9DF0F1C-5577-4ACB-BB62-DF8F3C494C7E}" type="datetime1">
               <a:rPr lang="en-US" smtClean="0"/>
-              <a:t>4/14/2021</a:t>
+              <a:t>8/17/2022</a:t>
             </a:fld>
             <a:endParaRPr lang="en-US" dirty="0"/>
           </a:p>
@@ -3505,7 +3597,7 @@
           <a:p>
             <a:fld id="{1775B394-D9F9-4F0C-B15D-605F45CB9E9F}" type="datetime1">
               <a:rPr lang="en-US" smtClean="0"/>
-              <a:t>4/14/2021</a:t>
+              <a:t>8/17/2022</a:t>
             </a:fld>
             <a:endParaRPr lang="en-US" dirty="0"/>
           </a:p>
@@ -3676,7 +3768,7 @@
           <a:p>
             <a:fld id="{39667345-2558-425A-8533-9BFDBCE15005}" type="datetime1">
               <a:rPr lang="en-US" smtClean="0"/>
-              <a:t>4/14/2021</a:t>
+              <a:t>8/17/2022</a:t>
             </a:fld>
             <a:endParaRPr lang="en-US" dirty="0"/>
           </a:p>
@@ -4030,7 +4122,7 @@
           <a:p>
             <a:fld id="{92BEA474-078D-4E9B-9B14-09A87B19DC46}" type="datetime1">
               <a:rPr lang="en-US" smtClean="0"/>
-              <a:t>4/14/2021</a:t>
+              <a:t>8/17/2022</a:t>
             </a:fld>
             <a:endParaRPr lang="en-US" dirty="0"/>
           </a:p>
@@ -4413,7 +4505,7 @@
           <a:p>
             <a:fld id="{4907D986-8816-4272-A432-0437A28A9828}" type="datetime1">
               <a:rPr lang="en-US" smtClean="0"/>
-              <a:t>4/14/2021</a:t>
+              <a:t>8/17/2022</a:t>
             </a:fld>
             <a:endParaRPr lang="en-US" dirty="0"/>
           </a:p>
@@ -4701,7 +4793,7 @@
           <a:p>
             <a:fld id="{62D6E202-B606-4609-B914-27C9371A1F6D}" type="datetime1">
               <a:rPr lang="en-US" smtClean="0"/>
-              <a:t>4/14/2021</a:t>
+              <a:t>8/17/2022</a:t>
             </a:fld>
             <a:endParaRPr lang="en-US" dirty="0"/>
           </a:p>
@@ -5425,6 +5517,90 @@
           <p:cNvPr id="2" name="Title 1">
             <a:extLst>
               <a:ext uri="{FF2B5EF4-FFF2-40B4-BE49-F238E27FC236}">
+                <a16:creationId xmlns:a16="http://schemas.microsoft.com/office/drawing/2014/main" id="{8062F36C-9617-A8F2-B0EB-4D2C893F2F89}"/>
+              </a:ext>
+            </a:extLst>
+          </p:cNvPr>
+          <p:cNvSpPr>
+            <a:spLocks noGrp="1"/>
+          </p:cNvSpPr>
+          <p:nvPr>
+            <p:ph type="title"/>
+          </p:nvPr>
+        </p:nvSpPr>
+        <p:spPr/>
+        <p:txBody>
+          <a:bodyPr/>
+          <a:lstStyle/>
+          <a:p>
+            <a:r>
+              <a:rPr lang="en-US" dirty="0"/>
+              <a:t>How do we use probabilistic programming</a:t>
+            </a:r>
+          </a:p>
+        </p:txBody>
+      </p:sp>
+      <p:sp>
+        <p:nvSpPr>
+          <p:cNvPr id="3" name="Content Placeholder 2">
+            <a:extLst>
+              <a:ext uri="{FF2B5EF4-FFF2-40B4-BE49-F238E27FC236}">
+                <a16:creationId xmlns:a16="http://schemas.microsoft.com/office/drawing/2014/main" id="{8AD79BCA-AA23-424E-2553-75AD100AE3A2}"/>
+              </a:ext>
+            </a:extLst>
+          </p:cNvPr>
+          <p:cNvSpPr>
+            <a:spLocks noGrp="1"/>
+          </p:cNvSpPr>
+          <p:nvPr>
+            <p:ph idx="1"/>
+          </p:nvPr>
+        </p:nvSpPr>
+        <p:spPr/>
+        <p:txBody>
+          <a:bodyPr/>
+          <a:lstStyle/>
+          <a:p>
+            <a:pPr lvl="1"/>
+            <a:endParaRPr lang="en-US" dirty="0"/>
+          </a:p>
+        </p:txBody>
+      </p:sp>
+    </p:spTree>
+    <p:extLst>
+      <p:ext uri="{BB962C8B-B14F-4D97-AF65-F5344CB8AC3E}">
+        <p14:creationId xmlns:p14="http://schemas.microsoft.com/office/powerpoint/2010/main" val="2216400404"/>
+      </p:ext>
+    </p:extLst>
+  </p:cSld>
+  <p:clrMapOvr>
+    <a:masterClrMapping/>
+  </p:clrMapOvr>
+</p:sld>
+</file>
+
+<file path=ppt/slides/slide11.xml><?xml version="1.0" encoding="utf-8"?>
+<p:sld xmlns:a="http://schemas.openxmlformats.org/drawingml/2006/main" xmlns:r="http://schemas.openxmlformats.org/officeDocument/2006/relationships" xmlns:p="http://schemas.openxmlformats.org/presentationml/2006/main">
+  <p:cSld>
+    <p:spTree>
+      <p:nvGrpSpPr>
+        <p:cNvPr id="1" name=""/>
+        <p:cNvGrpSpPr/>
+        <p:nvPr/>
+      </p:nvGrpSpPr>
+      <p:grpSpPr>
+        <a:xfrm>
+          <a:off x="0" y="0"/>
+          <a:ext cx="0" cy="0"/>
+          <a:chOff x="0" y="0"/>
+          <a:chExt cx="0" cy="0"/>
+        </a:xfrm>
+      </p:grpSpPr>
+      <p:sp>
+        <p:nvSpPr>
+          <p:cNvPr id="2" name="Title 1">
+            <a:extLst>
+              <a:ext uri="{FF2B5EF4-FFF2-40B4-BE49-F238E27FC236}">
                 <a16:creationId xmlns:a16="http://schemas.microsoft.com/office/drawing/2014/main" id="{78123AA1-7E29-43AA-82DA-FE789548F689}"/>
               </a:ext>
             </a:extLst>
@@ -5569,8 +5745,8 @@
         </p:nvSpPr>
         <p:spPr>
           <a:xfrm>
-            <a:off x="6541045" y="4852877"/>
-            <a:ext cx="3060390" cy="646331"/>
+            <a:off x="5265682" y="4852877"/>
+            <a:ext cx="6854847" cy="1477328"/>
           </a:xfrm>
           <a:prstGeom prst="rect">
             <a:avLst/>
@@ -5578,18 +5754,39 @@
           <a:noFill/>
         </p:spPr>
         <p:txBody>
-          <a:bodyPr wrap="none" rtlCol="0">
+          <a:bodyPr wrap="square" rtlCol="0">
             <a:spAutoFit/>
           </a:bodyPr>
           <a:lstStyle/>
           <a:p>
+            <a:pPr algn="just"/>
             <a:r>
               <a:rPr lang="en-US" b="1" u="sng" dirty="0"/>
               <a:t>Evidence for the data:</a:t>
             </a:r>
           </a:p>
           <a:p>
-            <a:pPr marL="285750" indent="-285750">
+            <a:pPr marL="285750" indent="-285750" algn="just">
+              <a:buFont typeface="Arial" panose="020B0604020202020204" pitchFamily="34" charset="0"/>
+              <a:buChar char="•"/>
+            </a:pPr>
+            <a:r>
+              <a:rPr lang="en-US" b="1" dirty="0"/>
+              <a:t>Probability for seeing current data</a:t>
+            </a:r>
+          </a:p>
+          <a:p>
+            <a:pPr marL="742950" lvl="1" indent="-285750" algn="just">
+              <a:buFont typeface="Arial" panose="020B0604020202020204" pitchFamily="34" charset="0"/>
+              <a:buChar char="•"/>
+            </a:pPr>
+            <a:r>
+              <a:rPr lang="en-US" b="1" dirty="0"/>
+              <a:t>E.g. if your patient has a cold, what is the probability of a person having a cold given that 10% of all people have colds</a:t>
+            </a:r>
+          </a:p>
+          <a:p>
+            <a:pPr marL="285750" indent="-285750" algn="just">
               <a:buFont typeface="Arial" panose="020B0604020202020204" pitchFamily="34" charset="0"/>
               <a:buChar char="•"/>
             </a:pPr>
@@ -6269,7 +6466,11 @@
                                           </p:stCondLst>
                                         </p:cTn>
                                         <p:tgtEl>
-                                          <p:spTgt spid="10"/>
+                                          <p:spTgt spid="8">
+                                            <p:txEl>
+                                              <p:pRg st="2" end="2"/>
+                                            </p:txEl>
+                                          </p:spTgt>
                                         </p:tgtEl>
                                         <p:attrNameLst>
                                           <p:attrName>style.visibility</p:attrName>
@@ -6283,7 +6484,11 @@
                                       <p:cBhvr>
                                         <p:cTn id="22" dur="500"/>
                                         <p:tgtEl>
-                                          <p:spTgt spid="10"/>
+                                          <p:spTgt spid="8">
+                                            <p:txEl>
+                                              <p:pRg st="2" end="2"/>
+                                            </p:txEl>
+                                          </p:spTgt>
                                         </p:tgtEl>
                                       </p:cBhvr>
                                     </p:animEffect>
@@ -6309,7 +6514,7 @@
                             </p:stCondLst>
                             <p:childTnLst>
                               <p:par>
-                                <p:cTn id="25" presetID="10" presetClass="entr" presetSubtype="0" fill="hold" grpId="0" nodeType="clickEffect">
+                                <p:cTn id="25" presetID="10" presetClass="entr" presetSubtype="0" fill="hold" nodeType="clickEffect">
                                   <p:stCondLst>
                                     <p:cond delay="0"/>
                                   </p:stCondLst>
@@ -6322,7 +6527,11 @@
                                           </p:stCondLst>
                                         </p:cTn>
                                         <p:tgtEl>
-                                          <p:spTgt spid="14"/>
+                                          <p:spTgt spid="8">
+                                            <p:txEl>
+                                              <p:pRg st="3" end="3"/>
+                                            </p:txEl>
+                                          </p:spTgt>
                                         </p:tgtEl>
                                         <p:attrNameLst>
                                           <p:attrName>style.visibility</p:attrName>
@@ -6336,7 +6545,11 @@
                                       <p:cBhvr>
                                         <p:cTn id="27" dur="500"/>
                                         <p:tgtEl>
-                                          <p:spTgt spid="14"/>
+                                          <p:spTgt spid="8">
+                                            <p:txEl>
+                                              <p:pRg st="3" end="3"/>
+                                            </p:txEl>
+                                          </p:spTgt>
                                         </p:tgtEl>
                                       </p:cBhvr>
                                     </p:animEffect>
@@ -6375,11 +6588,7 @@
                                           </p:stCondLst>
                                         </p:cTn>
                                         <p:tgtEl>
-                                          <p:spTgt spid="15">
-                                            <p:txEl>
-                                              <p:pRg st="0" end="0"/>
-                                            </p:txEl>
-                                          </p:spTgt>
+                                          <p:spTgt spid="10"/>
                                         </p:tgtEl>
                                         <p:attrNameLst>
                                           <p:attrName>style.visibility</p:attrName>
@@ -6393,11 +6602,7 @@
                                       <p:cBhvr>
                                         <p:cTn id="32" dur="500"/>
                                         <p:tgtEl>
-                                          <p:spTgt spid="15">
-                                            <p:txEl>
-                                              <p:pRg st="0" end="0"/>
-                                            </p:txEl>
-                                          </p:spTgt>
+                                          <p:spTgt spid="10"/>
                                         </p:tgtEl>
                                       </p:cBhvr>
                                     </p:animEffect>
@@ -6423,7 +6628,7 @@
                             </p:stCondLst>
                             <p:childTnLst>
                               <p:par>
-                                <p:cTn id="35" presetID="10" presetClass="entr" presetSubtype="0" fill="hold" nodeType="clickEffect">
+                                <p:cTn id="35" presetID="10" presetClass="entr" presetSubtype="0" fill="hold" grpId="0" nodeType="clickEffect">
                                   <p:stCondLst>
                                     <p:cond delay="0"/>
                                   </p:stCondLst>
@@ -6436,11 +6641,7 @@
                                           </p:stCondLst>
                                         </p:cTn>
                                         <p:tgtEl>
-                                          <p:spTgt spid="15">
-                                            <p:txEl>
-                                              <p:pRg st="1" end="1"/>
-                                            </p:txEl>
-                                          </p:spTgt>
+                                          <p:spTgt spid="14"/>
                                         </p:tgtEl>
                                         <p:attrNameLst>
                                           <p:attrName>style.visibility</p:attrName>
@@ -6454,11 +6655,7 @@
                                       <p:cBhvr>
                                         <p:cTn id="37" dur="500"/>
                                         <p:tgtEl>
-                                          <p:spTgt spid="15">
-                                            <p:txEl>
-                                              <p:pRg st="1" end="1"/>
-                                            </p:txEl>
-                                          </p:spTgt>
+                                          <p:spTgt spid="14"/>
                                         </p:tgtEl>
                                       </p:cBhvr>
                                     </p:animEffect>
@@ -6499,7 +6696,7 @@
                                         <p:tgtEl>
                                           <p:spTgt spid="15">
                                             <p:txEl>
-                                              <p:pRg st="2" end="2"/>
+                                              <p:pRg st="0" end="0"/>
                                             </p:txEl>
                                           </p:spTgt>
                                         </p:tgtEl>
@@ -6517,7 +6714,7 @@
                                         <p:tgtEl>
                                           <p:spTgt spid="15">
                                             <p:txEl>
-                                              <p:pRg st="2" end="2"/>
+                                              <p:pRg st="0" end="0"/>
                                             </p:txEl>
                                           </p:spTgt>
                                         </p:tgtEl>
@@ -6560,7 +6757,7 @@
                                         <p:tgtEl>
                                           <p:spTgt spid="15">
                                             <p:txEl>
-                                              <p:pRg st="3" end="3"/>
+                                              <p:pRg st="1" end="1"/>
                                             </p:txEl>
                                           </p:spTgt>
                                         </p:tgtEl>
@@ -6578,7 +6775,7 @@
                                         <p:tgtEl>
                                           <p:spTgt spid="15">
                                             <p:txEl>
-                                              <p:pRg st="3" end="3"/>
+                                              <p:pRg st="1" end="1"/>
                                             </p:txEl>
                                           </p:spTgt>
                                         </p:tgtEl>
@@ -6621,7 +6818,7 @@
                                         <p:tgtEl>
                                           <p:spTgt spid="15">
                                             <p:txEl>
-                                              <p:pRg st="4" end="4"/>
+                                              <p:pRg st="2" end="2"/>
                                             </p:txEl>
                                           </p:spTgt>
                                         </p:tgtEl>
@@ -6639,7 +6836,7 @@
                                         <p:tgtEl>
                                           <p:spTgt spid="15">
                                             <p:txEl>
-                                              <p:pRg st="4" end="4"/>
+                                              <p:pRg st="2" end="2"/>
                                             </p:txEl>
                                           </p:spTgt>
                                         </p:tgtEl>
@@ -6667,7 +6864,7 @@
                             </p:stCondLst>
                             <p:childTnLst>
                               <p:par>
-                                <p:cTn id="55" presetID="10" presetClass="entr" presetSubtype="0" fill="hold" grpId="0" nodeType="clickEffect">
+                                <p:cTn id="55" presetID="10" presetClass="entr" presetSubtype="0" fill="hold" nodeType="clickEffect">
                                   <p:stCondLst>
                                     <p:cond delay="0"/>
                                   </p:stCondLst>
@@ -6680,7 +6877,11 @@
                                           </p:stCondLst>
                                         </p:cTn>
                                         <p:tgtEl>
-                                          <p:spTgt spid="16"/>
+                                          <p:spTgt spid="15">
+                                            <p:txEl>
+                                              <p:pRg st="3" end="3"/>
+                                            </p:txEl>
+                                          </p:spTgt>
                                         </p:tgtEl>
                                         <p:attrNameLst>
                                           <p:attrName>style.visibility</p:attrName>
@@ -6694,7 +6895,11 @@
                                       <p:cBhvr>
                                         <p:cTn id="57" dur="500"/>
                                         <p:tgtEl>
-                                          <p:spTgt spid="16"/>
+                                          <p:spTgt spid="15">
+                                            <p:txEl>
+                                              <p:pRg st="3" end="3"/>
+                                            </p:txEl>
+                                          </p:spTgt>
                                         </p:tgtEl>
                                       </p:cBhvr>
                                     </p:animEffect>
@@ -6733,9 +6938,9 @@
                                           </p:stCondLst>
                                         </p:cTn>
                                         <p:tgtEl>
-                                          <p:spTgt spid="17">
+                                          <p:spTgt spid="15">
                                             <p:txEl>
-                                              <p:pRg st="0" end="0"/>
+                                              <p:pRg st="4" end="4"/>
                                             </p:txEl>
                                           </p:spTgt>
                                         </p:tgtEl>
@@ -6751,9 +6956,9 @@
                                       <p:cBhvr>
                                         <p:cTn id="62" dur="500"/>
                                         <p:tgtEl>
-                                          <p:spTgt spid="17">
+                                          <p:spTgt spid="15">
                                             <p:txEl>
-                                              <p:pRg st="0" end="0"/>
+                                              <p:pRg st="4" end="4"/>
                                             </p:txEl>
                                           </p:spTgt>
                                         </p:tgtEl>
@@ -6781,7 +6986,7 @@
                             </p:stCondLst>
                             <p:childTnLst>
                               <p:par>
-                                <p:cTn id="65" presetID="10" presetClass="entr" presetSubtype="0" fill="hold" nodeType="clickEffect">
+                                <p:cTn id="65" presetID="10" presetClass="entr" presetSubtype="0" fill="hold" grpId="0" nodeType="clickEffect">
                                   <p:stCondLst>
                                     <p:cond delay="0"/>
                                   </p:stCondLst>
@@ -6794,11 +6999,7 @@
                                           </p:stCondLst>
                                         </p:cTn>
                                         <p:tgtEl>
-                                          <p:spTgt spid="17">
-                                            <p:txEl>
-                                              <p:pRg st="1" end="1"/>
-                                            </p:txEl>
-                                          </p:spTgt>
+                                          <p:spTgt spid="16"/>
                                         </p:tgtEl>
                                         <p:attrNameLst>
                                           <p:attrName>style.visibility</p:attrName>
@@ -6812,11 +7013,7 @@
                                       <p:cBhvr>
                                         <p:cTn id="67" dur="500"/>
                                         <p:tgtEl>
-                                          <p:spTgt spid="17">
-                                            <p:txEl>
-                                              <p:pRg st="1" end="1"/>
-                                            </p:txEl>
-                                          </p:spTgt>
+                                          <p:spTgt spid="16"/>
                                         </p:tgtEl>
                                       </p:cBhvr>
                                     </p:animEffect>
@@ -6857,7 +7054,7 @@
                                         <p:tgtEl>
                                           <p:spTgt spid="17">
                                             <p:txEl>
-                                              <p:pRg st="2" end="2"/>
+                                              <p:pRg st="0" end="0"/>
                                             </p:txEl>
                                           </p:spTgt>
                                         </p:tgtEl>
@@ -6875,7 +7072,7 @@
                                         <p:tgtEl>
                                           <p:spTgt spid="17">
                                             <p:txEl>
-                                              <p:pRg st="2" end="2"/>
+                                              <p:pRg st="0" end="0"/>
                                             </p:txEl>
                                           </p:spTgt>
                                         </p:tgtEl>
@@ -6903,7 +7100,7 @@
                             </p:stCondLst>
                             <p:childTnLst>
                               <p:par>
-                                <p:cTn id="75" presetID="10" presetClass="entr" presetSubtype="0" fill="hold" grpId="0" nodeType="clickEffect">
+                                <p:cTn id="75" presetID="10" presetClass="entr" presetSubtype="0" fill="hold" nodeType="clickEffect">
                                   <p:stCondLst>
                                     <p:cond delay="0"/>
                                   </p:stCondLst>
@@ -6916,7 +7113,11 @@
                                           </p:stCondLst>
                                         </p:cTn>
                                         <p:tgtEl>
-                                          <p:spTgt spid="18"/>
+                                          <p:spTgt spid="17">
+                                            <p:txEl>
+                                              <p:pRg st="1" end="1"/>
+                                            </p:txEl>
+                                          </p:spTgt>
                                         </p:tgtEl>
                                         <p:attrNameLst>
                                           <p:attrName>style.visibility</p:attrName>
@@ -6930,7 +7131,11 @@
                                       <p:cBhvr>
                                         <p:cTn id="77" dur="500"/>
                                         <p:tgtEl>
-                                          <p:spTgt spid="18"/>
+                                          <p:spTgt spid="17">
+                                            <p:txEl>
+                                              <p:pRg st="1" end="1"/>
+                                            </p:txEl>
+                                          </p:spTgt>
                                         </p:tgtEl>
                                       </p:cBhvr>
                                     </p:animEffect>
@@ -6956,7 +7161,7 @@
                             </p:stCondLst>
                             <p:childTnLst>
                               <p:par>
-                                <p:cTn id="80" presetID="10" presetClass="entr" presetSubtype="0" fill="hold" grpId="0" nodeType="clickEffect">
+                                <p:cTn id="80" presetID="10" presetClass="entr" presetSubtype="0" fill="hold" nodeType="clickEffect">
                                   <p:stCondLst>
                                     <p:cond delay="0"/>
                                   </p:stCondLst>
@@ -6969,7 +7174,11 @@
                                           </p:stCondLst>
                                         </p:cTn>
                                         <p:tgtEl>
-                                          <p:spTgt spid="12"/>
+                                          <p:spTgt spid="17">
+                                            <p:txEl>
+                                              <p:pRg st="2" end="2"/>
+                                            </p:txEl>
+                                          </p:spTgt>
                                         </p:tgtEl>
                                         <p:attrNameLst>
                                           <p:attrName>style.visibility</p:attrName>
@@ -6983,7 +7192,11 @@
                                       <p:cBhvr>
                                         <p:cTn id="82" dur="500"/>
                                         <p:tgtEl>
-                                          <p:spTgt spid="12"/>
+                                          <p:spTgt spid="17">
+                                            <p:txEl>
+                                              <p:pRg st="2" end="2"/>
+                                            </p:txEl>
+                                          </p:spTgt>
                                         </p:tgtEl>
                                       </p:cBhvr>
                                     </p:animEffect>
@@ -7009,7 +7222,7 @@
                             </p:stCondLst>
                             <p:childTnLst>
                               <p:par>
-                                <p:cTn id="85" presetID="10" presetClass="entr" presetSubtype="0" fill="hold" nodeType="clickEffect">
+                                <p:cTn id="85" presetID="10" presetClass="entr" presetSubtype="0" fill="hold" grpId="0" nodeType="clickEffect">
                                   <p:stCondLst>
                                     <p:cond delay="0"/>
                                   </p:stCondLst>
@@ -7022,11 +7235,7 @@
                                           </p:stCondLst>
                                         </p:cTn>
                                         <p:tgtEl>
-                                          <p:spTgt spid="19">
-                                            <p:txEl>
-                                              <p:pRg st="0" end="0"/>
-                                            </p:txEl>
-                                          </p:spTgt>
+                                          <p:spTgt spid="18"/>
                                         </p:tgtEl>
                                         <p:attrNameLst>
                                           <p:attrName>style.visibility</p:attrName>
@@ -7040,11 +7249,7 @@
                                       <p:cBhvr>
                                         <p:cTn id="87" dur="500"/>
                                         <p:tgtEl>
-                                          <p:spTgt spid="19">
-                                            <p:txEl>
-                                              <p:pRg st="0" end="0"/>
-                                            </p:txEl>
-                                          </p:spTgt>
+                                          <p:spTgt spid="18"/>
                                         </p:tgtEl>
                                       </p:cBhvr>
                                     </p:animEffect>
@@ -7070,7 +7275,7 @@
                             </p:stCondLst>
                             <p:childTnLst>
                               <p:par>
-                                <p:cTn id="90" presetID="10" presetClass="entr" presetSubtype="0" fill="hold" nodeType="clickEffect">
+                                <p:cTn id="90" presetID="10" presetClass="entr" presetSubtype="0" fill="hold" grpId="0" nodeType="clickEffect">
                                   <p:stCondLst>
                                     <p:cond delay="0"/>
                                   </p:stCondLst>
@@ -7083,11 +7288,7 @@
                                           </p:stCondLst>
                                         </p:cTn>
                                         <p:tgtEl>
-                                          <p:spTgt spid="19">
-                                            <p:txEl>
-                                              <p:pRg st="1" end="1"/>
-                                            </p:txEl>
-                                          </p:spTgt>
+                                          <p:spTgt spid="12"/>
                                         </p:tgtEl>
                                         <p:attrNameLst>
                                           <p:attrName>style.visibility</p:attrName>
@@ -7101,11 +7302,7 @@
                                       <p:cBhvr>
                                         <p:cTn id="92" dur="500"/>
                                         <p:tgtEl>
-                                          <p:spTgt spid="19">
-                                            <p:txEl>
-                                              <p:pRg st="1" end="1"/>
-                                            </p:txEl>
-                                          </p:spTgt>
+                                          <p:spTgt spid="12"/>
                                         </p:tgtEl>
                                       </p:cBhvr>
                                     </p:animEffect>
@@ -7146,7 +7343,7 @@
                                         <p:tgtEl>
                                           <p:spTgt spid="19">
                                             <p:txEl>
-                                              <p:pRg st="2" end="2"/>
+                                              <p:pRg st="0" end="0"/>
                                             </p:txEl>
                                           </p:spTgt>
                                         </p:tgtEl>
@@ -7161,6 +7358,128 @@
                                     <p:animEffect transition="in" filter="fade">
                                       <p:cBhvr>
                                         <p:cTn id="97" dur="500"/>
+                                        <p:tgtEl>
+                                          <p:spTgt spid="19">
+                                            <p:txEl>
+                                              <p:pRg st="0" end="0"/>
+                                            </p:txEl>
+                                          </p:spTgt>
+                                        </p:tgtEl>
+                                      </p:cBhvr>
+                                    </p:animEffect>
+                                  </p:childTnLst>
+                                </p:cTn>
+                              </p:par>
+                            </p:childTnLst>
+                          </p:cTn>
+                        </p:par>
+                      </p:childTnLst>
+                    </p:cTn>
+                  </p:par>
+                  <p:par>
+                    <p:cTn id="98" fill="hold">
+                      <p:stCondLst>
+                        <p:cond delay="indefinite"/>
+                      </p:stCondLst>
+                      <p:childTnLst>
+                        <p:par>
+                          <p:cTn id="99" fill="hold">
+                            <p:stCondLst>
+                              <p:cond delay="0"/>
+                            </p:stCondLst>
+                            <p:childTnLst>
+                              <p:par>
+                                <p:cTn id="100" presetID="10" presetClass="entr" presetSubtype="0" fill="hold" nodeType="clickEffect">
+                                  <p:stCondLst>
+                                    <p:cond delay="0"/>
+                                  </p:stCondLst>
+                                  <p:childTnLst>
+                                    <p:set>
+                                      <p:cBhvr>
+                                        <p:cTn id="101" dur="1" fill="hold">
+                                          <p:stCondLst>
+                                            <p:cond delay="0"/>
+                                          </p:stCondLst>
+                                        </p:cTn>
+                                        <p:tgtEl>
+                                          <p:spTgt spid="19">
+                                            <p:txEl>
+                                              <p:pRg st="1" end="1"/>
+                                            </p:txEl>
+                                          </p:spTgt>
+                                        </p:tgtEl>
+                                        <p:attrNameLst>
+                                          <p:attrName>style.visibility</p:attrName>
+                                        </p:attrNameLst>
+                                      </p:cBhvr>
+                                      <p:to>
+                                        <p:strVal val="visible"/>
+                                      </p:to>
+                                    </p:set>
+                                    <p:animEffect transition="in" filter="fade">
+                                      <p:cBhvr>
+                                        <p:cTn id="102" dur="500"/>
+                                        <p:tgtEl>
+                                          <p:spTgt spid="19">
+                                            <p:txEl>
+                                              <p:pRg st="1" end="1"/>
+                                            </p:txEl>
+                                          </p:spTgt>
+                                        </p:tgtEl>
+                                      </p:cBhvr>
+                                    </p:animEffect>
+                                  </p:childTnLst>
+                                </p:cTn>
+                              </p:par>
+                            </p:childTnLst>
+                          </p:cTn>
+                        </p:par>
+                      </p:childTnLst>
+                    </p:cTn>
+                  </p:par>
+                  <p:par>
+                    <p:cTn id="103" fill="hold">
+                      <p:stCondLst>
+                        <p:cond delay="indefinite"/>
+                      </p:stCondLst>
+                      <p:childTnLst>
+                        <p:par>
+                          <p:cTn id="104" fill="hold">
+                            <p:stCondLst>
+                              <p:cond delay="0"/>
+                            </p:stCondLst>
+                            <p:childTnLst>
+                              <p:par>
+                                <p:cTn id="105" presetID="10" presetClass="entr" presetSubtype="0" fill="hold" nodeType="clickEffect">
+                                  <p:stCondLst>
+                                    <p:cond delay="0"/>
+                                  </p:stCondLst>
+                                  <p:childTnLst>
+                                    <p:set>
+                                      <p:cBhvr>
+                                        <p:cTn id="106" dur="1" fill="hold">
+                                          <p:stCondLst>
+                                            <p:cond delay="0"/>
+                                          </p:stCondLst>
+                                        </p:cTn>
+                                        <p:tgtEl>
+                                          <p:spTgt spid="19">
+                                            <p:txEl>
+                                              <p:pRg st="2" end="2"/>
+                                            </p:txEl>
+                                          </p:spTgt>
+                                        </p:tgtEl>
+                                        <p:attrNameLst>
+                                          <p:attrName>style.visibility</p:attrName>
+                                        </p:attrNameLst>
+                                      </p:cBhvr>
+                                      <p:to>
+                                        <p:strVal val="visible"/>
+                                      </p:to>
+                                    </p:set>
+                                    <p:animEffect transition="in" filter="fade">
+                                      <p:cBhvr>
+                                        <p:cTn id="107" dur="500"/>
                                         <p:tgtEl>
                                           <p:spTgt spid="19">
                                             <p:txEl>
@@ -7211,7 +7530,7 @@
 </p:sld>
 </file>
 
-<file path=ppt/slides/slide11.xml><?xml version="1.0" encoding="utf-8"?>
+<file path=ppt/slides/slide12.xml><?xml version="1.0" encoding="utf-8"?>
 <p:sld xmlns:a="http://schemas.openxmlformats.org/drawingml/2006/main" xmlns:r="http://schemas.openxmlformats.org/officeDocument/2006/relationships" xmlns:p="http://schemas.openxmlformats.org/presentationml/2006/main">
   <p:cSld>
     <p:spTree>
@@ -7997,7 +8316,106 @@
 </p:sld>
 </file>
 
-<file path=ppt/slides/slide12.xml><?xml version="1.0" encoding="utf-8"?>
+<file path=ppt/slides/slide13.xml><?xml version="1.0" encoding="utf-8"?>
+<p:sld xmlns:a="http://schemas.openxmlformats.org/drawingml/2006/main" xmlns:r="http://schemas.openxmlformats.org/officeDocument/2006/relationships" xmlns:p="http://schemas.openxmlformats.org/presentationml/2006/main">
+  <p:cSld>
+    <p:spTree>
+      <p:nvGrpSpPr>
+        <p:cNvPr id="1" name=""/>
+        <p:cNvGrpSpPr/>
+        <p:nvPr/>
+      </p:nvGrpSpPr>
+      <p:grpSpPr>
+        <a:xfrm>
+          <a:off x="0" y="0"/>
+          <a:ext cx="0" cy="0"/>
+          <a:chOff x="0" y="0"/>
+          <a:chExt cx="0" cy="0"/>
+        </a:xfrm>
+      </p:grpSpPr>
+      <p:sp>
+        <p:nvSpPr>
+          <p:cNvPr id="2" name="Title 1">
+            <a:extLst>
+              <a:ext uri="{FF2B5EF4-FFF2-40B4-BE49-F238E27FC236}">
+                <a16:creationId xmlns:a16="http://schemas.microsoft.com/office/drawing/2014/main" id="{831132F1-B31B-58B5-5B4C-3F24FB25B2FC}"/>
+              </a:ext>
+            </a:extLst>
+          </p:cNvPr>
+          <p:cNvSpPr>
+            <a:spLocks noGrp="1"/>
+          </p:cNvSpPr>
+          <p:nvPr>
+            <p:ph type="title"/>
+          </p:nvPr>
+        </p:nvSpPr>
+        <p:spPr/>
+        <p:txBody>
+          <a:bodyPr>
+            <a:normAutofit/>
+          </a:bodyPr>
+          <a:lstStyle/>
+          <a:p>
+            <a:r>
+              <a:rPr lang="en-US" sz="4800" dirty="0"/>
+              <a:t>“Hello World!” of Probabilistic Programming</a:t>
+            </a:r>
+            <a:endParaRPr lang="en-US" dirty="0"/>
+          </a:p>
+        </p:txBody>
+      </p:sp>
+      <p:sp>
+        <p:nvSpPr>
+          <p:cNvPr id="3" name="Content Placeholder 2">
+            <a:extLst>
+              <a:ext uri="{FF2B5EF4-FFF2-40B4-BE49-F238E27FC236}">
+                <a16:creationId xmlns:a16="http://schemas.microsoft.com/office/drawing/2014/main" id="{5BBFBCCE-131D-24EA-3927-481E7E0212F7}"/>
+              </a:ext>
+            </a:extLst>
+          </p:cNvPr>
+          <p:cNvSpPr>
+            <a:spLocks noGrp="1"/>
+          </p:cNvSpPr>
+          <p:nvPr>
+            <p:ph idx="1"/>
+          </p:nvPr>
+        </p:nvSpPr>
+        <p:spPr/>
+        <p:txBody>
+          <a:bodyPr>
+            <a:normAutofit/>
+          </a:bodyPr>
+          <a:lstStyle/>
+          <a:p>
+            <a:pPr lvl="1"/>
+            <a:r>
+              <a:rPr lang="en-US" sz="2400" dirty="0"/>
+              <a:t>First, cover an example of a probabilistic “model”</a:t>
+            </a:r>
+          </a:p>
+          <a:p>
+            <a:pPr lvl="1"/>
+            <a:r>
+              <a:rPr lang="en-US" sz="2400" dirty="0"/>
+              <a:t>Then cover how do we perform inference / fit the model.</a:t>
+            </a:r>
+          </a:p>
+        </p:txBody>
+      </p:sp>
+    </p:spTree>
+    <p:extLst>
+      <p:ext uri="{BB962C8B-B14F-4D97-AF65-F5344CB8AC3E}">
+        <p14:creationId xmlns:p14="http://schemas.microsoft.com/office/powerpoint/2010/main" val="154775053"/>
+      </p:ext>
+    </p:extLst>
+  </p:cSld>
+  <p:clrMapOvr>
+    <a:masterClrMapping/>
+  </p:clrMapOvr>
+</p:sld>
+</file>
+
+<file path=ppt/slides/slide14.xml><?xml version="1.0" encoding="utf-8"?>
 <p:sld xmlns:a="http://schemas.openxmlformats.org/drawingml/2006/main" xmlns:r="http://schemas.openxmlformats.org/officeDocument/2006/relationships" xmlns:p="http://schemas.openxmlformats.org/presentationml/2006/main">
   <p:cSld>
     <p:spTree>
@@ -8520,133 +8938,6 @@
           </a:p>
         </p:txBody>
       </p:sp>
-      <p:grpSp>
-        <p:nvGrpSpPr>
-          <p:cNvPr id="11" name="Group 10">
-            <a:extLst>
-              <a:ext uri="{FF2B5EF4-FFF2-40B4-BE49-F238E27FC236}">
-                <a16:creationId xmlns:a16="http://schemas.microsoft.com/office/drawing/2014/main" id="{97346884-030B-4C45-8EE5-F539860D2262}"/>
-              </a:ext>
-            </a:extLst>
-          </p:cNvPr>
-          <p:cNvGrpSpPr/>
-          <p:nvPr/>
-        </p:nvGrpSpPr>
-        <p:grpSpPr>
-          <a:xfrm>
-            <a:off x="7530806" y="103856"/>
-            <a:ext cx="3624874" cy="2899899"/>
-            <a:chOff x="7530806" y="103856"/>
-            <a:chExt cx="3624874" cy="2899899"/>
-          </a:xfrm>
-        </p:grpSpPr>
-        <p:pic>
-          <p:nvPicPr>
-            <p:cNvPr id="14" name="Picture 10" descr="Exponential distribution - Wikipedia">
-              <a:extLst>
-                <a:ext uri="{FF2B5EF4-FFF2-40B4-BE49-F238E27FC236}">
-                  <a16:creationId xmlns:a16="http://schemas.microsoft.com/office/drawing/2014/main" id="{8494D28D-551E-472C-95B3-C763DC56E1E3}"/>
-                </a:ext>
-              </a:extLst>
-            </p:cNvPr>
-            <p:cNvPicPr>
-              <a:picLocks noChangeAspect="1" noChangeArrowheads="1"/>
-            </p:cNvPicPr>
-            <p:nvPr/>
-          </p:nvPicPr>
-          <p:blipFill>
-            <a:blip r:embed="rId4">
-              <a:extLst>
-                <a:ext uri="{28A0092B-C50C-407E-A947-70E740481C1C}">
-                  <a14:useLocalDpi xmlns:a14="http://schemas.microsoft.com/office/drawing/2010/main" val="0"/>
-                </a:ext>
-              </a:extLst>
-            </a:blip>
-            <a:srcRect/>
-            <a:stretch>
-              <a:fillRect/>
-            </a:stretch>
-          </p:blipFill>
-          <p:spPr bwMode="auto">
-            <a:xfrm>
-              <a:off x="7530806" y="103856"/>
-              <a:ext cx="3624874" cy="2899899"/>
-            </a:xfrm>
-            <a:prstGeom prst="rect">
-              <a:avLst/>
-            </a:prstGeom>
-            <a:solidFill>
-              <a:srgbClr val="FFFFFF">
-                <a:shade val="85000"/>
-              </a:srgbClr>
-            </a:solidFill>
-            <a:ln w="190500" cap="rnd">
-              <a:solidFill>
-                <a:srgbClr val="FFFFFF"/>
-              </a:solidFill>
-            </a:ln>
-            <a:effectLst>
-              <a:outerShdw blurRad="50000" algn="tl" rotWithShape="0">
-                <a:srgbClr val="000000">
-                  <a:alpha val="41000"/>
-                </a:srgbClr>
-              </a:outerShdw>
-            </a:effectLst>
-            <a:scene3d>
-              <a:camera prst="orthographicFront"/>
-              <a:lightRig rig="twoPt" dir="t">
-                <a:rot lat="0" lon="0" rev="7800000"/>
-              </a:lightRig>
-            </a:scene3d>
-            <a:sp3d contourW="6350">
-              <a:bevelT w="50800" h="16510"/>
-              <a:contourClr>
-                <a:srgbClr val="C0C0C0"/>
-              </a:contourClr>
-            </a:sp3d>
-          </p:spPr>
-        </p:pic>
-        <p:sp>
-          <p:nvSpPr>
-            <p:cNvPr id="7" name="TextBox 6">
-              <a:extLst>
-                <a:ext uri="{FF2B5EF4-FFF2-40B4-BE49-F238E27FC236}">
-                  <a16:creationId xmlns:a16="http://schemas.microsoft.com/office/drawing/2014/main" id="{D079B273-7B5C-46DB-8644-EE95F90E27C1}"/>
-                </a:ext>
-              </a:extLst>
-            </p:cNvPr>
-            <p:cNvSpPr txBox="1"/>
-            <p:nvPr/>
-          </p:nvSpPr>
-          <p:spPr>
-            <a:xfrm>
-              <a:off x="8992559" y="1342971"/>
-              <a:ext cx="1702838" cy="369332"/>
-            </a:xfrm>
-            <a:prstGeom prst="rect">
-              <a:avLst/>
-            </a:prstGeom>
-            <a:noFill/>
-          </p:spPr>
-          <p:txBody>
-            <a:bodyPr wrap="none" rtlCol="0">
-              <a:spAutoFit/>
-            </a:bodyPr>
-            <a:lstStyle/>
-            <a:p>
-              <a:r>
-                <a:rPr lang="en-US" u="sng" dirty="0"/>
-                <a:t>Exponential </a:t>
-              </a:r>
-              <a:r>
-                <a:rPr lang="en-US" u="sng" dirty="0" err="1"/>
-                <a:t>Dist</a:t>
-              </a:r>
-              <a:endParaRPr lang="en-US" u="sng" dirty="0"/>
-            </a:p>
-          </p:txBody>
-        </p:sp>
-      </p:grpSp>
     </p:spTree>
     <p:extLst>
       <p:ext uri="{BB962C8B-B14F-4D97-AF65-F5344CB8AC3E}">
@@ -8837,7 +9128,7 @@
                             </p:stCondLst>
                             <p:childTnLst>
                               <p:par>
-                                <p:cTn id="20" presetID="10" presetClass="entr" presetSubtype="0" fill="hold" nodeType="clickEffect">
+                                <p:cTn id="20" presetID="10" presetClass="entr" presetSubtype="0" fill="hold" grpId="0" nodeType="clickEffect">
                                   <p:stCondLst>
                                     <p:cond delay="0"/>
                                   </p:stCondLst>
@@ -8850,7 +9141,7 @@
                                           </p:stCondLst>
                                         </p:cTn>
                                         <p:tgtEl>
-                                          <p:spTgt spid="11"/>
+                                          <p:spTgt spid="8"/>
                                         </p:tgtEl>
                                         <p:attrNameLst>
                                           <p:attrName>style.visibility</p:attrName>
@@ -8864,7 +9155,42 @@
                                       <p:cBhvr>
                                         <p:cTn id="22" dur="500"/>
                                         <p:tgtEl>
-                                          <p:spTgt spid="11"/>
+                                          <p:spTgt spid="8"/>
+                                        </p:tgtEl>
+                                      </p:cBhvr>
+                                    </p:animEffect>
+                                  </p:childTnLst>
+                                </p:cTn>
+                              </p:par>
+                              <p:par>
+                                <p:cTn id="23" presetID="10" presetClass="entr" presetSubtype="0" fill="hold" grpId="0" nodeType="withEffect">
+                                  <p:stCondLst>
+                                    <p:cond delay="0"/>
+                                  </p:stCondLst>
+                                  <p:childTnLst>
+                                    <p:set>
+                                      <p:cBhvr>
+                                        <p:cTn id="24" dur="1" fill="hold">
+                                          <p:stCondLst>
+                                            <p:cond delay="0"/>
+                                          </p:stCondLst>
+                                        </p:cTn>
+                                        <p:tgtEl>
+                                          <p:spTgt spid="10"/>
+                                        </p:tgtEl>
+                                        <p:attrNameLst>
+                                          <p:attrName>style.visibility</p:attrName>
+                                        </p:attrNameLst>
+                                      </p:cBhvr>
+                                      <p:to>
+                                        <p:strVal val="visible"/>
+                                      </p:to>
+                                    </p:set>
+                                    <p:animEffect transition="in" filter="fade">
+                                      <p:cBhvr>
+                                        <p:cTn id="25" dur="500"/>
+                                        <p:tgtEl>
+                                          <p:spTgt spid="10"/>
                                         </p:tgtEl>
                                       </p:cBhvr>
                                     </p:animEffect>
@@ -8878,32 +9204,36 @@
                     </p:cTn>
                   </p:par>
                   <p:par>
-                    <p:cTn id="23" fill="hold">
+                    <p:cTn id="26" fill="hold">
                       <p:stCondLst>
                         <p:cond delay="indefinite"/>
                       </p:stCondLst>
                       <p:childTnLst>
                         <p:par>
-                          <p:cTn id="24" fill="hold">
+                          <p:cTn id="27" fill="hold">
                             <p:stCondLst>
                               <p:cond delay="0"/>
                             </p:stCondLst>
                             <p:childTnLst>
                               <p:par>
-                                <p:cTn id="25" presetID="10" presetClass="entr" presetSubtype="0" fill="hold" grpId="0" nodeType="clickEffect">
+                                <p:cTn id="28" presetID="10" presetClass="entr" presetSubtype="0" fill="hold" nodeType="clickEffect">
                                   <p:stCondLst>
                                     <p:cond delay="0"/>
                                   </p:stCondLst>
                                   <p:childTnLst>
                                     <p:set>
                                       <p:cBhvr>
-                                        <p:cTn id="26" dur="1" fill="hold">
+                                        <p:cTn id="29" dur="1" fill="hold">
                                           <p:stCondLst>
                                             <p:cond delay="0"/>
                                           </p:stCondLst>
                                         </p:cTn>
                                         <p:tgtEl>
-                                          <p:spTgt spid="8"/>
+                                          <p:spTgt spid="12">
+                                            <p:txEl>
+                                              <p:pRg st="0" end="0"/>
+                                            </p:txEl>
+                                          </p:spTgt>
                                         </p:tgtEl>
                                         <p:attrNameLst>
                                           <p:attrName>style.visibility</p:attrName>
@@ -8915,44 +9245,13 @@
                                     </p:set>
                                     <p:animEffect transition="in" filter="fade">
                                       <p:cBhvr>
-                                        <p:cTn id="27" dur="500"/>
-                                        <p:tgtEl>
-                                          <p:spTgt spid="8"/>
-                                        </p:tgtEl>
-                                      </p:cBhvr>
-                                    </p:animEffect>
-                                  </p:childTnLst>
-                                </p:cTn>
-                              </p:par>
-                              <p:par>
-                                <p:cTn id="28" presetID="10" presetClass="entr" presetSubtype="0" fill="hold" grpId="0" nodeType="withEffect">
-                                  <p:stCondLst>
-                                    <p:cond delay="0"/>
-                                  </p:stCondLst>
-                                  <p:childTnLst>
-                                    <p:set>
-                                      <p:cBhvr>
-                                        <p:cTn id="29" dur="1" fill="hold">
-                                          <p:stCondLst>
-                                            <p:cond delay="0"/>
-                                          </p:stCondLst>
-                                        </p:cTn>
-                                        <p:tgtEl>
-                                          <p:spTgt spid="10"/>
-                                        </p:tgtEl>
-                                        <p:attrNameLst>
-                                          <p:attrName>style.visibility</p:attrName>
-                                        </p:attrNameLst>
-                                      </p:cBhvr>
-                                      <p:to>
-                                        <p:strVal val="visible"/>
-                                      </p:to>
-                                    </p:set>
-                                    <p:animEffect transition="in" filter="fade">
-                                      <p:cBhvr>
                                         <p:cTn id="30" dur="500"/>
                                         <p:tgtEl>
-                                          <p:spTgt spid="10"/>
+                                          <p:spTgt spid="12">
+                                            <p:txEl>
+                                              <p:pRg st="0" end="0"/>
+                                            </p:txEl>
+                                          </p:spTgt>
                                         </p:tgtEl>
                                       </p:cBhvr>
                                     </p:animEffect>
@@ -8991,7 +9290,7 @@
                                           </p:stCondLst>
                                         </p:cTn>
                                         <p:tgtEl>
-                                          <p:spTgt spid="12">
+                                          <p:spTgt spid="13">
                                             <p:txEl>
                                               <p:pRg st="0" end="0"/>
                                             </p:txEl>
@@ -9009,7 +9308,7 @@
                                       <p:cBhvr>
                                         <p:cTn id="35" dur="500"/>
                                         <p:tgtEl>
-                                          <p:spTgt spid="12">
+                                          <p:spTgt spid="13">
                                             <p:txEl>
                                               <p:pRg st="0" end="0"/>
                                             </p:txEl>
@@ -9039,7 +9338,7 @@
                             </p:stCondLst>
                             <p:childTnLst>
                               <p:par>
-                                <p:cTn id="38" presetID="10" presetClass="entr" presetSubtype="0" fill="hold" nodeType="clickEffect">
+                                <p:cTn id="38" presetID="10" presetClass="entr" presetSubtype="0" fill="hold" grpId="0" nodeType="clickEffect">
                                   <p:stCondLst>
                                     <p:cond delay="0"/>
                                   </p:stCondLst>
@@ -9052,11 +9351,7 @@
                                           </p:stCondLst>
                                         </p:cTn>
                                         <p:tgtEl>
-                                          <p:spTgt spid="13">
-                                            <p:txEl>
-                                              <p:pRg st="0" end="0"/>
-                                            </p:txEl>
-                                          </p:spTgt>
+                                          <p:spTgt spid="5"/>
                                         </p:tgtEl>
                                         <p:attrNameLst>
                                           <p:attrName>style.visibility</p:attrName>
@@ -9070,11 +9365,7 @@
                                       <p:cBhvr>
                                         <p:cTn id="40" dur="500"/>
                                         <p:tgtEl>
-                                          <p:spTgt spid="13">
-                                            <p:txEl>
-                                              <p:pRg st="0" end="0"/>
-                                            </p:txEl>
-                                          </p:spTgt>
+                                          <p:spTgt spid="5"/>
                                         </p:tgtEl>
                                       </p:cBhvr>
                                     </p:animEffect>
@@ -9100,7 +9391,7 @@
                             </p:stCondLst>
                             <p:childTnLst>
                               <p:par>
-                                <p:cTn id="43" presetID="10" presetClass="entr" presetSubtype="0" fill="hold" grpId="0" nodeType="clickEffect">
+                                <p:cTn id="43" presetID="10" presetClass="entr" presetSubtype="0" fill="hold" nodeType="clickEffect">
                                   <p:stCondLst>
                                     <p:cond delay="0"/>
                                   </p:stCondLst>
@@ -9113,7 +9404,11 @@
                                           </p:stCondLst>
                                         </p:cTn>
                                         <p:tgtEl>
-                                          <p:spTgt spid="5"/>
+                                          <p:spTgt spid="12">
+                                            <p:txEl>
+                                              <p:pRg st="1" end="1"/>
+                                            </p:txEl>
+                                          </p:spTgt>
                                         </p:tgtEl>
                                         <p:attrNameLst>
                                           <p:attrName>style.visibility</p:attrName>
@@ -9127,7 +9422,11 @@
                                       <p:cBhvr>
                                         <p:cTn id="45" dur="500"/>
                                         <p:tgtEl>
-                                          <p:spTgt spid="5"/>
+                                          <p:spTgt spid="12">
+                                            <p:txEl>
+                                              <p:pRg st="1" end="1"/>
+                                            </p:txEl>
+                                          </p:spTgt>
                                         </p:tgtEl>
                                       </p:cBhvr>
                                     </p:animEffect>
@@ -9168,7 +9467,7 @@
                                         <p:tgtEl>
                                           <p:spTgt spid="12">
                                             <p:txEl>
-                                              <p:pRg st="1" end="1"/>
+                                              <p:pRg st="2" end="2"/>
                                             </p:txEl>
                                           </p:spTgt>
                                         </p:tgtEl>
@@ -9186,7 +9485,7 @@
                                         <p:tgtEl>
                                           <p:spTgt spid="12">
                                             <p:txEl>
-                                              <p:pRg st="1" end="1"/>
+                                              <p:pRg st="2" end="2"/>
                                             </p:txEl>
                                           </p:spTgt>
                                         </p:tgtEl>
@@ -9229,7 +9528,7 @@
                                         <p:tgtEl>
                                           <p:spTgt spid="12">
                                             <p:txEl>
-                                              <p:pRg st="2" end="2"/>
+                                              <p:pRg st="3" end="3"/>
                                             </p:txEl>
                                           </p:spTgt>
                                         </p:tgtEl>
@@ -9247,7 +9546,7 @@
                                         <p:tgtEl>
                                           <p:spTgt spid="12">
                                             <p:txEl>
-                                              <p:pRg st="2" end="2"/>
+                                              <p:pRg st="3" end="3"/>
                                             </p:txEl>
                                           </p:spTgt>
                                         </p:tgtEl>
@@ -9288,9 +9587,9 @@
                                           </p:stCondLst>
                                         </p:cTn>
                                         <p:tgtEl>
-                                          <p:spTgt spid="12">
+                                          <p:spTgt spid="13">
                                             <p:txEl>
-                                              <p:pRg st="3" end="3"/>
+                                              <p:pRg st="1" end="1"/>
                                             </p:txEl>
                                           </p:spTgt>
                                         </p:tgtEl>
@@ -9306,9 +9605,9 @@
                                       <p:cBhvr>
                                         <p:cTn id="60" dur="500"/>
                                         <p:tgtEl>
-                                          <p:spTgt spid="12">
+                                          <p:spTgt spid="13">
                                             <p:txEl>
-                                              <p:pRg st="3" end="3"/>
+                                              <p:pRg st="1" end="1"/>
                                             </p:txEl>
                                           </p:spTgt>
                                         </p:tgtEl>
@@ -9351,7 +9650,7 @@
                                         <p:tgtEl>
                                           <p:spTgt spid="13">
                                             <p:txEl>
-                                              <p:pRg st="1" end="1"/>
+                                              <p:pRg st="2" end="2"/>
                                             </p:txEl>
                                           </p:spTgt>
                                         </p:tgtEl>
@@ -9369,7 +9668,7 @@
                                         <p:tgtEl>
                                           <p:spTgt spid="13">
                                             <p:txEl>
-                                              <p:pRg st="1" end="1"/>
+                                              <p:pRg st="2" end="2"/>
                                             </p:txEl>
                                           </p:spTgt>
                                         </p:tgtEl>
@@ -9412,7 +9711,7 @@
                                         <p:tgtEl>
                                           <p:spTgt spid="13">
                                             <p:txEl>
-                                              <p:pRg st="2" end="2"/>
+                                              <p:pRg st="3" end="3"/>
                                             </p:txEl>
                                           </p:spTgt>
                                         </p:tgtEl>
@@ -9427,67 +9726,6 @@
                                     <p:animEffect transition="in" filter="fade">
                                       <p:cBhvr>
                                         <p:cTn id="70" dur="500"/>
-                                        <p:tgtEl>
-                                          <p:spTgt spid="13">
-                                            <p:txEl>
-                                              <p:pRg st="2" end="2"/>
-                                            </p:txEl>
-                                          </p:spTgt>
-                                        </p:tgtEl>
-                                      </p:cBhvr>
-                                    </p:animEffect>
-                                  </p:childTnLst>
-                                </p:cTn>
-                              </p:par>
-                            </p:childTnLst>
-                          </p:cTn>
-                        </p:par>
-                      </p:childTnLst>
-                    </p:cTn>
-                  </p:par>
-                  <p:par>
-                    <p:cTn id="71" fill="hold">
-                      <p:stCondLst>
-                        <p:cond delay="indefinite"/>
-                      </p:stCondLst>
-                      <p:childTnLst>
-                        <p:par>
-                          <p:cTn id="72" fill="hold">
-                            <p:stCondLst>
-                              <p:cond delay="0"/>
-                            </p:stCondLst>
-                            <p:childTnLst>
-                              <p:par>
-                                <p:cTn id="73" presetID="10" presetClass="entr" presetSubtype="0" fill="hold" nodeType="clickEffect">
-                                  <p:stCondLst>
-                                    <p:cond delay="0"/>
-                                  </p:stCondLst>
-                                  <p:childTnLst>
-                                    <p:set>
-                                      <p:cBhvr>
-                                        <p:cTn id="74" dur="1" fill="hold">
-                                          <p:stCondLst>
-                                            <p:cond delay="0"/>
-                                          </p:stCondLst>
-                                        </p:cTn>
-                                        <p:tgtEl>
-                                          <p:spTgt spid="13">
-                                            <p:txEl>
-                                              <p:pRg st="3" end="3"/>
-                                            </p:txEl>
-                                          </p:spTgt>
-                                        </p:tgtEl>
-                                        <p:attrNameLst>
-                                          <p:attrName>style.visibility</p:attrName>
-                                        </p:attrNameLst>
-                                      </p:cBhvr>
-                                      <p:to>
-                                        <p:strVal val="visible"/>
-                                      </p:to>
-                                    </p:set>
-                                    <p:animEffect transition="in" filter="fade">
-                                      <p:cBhvr>
-                                        <p:cTn id="75" dur="500"/>
                                         <p:tgtEl>
                                           <p:spTgt spid="13">
                                             <p:txEl>
@@ -9539,7 +9777,7 @@
 </p:sld>
 </file>
 
-<file path=ppt/slides/slide13.xml><?xml version="1.0" encoding="utf-8"?>
+<file path=ppt/slides/slide15.xml><?xml version="1.0" encoding="utf-8"?>
 <p:sld xmlns:a="http://schemas.openxmlformats.org/drawingml/2006/main" xmlns:r="http://schemas.openxmlformats.org/officeDocument/2006/relationships" xmlns:p="http://schemas.openxmlformats.org/presentationml/2006/main">
   <p:cSld>
     <p:spTree>
@@ -11145,7 +11383,7 @@
 </p:sld>
 </file>
 
-<file path=ppt/slides/slide14.xml><?xml version="1.0" encoding="utf-8"?>
+<file path=ppt/slides/slide16.xml><?xml version="1.0" encoding="utf-8"?>
 <p:sld xmlns:a="http://schemas.openxmlformats.org/drawingml/2006/main" xmlns:r="http://schemas.openxmlformats.org/officeDocument/2006/relationships" xmlns:p="http://schemas.openxmlformats.org/presentationml/2006/main">
   <p:cSld>
     <p:spTree>
@@ -11330,7 +11568,7 @@
 </p:sld>
 </file>
 
-<file path=ppt/slides/slide15.xml><?xml version="1.0" encoding="utf-8"?>
+<file path=ppt/slides/slide17.xml><?xml version="1.0" encoding="utf-8"?>
 <p:sld xmlns:a="http://schemas.openxmlformats.org/drawingml/2006/main" xmlns:r="http://schemas.openxmlformats.org/officeDocument/2006/relationships" xmlns:p="http://schemas.openxmlformats.org/presentationml/2006/main">
   <p:cSld>
     <p:spTree>
@@ -11564,7 +11802,1974 @@
 </p:sld>
 </file>
 
-<file path=ppt/slides/slide16.xml><?xml version="1.0" encoding="utf-8"?>
+<file path=ppt/slides/slide18.xml><?xml version="1.0" encoding="utf-8"?>
+<p:sld xmlns:a="http://schemas.openxmlformats.org/drawingml/2006/main" xmlns:r="http://schemas.openxmlformats.org/officeDocument/2006/relationships" xmlns:p="http://schemas.openxmlformats.org/presentationml/2006/main">
+  <p:cSld>
+    <p:spTree>
+      <p:nvGrpSpPr>
+        <p:cNvPr id="1" name=""/>
+        <p:cNvGrpSpPr/>
+        <p:nvPr/>
+      </p:nvGrpSpPr>
+      <p:grpSpPr>
+        <a:xfrm>
+          <a:off x="0" y="0"/>
+          <a:ext cx="0" cy="0"/>
+          <a:chOff x="0" y="0"/>
+          <a:chExt cx="0" cy="0"/>
+        </a:xfrm>
+      </p:grpSpPr>
+      <p:sp>
+        <p:nvSpPr>
+          <p:cNvPr id="2" name="Title 1">
+            <a:extLst>
+              <a:ext uri="{FF2B5EF4-FFF2-40B4-BE49-F238E27FC236}">
+                <a16:creationId xmlns:a16="http://schemas.microsoft.com/office/drawing/2014/main" id="{7C6A75DA-052C-A1C6-27F2-3B2081DDC25F}"/>
+              </a:ext>
+            </a:extLst>
+          </p:cNvPr>
+          <p:cNvSpPr>
+            <a:spLocks noGrp="1"/>
+          </p:cNvSpPr>
+          <p:nvPr>
+            <p:ph type="title"/>
+          </p:nvPr>
+        </p:nvSpPr>
+        <p:spPr/>
+        <p:txBody>
+          <a:bodyPr/>
+          <a:lstStyle/>
+          <a:p>
+            <a:r>
+              <a:rPr lang="en-US" dirty="0"/>
+              <a:t>Inference in Probabilistic Programming</a:t>
+            </a:r>
+          </a:p>
+        </p:txBody>
+      </p:sp>
+      <p:sp>
+        <p:nvSpPr>
+          <p:cNvPr id="3" name="Content Placeholder 2">
+            <a:extLst>
+              <a:ext uri="{FF2B5EF4-FFF2-40B4-BE49-F238E27FC236}">
+                <a16:creationId xmlns:a16="http://schemas.microsoft.com/office/drawing/2014/main" id="{74240EC7-1935-A123-35E3-A60FA72463C5}"/>
+              </a:ext>
+            </a:extLst>
+          </p:cNvPr>
+          <p:cNvSpPr>
+            <a:spLocks noGrp="1"/>
+          </p:cNvSpPr>
+          <p:nvPr>
+            <p:ph idx="1"/>
+          </p:nvPr>
+        </p:nvSpPr>
+        <p:spPr/>
+        <p:txBody>
+          <a:bodyPr>
+            <a:normAutofit lnSpcReduction="10000"/>
+          </a:bodyPr>
+          <a:lstStyle/>
+          <a:p>
+            <a:pPr lvl="1"/>
+            <a:r>
+              <a:rPr lang="en-US" sz="3200" dirty="0"/>
+              <a:t>How do we “fit the distribution”?</a:t>
+            </a:r>
+          </a:p>
+          <a:p>
+            <a:pPr lvl="2"/>
+            <a:r>
+              <a:rPr lang="en-US" sz="2400" dirty="0"/>
+              <a:t>For most “useful” models, </a:t>
+            </a:r>
+            <a:r>
+              <a:rPr lang="en-US" sz="2400" b="1" dirty="0"/>
+              <a:t>we can’t. </a:t>
+            </a:r>
+            <a:endParaRPr lang="en-US" sz="2400" dirty="0"/>
+          </a:p>
+          <a:p>
+            <a:pPr lvl="2"/>
+            <a:r>
+              <a:rPr lang="en-US" sz="2400" dirty="0"/>
+              <a:t>The models get too complicated for exact fits.</a:t>
+            </a:r>
+          </a:p>
+          <a:p>
+            <a:pPr lvl="3"/>
+            <a:r>
+              <a:rPr lang="en-US" sz="2400" dirty="0"/>
+              <a:t>Why this is the case is out of scope for discussion, but we can discuss informally.</a:t>
+            </a:r>
+          </a:p>
+          <a:p>
+            <a:pPr lvl="2"/>
+            <a:r>
+              <a:rPr lang="en-US" sz="2400" dirty="0"/>
+              <a:t>Therefore, we approximate the distributions.</a:t>
+            </a:r>
+          </a:p>
+          <a:p>
+            <a:pPr lvl="2"/>
+            <a:endParaRPr lang="en-US" sz="2400" dirty="0"/>
+          </a:p>
+          <a:p>
+            <a:pPr lvl="1"/>
+            <a:r>
+              <a:rPr lang="en-US" sz="2800" dirty="0"/>
+              <a:t>Types of approximations:</a:t>
+            </a:r>
+          </a:p>
+          <a:p>
+            <a:pPr marL="898398" lvl="2" indent="-514350">
+              <a:buFont typeface="+mj-lt"/>
+              <a:buAutoNum type="arabicPeriod"/>
+            </a:pPr>
+            <a:r>
+              <a:rPr lang="en-US" sz="2400" dirty="0"/>
+              <a:t>Sampling (Markov Chain Monte Carlo)</a:t>
+            </a:r>
+          </a:p>
+          <a:p>
+            <a:pPr marL="898398" lvl="2" indent="-514350">
+              <a:buFont typeface="+mj-lt"/>
+              <a:buAutoNum type="arabicPeriod"/>
+            </a:pPr>
+            <a:r>
+              <a:rPr lang="en-US" sz="2400" dirty="0"/>
+              <a:t>Approximate Fit (Variational Inference)</a:t>
+            </a:r>
+          </a:p>
+          <a:p>
+            <a:pPr marL="898398" lvl="2" indent="-514350">
+              <a:buFont typeface="+mj-lt"/>
+              <a:buAutoNum type="arabicPeriod"/>
+            </a:pPr>
+            <a:endParaRPr lang="en-US" sz="2800" dirty="0"/>
+          </a:p>
+        </p:txBody>
+      </p:sp>
+    </p:spTree>
+    <p:extLst>
+      <p:ext uri="{BB962C8B-B14F-4D97-AF65-F5344CB8AC3E}">
+        <p14:creationId xmlns:p14="http://schemas.microsoft.com/office/powerpoint/2010/main" val="2046146548"/>
+      </p:ext>
+    </p:extLst>
+  </p:cSld>
+  <p:clrMapOvr>
+    <a:masterClrMapping/>
+  </p:clrMapOvr>
+  <p:timing>
+    <p:tnLst>
+      <p:par>
+        <p:cTn id="1" dur="indefinite" restart="never" nodeType="tmRoot">
+          <p:childTnLst>
+            <p:seq concurrent="1" nextAc="seek">
+              <p:cTn id="2" dur="indefinite" nodeType="mainSeq">
+                <p:childTnLst>
+                  <p:par>
+                    <p:cTn id="3" fill="hold">
+                      <p:stCondLst>
+                        <p:cond delay="indefinite"/>
+                      </p:stCondLst>
+                      <p:childTnLst>
+                        <p:par>
+                          <p:cTn id="4" fill="hold">
+                            <p:stCondLst>
+                              <p:cond delay="0"/>
+                            </p:stCondLst>
+                            <p:childTnLst>
+                              <p:par>
+                                <p:cTn id="5" presetID="10" presetClass="entr" presetSubtype="0" fill="hold" nodeType="clickEffect">
+                                  <p:stCondLst>
+                                    <p:cond delay="0"/>
+                                  </p:stCondLst>
+                                  <p:childTnLst>
+                                    <p:set>
+                                      <p:cBhvr>
+                                        <p:cTn id="6" dur="1" fill="hold">
+                                          <p:stCondLst>
+                                            <p:cond delay="0"/>
+                                          </p:stCondLst>
+                                        </p:cTn>
+                                        <p:tgtEl>
+                                          <p:spTgt spid="3">
+                                            <p:txEl>
+                                              <p:pRg st="1" end="1"/>
+                                            </p:txEl>
+                                          </p:spTgt>
+                                        </p:tgtEl>
+                                        <p:attrNameLst>
+                                          <p:attrName>style.visibility</p:attrName>
+                                        </p:attrNameLst>
+                                      </p:cBhvr>
+                                      <p:to>
+                                        <p:strVal val="visible"/>
+                                      </p:to>
+                                    </p:set>
+                                    <p:animEffect transition="in" filter="fade">
+                                      <p:cBhvr>
+                                        <p:cTn id="7" dur="500"/>
+                                        <p:tgtEl>
+                                          <p:spTgt spid="3">
+                                            <p:txEl>
+                                              <p:pRg st="1" end="1"/>
+                                            </p:txEl>
+                                          </p:spTgt>
+                                        </p:tgtEl>
+                                      </p:cBhvr>
+                                    </p:animEffect>
+                                  </p:childTnLst>
+                                </p:cTn>
+                              </p:par>
+                            </p:childTnLst>
+                          </p:cTn>
+                        </p:par>
+                      </p:childTnLst>
+                    </p:cTn>
+                  </p:par>
+                  <p:par>
+                    <p:cTn id="8" fill="hold">
+                      <p:stCondLst>
+                        <p:cond delay="indefinite"/>
+                      </p:stCondLst>
+                      <p:childTnLst>
+                        <p:par>
+                          <p:cTn id="9" fill="hold">
+                            <p:stCondLst>
+                              <p:cond delay="0"/>
+                            </p:stCondLst>
+                            <p:childTnLst>
+                              <p:par>
+                                <p:cTn id="10" presetID="10" presetClass="entr" presetSubtype="0" fill="hold" nodeType="clickEffect">
+                                  <p:stCondLst>
+                                    <p:cond delay="0"/>
+                                  </p:stCondLst>
+                                  <p:childTnLst>
+                                    <p:set>
+                                      <p:cBhvr>
+                                        <p:cTn id="11" dur="1" fill="hold">
+                                          <p:stCondLst>
+                                            <p:cond delay="0"/>
+                                          </p:stCondLst>
+                                        </p:cTn>
+                                        <p:tgtEl>
+                                          <p:spTgt spid="3">
+                                            <p:txEl>
+                                              <p:pRg st="2" end="2"/>
+                                            </p:txEl>
+                                          </p:spTgt>
+                                        </p:tgtEl>
+                                        <p:attrNameLst>
+                                          <p:attrName>style.visibility</p:attrName>
+                                        </p:attrNameLst>
+                                      </p:cBhvr>
+                                      <p:to>
+                                        <p:strVal val="visible"/>
+                                      </p:to>
+                                    </p:set>
+                                    <p:animEffect transition="in" filter="fade">
+                                      <p:cBhvr>
+                                        <p:cTn id="12" dur="500"/>
+                                        <p:tgtEl>
+                                          <p:spTgt spid="3">
+                                            <p:txEl>
+                                              <p:pRg st="2" end="2"/>
+                                            </p:txEl>
+                                          </p:spTgt>
+                                        </p:tgtEl>
+                                      </p:cBhvr>
+                                    </p:animEffect>
+                                  </p:childTnLst>
+                                </p:cTn>
+                              </p:par>
+                              <p:par>
+                                <p:cTn id="13" presetID="10" presetClass="entr" presetSubtype="0" fill="hold" nodeType="withEffect">
+                                  <p:stCondLst>
+                                    <p:cond delay="0"/>
+                                  </p:stCondLst>
+                                  <p:childTnLst>
+                                    <p:set>
+                                      <p:cBhvr>
+                                        <p:cTn id="14" dur="1" fill="hold">
+                                          <p:stCondLst>
+                                            <p:cond delay="0"/>
+                                          </p:stCondLst>
+                                        </p:cTn>
+                                        <p:tgtEl>
+                                          <p:spTgt spid="3">
+                                            <p:txEl>
+                                              <p:pRg st="3" end="3"/>
+                                            </p:txEl>
+                                          </p:spTgt>
+                                        </p:tgtEl>
+                                        <p:attrNameLst>
+                                          <p:attrName>style.visibility</p:attrName>
+                                        </p:attrNameLst>
+                                      </p:cBhvr>
+                                      <p:to>
+                                        <p:strVal val="visible"/>
+                                      </p:to>
+                                    </p:set>
+                                    <p:animEffect transition="in" filter="fade">
+                                      <p:cBhvr>
+                                        <p:cTn id="15" dur="500"/>
+                                        <p:tgtEl>
+                                          <p:spTgt spid="3">
+                                            <p:txEl>
+                                              <p:pRg st="3" end="3"/>
+                                            </p:txEl>
+                                          </p:spTgt>
+                                        </p:tgtEl>
+                                      </p:cBhvr>
+                                    </p:animEffect>
+                                  </p:childTnLst>
+                                </p:cTn>
+                              </p:par>
+                            </p:childTnLst>
+                          </p:cTn>
+                        </p:par>
+                      </p:childTnLst>
+                    </p:cTn>
+                  </p:par>
+                  <p:par>
+                    <p:cTn id="16" fill="hold">
+                      <p:stCondLst>
+                        <p:cond delay="indefinite"/>
+                      </p:stCondLst>
+                      <p:childTnLst>
+                        <p:par>
+                          <p:cTn id="17" fill="hold">
+                            <p:stCondLst>
+                              <p:cond delay="0"/>
+                            </p:stCondLst>
+                            <p:childTnLst>
+                              <p:par>
+                                <p:cTn id="18" presetID="10" presetClass="entr" presetSubtype="0" fill="hold" nodeType="clickEffect">
+                                  <p:stCondLst>
+                                    <p:cond delay="0"/>
+                                  </p:stCondLst>
+                                  <p:childTnLst>
+                                    <p:set>
+                                      <p:cBhvr>
+                                        <p:cTn id="19" dur="1" fill="hold">
+                                          <p:stCondLst>
+                                            <p:cond delay="0"/>
+                                          </p:stCondLst>
+                                        </p:cTn>
+                                        <p:tgtEl>
+                                          <p:spTgt spid="3">
+                                            <p:txEl>
+                                              <p:pRg st="4" end="4"/>
+                                            </p:txEl>
+                                          </p:spTgt>
+                                        </p:tgtEl>
+                                        <p:attrNameLst>
+                                          <p:attrName>style.visibility</p:attrName>
+                                        </p:attrNameLst>
+                                      </p:cBhvr>
+                                      <p:to>
+                                        <p:strVal val="visible"/>
+                                      </p:to>
+                                    </p:set>
+                                    <p:animEffect transition="in" filter="fade">
+                                      <p:cBhvr>
+                                        <p:cTn id="20" dur="500"/>
+                                        <p:tgtEl>
+                                          <p:spTgt spid="3">
+                                            <p:txEl>
+                                              <p:pRg st="4" end="4"/>
+                                            </p:txEl>
+                                          </p:spTgt>
+                                        </p:tgtEl>
+                                      </p:cBhvr>
+                                    </p:animEffect>
+                                  </p:childTnLst>
+                                </p:cTn>
+                              </p:par>
+                            </p:childTnLst>
+                          </p:cTn>
+                        </p:par>
+                      </p:childTnLst>
+                    </p:cTn>
+                  </p:par>
+                  <p:par>
+                    <p:cTn id="21" fill="hold">
+                      <p:stCondLst>
+                        <p:cond delay="indefinite"/>
+                      </p:stCondLst>
+                      <p:childTnLst>
+                        <p:par>
+                          <p:cTn id="22" fill="hold">
+                            <p:stCondLst>
+                              <p:cond delay="0"/>
+                            </p:stCondLst>
+                            <p:childTnLst>
+                              <p:par>
+                                <p:cTn id="23" presetID="10" presetClass="entr" presetSubtype="0" fill="hold" nodeType="clickEffect">
+                                  <p:stCondLst>
+                                    <p:cond delay="0"/>
+                                  </p:stCondLst>
+                                  <p:childTnLst>
+                                    <p:set>
+                                      <p:cBhvr>
+                                        <p:cTn id="24" dur="1" fill="hold">
+                                          <p:stCondLst>
+                                            <p:cond delay="0"/>
+                                          </p:stCondLst>
+                                        </p:cTn>
+                                        <p:tgtEl>
+                                          <p:spTgt spid="3">
+                                            <p:txEl>
+                                              <p:pRg st="6" end="6"/>
+                                            </p:txEl>
+                                          </p:spTgt>
+                                        </p:tgtEl>
+                                        <p:attrNameLst>
+                                          <p:attrName>style.visibility</p:attrName>
+                                        </p:attrNameLst>
+                                      </p:cBhvr>
+                                      <p:to>
+                                        <p:strVal val="visible"/>
+                                      </p:to>
+                                    </p:set>
+                                    <p:animEffect transition="in" filter="fade">
+                                      <p:cBhvr>
+                                        <p:cTn id="25" dur="500"/>
+                                        <p:tgtEl>
+                                          <p:spTgt spid="3">
+                                            <p:txEl>
+                                              <p:pRg st="6" end="6"/>
+                                            </p:txEl>
+                                          </p:spTgt>
+                                        </p:tgtEl>
+                                      </p:cBhvr>
+                                    </p:animEffect>
+                                  </p:childTnLst>
+                                </p:cTn>
+                              </p:par>
+                            </p:childTnLst>
+                          </p:cTn>
+                        </p:par>
+                      </p:childTnLst>
+                    </p:cTn>
+                  </p:par>
+                  <p:par>
+                    <p:cTn id="26" fill="hold">
+                      <p:stCondLst>
+                        <p:cond delay="indefinite"/>
+                      </p:stCondLst>
+                      <p:childTnLst>
+                        <p:par>
+                          <p:cTn id="27" fill="hold">
+                            <p:stCondLst>
+                              <p:cond delay="0"/>
+                            </p:stCondLst>
+                            <p:childTnLst>
+                              <p:par>
+                                <p:cTn id="28" presetID="10" presetClass="entr" presetSubtype="0" fill="hold" nodeType="clickEffect">
+                                  <p:stCondLst>
+                                    <p:cond delay="0"/>
+                                  </p:stCondLst>
+                                  <p:childTnLst>
+                                    <p:set>
+                                      <p:cBhvr>
+                                        <p:cTn id="29" dur="1" fill="hold">
+                                          <p:stCondLst>
+                                            <p:cond delay="0"/>
+                                          </p:stCondLst>
+                                        </p:cTn>
+                                        <p:tgtEl>
+                                          <p:spTgt spid="3">
+                                            <p:txEl>
+                                              <p:pRg st="7" end="7"/>
+                                            </p:txEl>
+                                          </p:spTgt>
+                                        </p:tgtEl>
+                                        <p:attrNameLst>
+                                          <p:attrName>style.visibility</p:attrName>
+                                        </p:attrNameLst>
+                                      </p:cBhvr>
+                                      <p:to>
+                                        <p:strVal val="visible"/>
+                                      </p:to>
+                                    </p:set>
+                                    <p:animEffect transition="in" filter="fade">
+                                      <p:cBhvr>
+                                        <p:cTn id="30" dur="500"/>
+                                        <p:tgtEl>
+                                          <p:spTgt spid="3">
+                                            <p:txEl>
+                                              <p:pRg st="7" end="7"/>
+                                            </p:txEl>
+                                          </p:spTgt>
+                                        </p:tgtEl>
+                                      </p:cBhvr>
+                                    </p:animEffect>
+                                  </p:childTnLst>
+                                </p:cTn>
+                              </p:par>
+                            </p:childTnLst>
+                          </p:cTn>
+                        </p:par>
+                      </p:childTnLst>
+                    </p:cTn>
+                  </p:par>
+                  <p:par>
+                    <p:cTn id="31" fill="hold">
+                      <p:stCondLst>
+                        <p:cond delay="indefinite"/>
+                      </p:stCondLst>
+                      <p:childTnLst>
+                        <p:par>
+                          <p:cTn id="32" fill="hold">
+                            <p:stCondLst>
+                              <p:cond delay="0"/>
+                            </p:stCondLst>
+                            <p:childTnLst>
+                              <p:par>
+                                <p:cTn id="33" presetID="10" presetClass="entr" presetSubtype="0" fill="hold" nodeType="clickEffect">
+                                  <p:stCondLst>
+                                    <p:cond delay="0"/>
+                                  </p:stCondLst>
+                                  <p:childTnLst>
+                                    <p:set>
+                                      <p:cBhvr>
+                                        <p:cTn id="34" dur="1" fill="hold">
+                                          <p:stCondLst>
+                                            <p:cond delay="0"/>
+                                          </p:stCondLst>
+                                        </p:cTn>
+                                        <p:tgtEl>
+                                          <p:spTgt spid="3">
+                                            <p:txEl>
+                                              <p:pRg st="8" end="8"/>
+                                            </p:txEl>
+                                          </p:spTgt>
+                                        </p:tgtEl>
+                                        <p:attrNameLst>
+                                          <p:attrName>style.visibility</p:attrName>
+                                        </p:attrNameLst>
+                                      </p:cBhvr>
+                                      <p:to>
+                                        <p:strVal val="visible"/>
+                                      </p:to>
+                                    </p:set>
+                                    <p:animEffect transition="in" filter="fade">
+                                      <p:cBhvr>
+                                        <p:cTn id="35" dur="500"/>
+                                        <p:tgtEl>
+                                          <p:spTgt spid="3">
+                                            <p:txEl>
+                                              <p:pRg st="8" end="8"/>
+                                            </p:txEl>
+                                          </p:spTgt>
+                                        </p:tgtEl>
+                                      </p:cBhvr>
+                                    </p:animEffect>
+                                  </p:childTnLst>
+                                </p:cTn>
+                              </p:par>
+                            </p:childTnLst>
+                          </p:cTn>
+                        </p:par>
+                      </p:childTnLst>
+                    </p:cTn>
+                  </p:par>
+                </p:childTnLst>
+              </p:cTn>
+              <p:prevCondLst>
+                <p:cond evt="onPrev" delay="0">
+                  <p:tgtEl>
+                    <p:sldTgt/>
+                  </p:tgtEl>
+                </p:cond>
+              </p:prevCondLst>
+              <p:nextCondLst>
+                <p:cond evt="onNext" delay="0">
+                  <p:tgtEl>
+                    <p:sldTgt/>
+                  </p:tgtEl>
+                </p:cond>
+              </p:nextCondLst>
+            </p:seq>
+          </p:childTnLst>
+        </p:cTn>
+      </p:par>
+    </p:tnLst>
+  </p:timing>
+</p:sld>
+</file>
+
+<file path=ppt/slides/slide19.xml><?xml version="1.0" encoding="utf-8"?>
+<p:sld xmlns:a="http://schemas.openxmlformats.org/drawingml/2006/main" xmlns:r="http://schemas.openxmlformats.org/officeDocument/2006/relationships" xmlns:p="http://schemas.openxmlformats.org/presentationml/2006/main">
+  <p:cSld>
+    <p:spTree>
+      <p:nvGrpSpPr>
+        <p:cNvPr id="1" name=""/>
+        <p:cNvGrpSpPr/>
+        <p:nvPr/>
+      </p:nvGrpSpPr>
+      <p:grpSpPr>
+        <a:xfrm>
+          <a:off x="0" y="0"/>
+          <a:ext cx="0" cy="0"/>
+          <a:chOff x="0" y="0"/>
+          <a:chExt cx="0" cy="0"/>
+        </a:xfrm>
+      </p:grpSpPr>
+      <p:sp>
+        <p:nvSpPr>
+          <p:cNvPr id="2" name="Title 1">
+            <a:extLst>
+              <a:ext uri="{FF2B5EF4-FFF2-40B4-BE49-F238E27FC236}">
+                <a16:creationId xmlns:a16="http://schemas.microsoft.com/office/drawing/2014/main" id="{BCBE38F6-DAA1-1667-3FF4-4E1D08206654}"/>
+              </a:ext>
+            </a:extLst>
+          </p:cNvPr>
+          <p:cNvSpPr>
+            <a:spLocks noGrp="1"/>
+          </p:cNvSpPr>
+          <p:nvPr>
+            <p:ph type="title"/>
+          </p:nvPr>
+        </p:nvSpPr>
+        <p:spPr/>
+        <p:txBody>
+          <a:bodyPr/>
+          <a:lstStyle/>
+          <a:p>
+            <a:r>
+              <a:rPr lang="en-US" dirty="0"/>
+              <a:t>Markov Chain Monte Carlo</a:t>
+            </a:r>
+            <a:br>
+              <a:rPr lang="en-US" dirty="0"/>
+            </a:br>
+            <a:endParaRPr lang="en-US" dirty="0"/>
+          </a:p>
+        </p:txBody>
+      </p:sp>
+      <p:sp>
+        <p:nvSpPr>
+          <p:cNvPr id="3" name="Content Placeholder 2">
+            <a:extLst>
+              <a:ext uri="{FF2B5EF4-FFF2-40B4-BE49-F238E27FC236}">
+                <a16:creationId xmlns:a16="http://schemas.microsoft.com/office/drawing/2014/main" id="{08C2F53D-8FF3-13B4-1B4E-F3E49DD08E7E}"/>
+              </a:ext>
+            </a:extLst>
+          </p:cNvPr>
+          <p:cNvSpPr>
+            <a:spLocks noGrp="1"/>
+          </p:cNvSpPr>
+          <p:nvPr>
+            <p:ph idx="1"/>
+          </p:nvPr>
+        </p:nvSpPr>
+        <p:spPr/>
+        <p:txBody>
+          <a:bodyPr/>
+          <a:lstStyle/>
+          <a:p>
+            <a:endParaRPr lang="en-US"/>
+          </a:p>
+        </p:txBody>
+      </p:sp>
+      <p:pic>
+        <p:nvPicPr>
+          <p:cNvPr id="1026" name="Picture 2" descr="The Stata Blog » Introduction to Bayesian statistics, part 2: MCMC and the  Metropolis–Hastings algorithm">
+            <a:extLst>
+              <a:ext uri="{FF2B5EF4-FFF2-40B4-BE49-F238E27FC236}">
+                <a16:creationId xmlns:a16="http://schemas.microsoft.com/office/drawing/2014/main" id="{AFA6046B-9D4C-8D2E-3E91-7564C40C4B0C}"/>
+              </a:ext>
+            </a:extLst>
+          </p:cNvPr>
+          <p:cNvPicPr>
+            <a:picLocks noChangeAspect="1" noChangeArrowheads="1"/>
+          </p:cNvPicPr>
+          <p:nvPr/>
+        </p:nvPicPr>
+        <p:blipFill>
+          <a:blip r:embed="rId3">
+            <a:extLst>
+              <a:ext uri="{28A0092B-C50C-407E-A947-70E740481C1C}">
+                <a14:useLocalDpi xmlns:a14="http://schemas.microsoft.com/office/drawing/2010/main" val="0"/>
+              </a:ext>
+            </a:extLst>
+          </a:blip>
+          <a:srcRect/>
+          <a:stretch>
+            <a:fillRect/>
+          </a:stretch>
+        </p:blipFill>
+        <p:spPr bwMode="auto">
+          <a:xfrm>
+            <a:off x="1871663" y="1216148"/>
+            <a:ext cx="8922543" cy="5026366"/>
+          </a:xfrm>
+          <a:prstGeom prst="rect">
+            <a:avLst/>
+          </a:prstGeom>
+          <a:noFill/>
+          <a:extLst>
+            <a:ext uri="{909E8E84-426E-40DD-AFC4-6F175D3DCCD1}">
+              <a14:hiddenFill xmlns:a14="http://schemas.microsoft.com/office/drawing/2010/main">
+                <a:solidFill>
+                  <a:srgbClr val="FFFFFF"/>
+                </a:solidFill>
+              </a14:hiddenFill>
+            </a:ext>
+          </a:extLst>
+        </p:spPr>
+      </p:pic>
+      <p:sp>
+        <p:nvSpPr>
+          <p:cNvPr id="5" name="TextBox 4">
+            <a:extLst>
+              <a:ext uri="{FF2B5EF4-FFF2-40B4-BE49-F238E27FC236}">
+                <a16:creationId xmlns:a16="http://schemas.microsoft.com/office/drawing/2014/main" id="{A1EDFD81-06C3-0C55-DEFD-1177DE8DA0D2}"/>
+              </a:ext>
+            </a:extLst>
+          </p:cNvPr>
+          <p:cNvSpPr txBox="1"/>
+          <p:nvPr/>
+        </p:nvSpPr>
+        <p:spPr>
+          <a:xfrm>
+            <a:off x="0" y="6437181"/>
+            <a:ext cx="9934643" cy="369332"/>
+          </a:xfrm>
+          <a:prstGeom prst="rect">
+            <a:avLst/>
+          </a:prstGeom>
+          <a:noFill/>
+        </p:spPr>
+        <p:txBody>
+          <a:bodyPr wrap="none" rtlCol="0">
+            <a:spAutoFit/>
+          </a:bodyPr>
+          <a:lstStyle/>
+          <a:p>
+            <a:r>
+              <a:rPr lang="en-US" dirty="0">
+                <a:solidFill>
+                  <a:schemeClr val="bg1"/>
+                </a:solidFill>
+              </a:rPr>
+              <a:t>The Stata Blog, Introduction to Bayesian statistics, part 2: MCMC and the Metropolis–Hastings algorithm</a:t>
+            </a:r>
+          </a:p>
+        </p:txBody>
+      </p:sp>
+    </p:spTree>
+    <p:extLst>
+      <p:ext uri="{BB962C8B-B14F-4D97-AF65-F5344CB8AC3E}">
+        <p14:creationId xmlns:p14="http://schemas.microsoft.com/office/powerpoint/2010/main" val="3913042192"/>
+      </p:ext>
+    </p:extLst>
+  </p:cSld>
+  <p:clrMapOvr>
+    <a:masterClrMapping/>
+  </p:clrMapOvr>
+</p:sld>
+</file>
+
+<file path=ppt/slides/slide2.xml><?xml version="1.0" encoding="utf-8"?>
+<p:sld xmlns:a="http://schemas.openxmlformats.org/drawingml/2006/main" xmlns:r="http://schemas.openxmlformats.org/officeDocument/2006/relationships" xmlns:p="http://schemas.openxmlformats.org/presentationml/2006/main">
+  <p:cSld>
+    <p:spTree>
+      <p:nvGrpSpPr>
+        <p:cNvPr id="1" name=""/>
+        <p:cNvGrpSpPr/>
+        <p:nvPr/>
+      </p:nvGrpSpPr>
+      <p:grpSpPr>
+        <a:xfrm>
+          <a:off x="0" y="0"/>
+          <a:ext cx="0" cy="0"/>
+          <a:chOff x="0" y="0"/>
+          <a:chExt cx="0" cy="0"/>
+        </a:xfrm>
+      </p:grpSpPr>
+      <p:sp>
+        <p:nvSpPr>
+          <p:cNvPr id="2" name="Title 1">
+            <a:extLst>
+              <a:ext uri="{FF2B5EF4-FFF2-40B4-BE49-F238E27FC236}">
+                <a16:creationId xmlns:a16="http://schemas.microsoft.com/office/drawing/2014/main" id="{7E41E50D-7EFA-4CB5-92EC-A0ADE69CDF96}"/>
+              </a:ext>
+            </a:extLst>
+          </p:cNvPr>
+          <p:cNvSpPr>
+            <a:spLocks noGrp="1"/>
+          </p:cNvSpPr>
+          <p:nvPr>
+            <p:ph type="title"/>
+          </p:nvPr>
+        </p:nvSpPr>
+        <p:spPr/>
+        <p:txBody>
+          <a:bodyPr/>
+          <a:lstStyle/>
+          <a:p>
+            <a:r>
+              <a:rPr lang="en-US" dirty="0"/>
+              <a:t>Layout of lecture</a:t>
+            </a:r>
+          </a:p>
+        </p:txBody>
+      </p:sp>
+      <p:sp>
+        <p:nvSpPr>
+          <p:cNvPr id="3" name="Content Placeholder 2">
+            <a:extLst>
+              <a:ext uri="{FF2B5EF4-FFF2-40B4-BE49-F238E27FC236}">
+                <a16:creationId xmlns:a16="http://schemas.microsoft.com/office/drawing/2014/main" id="{5565E78A-76DF-48DD-A598-907793873C67}"/>
+              </a:ext>
+            </a:extLst>
+          </p:cNvPr>
+          <p:cNvSpPr>
+            <a:spLocks noGrp="1"/>
+          </p:cNvSpPr>
+          <p:nvPr>
+            <p:ph idx="1"/>
+          </p:nvPr>
+        </p:nvSpPr>
+        <p:spPr>
+          <a:xfrm>
+            <a:off x="1097280" y="1845734"/>
+            <a:ext cx="10058400" cy="4295986"/>
+          </a:xfrm>
+        </p:spPr>
+        <p:txBody>
+          <a:bodyPr>
+            <a:normAutofit/>
+          </a:bodyPr>
+          <a:lstStyle/>
+          <a:p>
+            <a:pPr>
+              <a:buFont typeface="Wingdings" panose="05000000000000000000" pitchFamily="2" charset="2"/>
+              <a:buChar char="v"/>
+            </a:pPr>
+            <a:r>
+              <a:rPr lang="en-US" sz="2400" dirty="0"/>
+              <a:t>What is Bayesian Modeling?</a:t>
+            </a:r>
+          </a:p>
+          <a:p>
+            <a:pPr>
+              <a:buFont typeface="Wingdings" panose="05000000000000000000" pitchFamily="2" charset="2"/>
+              <a:buChar char="v"/>
+            </a:pPr>
+            <a:r>
+              <a:rPr lang="en-US" sz="2400" dirty="0"/>
+              <a:t>Why do Bayesian Modeling?</a:t>
+            </a:r>
+          </a:p>
+          <a:p>
+            <a:pPr>
+              <a:buFont typeface="Wingdings" panose="05000000000000000000" pitchFamily="2" charset="2"/>
+              <a:buChar char="v"/>
+            </a:pPr>
+            <a:r>
+              <a:rPr lang="en-US" sz="2400" dirty="0"/>
+              <a:t>What is probabilistic programming?</a:t>
+            </a:r>
+          </a:p>
+          <a:p>
+            <a:pPr>
+              <a:buFont typeface="Wingdings" panose="05000000000000000000" pitchFamily="2" charset="2"/>
+              <a:buChar char="v"/>
+            </a:pPr>
+            <a:r>
+              <a:rPr lang="en-US" sz="2400" dirty="0"/>
+              <a:t>How do we do Bayesian modeling using probabilistic programming?</a:t>
+            </a:r>
+          </a:p>
+          <a:p>
+            <a:pPr lvl="1">
+              <a:buFont typeface="Wingdings" panose="05000000000000000000" pitchFamily="2" charset="2"/>
+              <a:buChar char="v"/>
+            </a:pPr>
+            <a:r>
+              <a:rPr lang="en-US" sz="2200" dirty="0"/>
+              <a:t>PyMC3</a:t>
+            </a:r>
+          </a:p>
+          <a:p>
+            <a:pPr marL="0" indent="0">
+              <a:buNone/>
+            </a:pPr>
+            <a:endParaRPr lang="en-US" sz="2400" dirty="0"/>
+          </a:p>
+          <a:p>
+            <a:pPr>
+              <a:buFont typeface="Wingdings" panose="05000000000000000000" pitchFamily="2" charset="2"/>
+              <a:buChar char="v"/>
+            </a:pPr>
+            <a:r>
+              <a:rPr lang="en-US" sz="2400" dirty="0"/>
+              <a:t>Interactive…building 3 different “models”</a:t>
+            </a:r>
+          </a:p>
+          <a:p>
+            <a:pPr>
+              <a:buFont typeface="Wingdings" panose="05000000000000000000" pitchFamily="2" charset="2"/>
+              <a:buChar char="v"/>
+            </a:pPr>
+            <a:r>
+              <a:rPr lang="en-US" sz="2400" dirty="0" err="1"/>
+              <a:t>Jupyter</a:t>
+            </a:r>
+            <a:r>
+              <a:rPr lang="en-US" sz="2400" dirty="0"/>
+              <a:t> notebooks</a:t>
+            </a:r>
+          </a:p>
+          <a:p>
+            <a:pPr lvl="1">
+              <a:buFont typeface="Wingdings" panose="05000000000000000000" pitchFamily="2" charset="2"/>
+              <a:buChar char="v"/>
+            </a:pPr>
+            <a:r>
+              <a:rPr lang="en-US" sz="2200" dirty="0"/>
+              <a:t>Locally or on google </a:t>
+            </a:r>
+            <a:r>
+              <a:rPr lang="en-US" sz="2200" dirty="0" err="1"/>
+              <a:t>colab</a:t>
+            </a:r>
+            <a:endParaRPr lang="en-US" sz="2200" dirty="0"/>
+          </a:p>
+        </p:txBody>
+      </p:sp>
+    </p:spTree>
+    <p:extLst>
+      <p:ext uri="{BB962C8B-B14F-4D97-AF65-F5344CB8AC3E}">
+        <p14:creationId xmlns:p14="http://schemas.microsoft.com/office/powerpoint/2010/main" val="383548447"/>
+      </p:ext>
+    </p:extLst>
+  </p:cSld>
+  <p:clrMapOvr>
+    <a:masterClrMapping/>
+  </p:clrMapOvr>
+  <p:timing>
+    <p:tnLst>
+      <p:par>
+        <p:cTn id="1" dur="indefinite" restart="never" nodeType="tmRoot">
+          <p:childTnLst>
+            <p:seq concurrent="1" nextAc="seek">
+              <p:cTn id="2" dur="indefinite" nodeType="mainSeq">
+                <p:childTnLst>
+                  <p:par>
+                    <p:cTn id="3" fill="hold">
+                      <p:stCondLst>
+                        <p:cond delay="indefinite"/>
+                      </p:stCondLst>
+                      <p:childTnLst>
+                        <p:par>
+                          <p:cTn id="4" fill="hold">
+                            <p:stCondLst>
+                              <p:cond delay="0"/>
+                            </p:stCondLst>
+                            <p:childTnLst>
+                              <p:par>
+                                <p:cTn id="5" presetID="10" presetClass="entr" presetSubtype="0" fill="hold" nodeType="clickEffect">
+                                  <p:stCondLst>
+                                    <p:cond delay="0"/>
+                                  </p:stCondLst>
+                                  <p:childTnLst>
+                                    <p:set>
+                                      <p:cBhvr>
+                                        <p:cTn id="6" dur="1" fill="hold">
+                                          <p:stCondLst>
+                                            <p:cond delay="0"/>
+                                          </p:stCondLst>
+                                        </p:cTn>
+                                        <p:tgtEl>
+                                          <p:spTgt spid="3">
+                                            <p:txEl>
+                                              <p:pRg st="0" end="0"/>
+                                            </p:txEl>
+                                          </p:spTgt>
+                                        </p:tgtEl>
+                                        <p:attrNameLst>
+                                          <p:attrName>style.visibility</p:attrName>
+                                        </p:attrNameLst>
+                                      </p:cBhvr>
+                                      <p:to>
+                                        <p:strVal val="visible"/>
+                                      </p:to>
+                                    </p:set>
+                                    <p:animEffect transition="in" filter="fade">
+                                      <p:cBhvr>
+                                        <p:cTn id="7" dur="500"/>
+                                        <p:tgtEl>
+                                          <p:spTgt spid="3">
+                                            <p:txEl>
+                                              <p:pRg st="0" end="0"/>
+                                            </p:txEl>
+                                          </p:spTgt>
+                                        </p:tgtEl>
+                                      </p:cBhvr>
+                                    </p:animEffect>
+                                  </p:childTnLst>
+                                </p:cTn>
+                              </p:par>
+                            </p:childTnLst>
+                          </p:cTn>
+                        </p:par>
+                      </p:childTnLst>
+                    </p:cTn>
+                  </p:par>
+                  <p:par>
+                    <p:cTn id="8" fill="hold">
+                      <p:stCondLst>
+                        <p:cond delay="indefinite"/>
+                      </p:stCondLst>
+                      <p:childTnLst>
+                        <p:par>
+                          <p:cTn id="9" fill="hold">
+                            <p:stCondLst>
+                              <p:cond delay="0"/>
+                            </p:stCondLst>
+                            <p:childTnLst>
+                              <p:par>
+                                <p:cTn id="10" presetID="10" presetClass="entr" presetSubtype="0" fill="hold" nodeType="clickEffect">
+                                  <p:stCondLst>
+                                    <p:cond delay="0"/>
+                                  </p:stCondLst>
+                                  <p:childTnLst>
+                                    <p:set>
+                                      <p:cBhvr>
+                                        <p:cTn id="11" dur="1" fill="hold">
+                                          <p:stCondLst>
+                                            <p:cond delay="0"/>
+                                          </p:stCondLst>
+                                        </p:cTn>
+                                        <p:tgtEl>
+                                          <p:spTgt spid="3">
+                                            <p:txEl>
+                                              <p:pRg st="1" end="1"/>
+                                            </p:txEl>
+                                          </p:spTgt>
+                                        </p:tgtEl>
+                                        <p:attrNameLst>
+                                          <p:attrName>style.visibility</p:attrName>
+                                        </p:attrNameLst>
+                                      </p:cBhvr>
+                                      <p:to>
+                                        <p:strVal val="visible"/>
+                                      </p:to>
+                                    </p:set>
+                                    <p:animEffect transition="in" filter="fade">
+                                      <p:cBhvr>
+                                        <p:cTn id="12" dur="500"/>
+                                        <p:tgtEl>
+                                          <p:spTgt spid="3">
+                                            <p:txEl>
+                                              <p:pRg st="1" end="1"/>
+                                            </p:txEl>
+                                          </p:spTgt>
+                                        </p:tgtEl>
+                                      </p:cBhvr>
+                                    </p:animEffect>
+                                  </p:childTnLst>
+                                </p:cTn>
+                              </p:par>
+                            </p:childTnLst>
+                          </p:cTn>
+                        </p:par>
+                      </p:childTnLst>
+                    </p:cTn>
+                  </p:par>
+                  <p:par>
+                    <p:cTn id="13" fill="hold">
+                      <p:stCondLst>
+                        <p:cond delay="indefinite"/>
+                      </p:stCondLst>
+                      <p:childTnLst>
+                        <p:par>
+                          <p:cTn id="14" fill="hold">
+                            <p:stCondLst>
+                              <p:cond delay="0"/>
+                            </p:stCondLst>
+                            <p:childTnLst>
+                              <p:par>
+                                <p:cTn id="15" presetID="10" presetClass="entr" presetSubtype="0" fill="hold" nodeType="clickEffect">
+                                  <p:stCondLst>
+                                    <p:cond delay="0"/>
+                                  </p:stCondLst>
+                                  <p:childTnLst>
+                                    <p:set>
+                                      <p:cBhvr>
+                                        <p:cTn id="16" dur="1" fill="hold">
+                                          <p:stCondLst>
+                                            <p:cond delay="0"/>
+                                          </p:stCondLst>
+                                        </p:cTn>
+                                        <p:tgtEl>
+                                          <p:spTgt spid="3">
+                                            <p:txEl>
+                                              <p:pRg st="2" end="2"/>
+                                            </p:txEl>
+                                          </p:spTgt>
+                                        </p:tgtEl>
+                                        <p:attrNameLst>
+                                          <p:attrName>style.visibility</p:attrName>
+                                        </p:attrNameLst>
+                                      </p:cBhvr>
+                                      <p:to>
+                                        <p:strVal val="visible"/>
+                                      </p:to>
+                                    </p:set>
+                                    <p:animEffect transition="in" filter="fade">
+                                      <p:cBhvr>
+                                        <p:cTn id="17" dur="500"/>
+                                        <p:tgtEl>
+                                          <p:spTgt spid="3">
+                                            <p:txEl>
+                                              <p:pRg st="2" end="2"/>
+                                            </p:txEl>
+                                          </p:spTgt>
+                                        </p:tgtEl>
+                                      </p:cBhvr>
+                                    </p:animEffect>
+                                  </p:childTnLst>
+                                </p:cTn>
+                              </p:par>
+                            </p:childTnLst>
+                          </p:cTn>
+                        </p:par>
+                      </p:childTnLst>
+                    </p:cTn>
+                  </p:par>
+                  <p:par>
+                    <p:cTn id="18" fill="hold">
+                      <p:stCondLst>
+                        <p:cond delay="indefinite"/>
+                      </p:stCondLst>
+                      <p:childTnLst>
+                        <p:par>
+                          <p:cTn id="19" fill="hold">
+                            <p:stCondLst>
+                              <p:cond delay="0"/>
+                            </p:stCondLst>
+                            <p:childTnLst>
+                              <p:par>
+                                <p:cTn id="20" presetID="10" presetClass="entr" presetSubtype="0" fill="hold" nodeType="clickEffect">
+                                  <p:stCondLst>
+                                    <p:cond delay="0"/>
+                                  </p:stCondLst>
+                                  <p:childTnLst>
+                                    <p:set>
+                                      <p:cBhvr>
+                                        <p:cTn id="21" dur="1" fill="hold">
+                                          <p:stCondLst>
+                                            <p:cond delay="0"/>
+                                          </p:stCondLst>
+                                        </p:cTn>
+                                        <p:tgtEl>
+                                          <p:spTgt spid="3">
+                                            <p:txEl>
+                                              <p:pRg st="3" end="3"/>
+                                            </p:txEl>
+                                          </p:spTgt>
+                                        </p:tgtEl>
+                                        <p:attrNameLst>
+                                          <p:attrName>style.visibility</p:attrName>
+                                        </p:attrNameLst>
+                                      </p:cBhvr>
+                                      <p:to>
+                                        <p:strVal val="visible"/>
+                                      </p:to>
+                                    </p:set>
+                                    <p:animEffect transition="in" filter="fade">
+                                      <p:cBhvr>
+                                        <p:cTn id="22" dur="500"/>
+                                        <p:tgtEl>
+                                          <p:spTgt spid="3">
+                                            <p:txEl>
+                                              <p:pRg st="3" end="3"/>
+                                            </p:txEl>
+                                          </p:spTgt>
+                                        </p:tgtEl>
+                                      </p:cBhvr>
+                                    </p:animEffect>
+                                  </p:childTnLst>
+                                </p:cTn>
+                              </p:par>
+                            </p:childTnLst>
+                          </p:cTn>
+                        </p:par>
+                      </p:childTnLst>
+                    </p:cTn>
+                  </p:par>
+                  <p:par>
+                    <p:cTn id="23" fill="hold">
+                      <p:stCondLst>
+                        <p:cond delay="indefinite"/>
+                      </p:stCondLst>
+                      <p:childTnLst>
+                        <p:par>
+                          <p:cTn id="24" fill="hold">
+                            <p:stCondLst>
+                              <p:cond delay="0"/>
+                            </p:stCondLst>
+                            <p:childTnLst>
+                              <p:par>
+                                <p:cTn id="25" presetID="10" presetClass="entr" presetSubtype="0" fill="hold" nodeType="clickEffect">
+                                  <p:stCondLst>
+                                    <p:cond delay="0"/>
+                                  </p:stCondLst>
+                                  <p:childTnLst>
+                                    <p:set>
+                                      <p:cBhvr>
+                                        <p:cTn id="26" dur="1" fill="hold">
+                                          <p:stCondLst>
+                                            <p:cond delay="0"/>
+                                          </p:stCondLst>
+                                        </p:cTn>
+                                        <p:tgtEl>
+                                          <p:spTgt spid="3">
+                                            <p:txEl>
+                                              <p:pRg st="4" end="4"/>
+                                            </p:txEl>
+                                          </p:spTgt>
+                                        </p:tgtEl>
+                                        <p:attrNameLst>
+                                          <p:attrName>style.visibility</p:attrName>
+                                        </p:attrNameLst>
+                                      </p:cBhvr>
+                                      <p:to>
+                                        <p:strVal val="visible"/>
+                                      </p:to>
+                                    </p:set>
+                                    <p:animEffect transition="in" filter="fade">
+                                      <p:cBhvr>
+                                        <p:cTn id="27" dur="500"/>
+                                        <p:tgtEl>
+                                          <p:spTgt spid="3">
+                                            <p:txEl>
+                                              <p:pRg st="4" end="4"/>
+                                            </p:txEl>
+                                          </p:spTgt>
+                                        </p:tgtEl>
+                                      </p:cBhvr>
+                                    </p:animEffect>
+                                  </p:childTnLst>
+                                </p:cTn>
+                              </p:par>
+                            </p:childTnLst>
+                          </p:cTn>
+                        </p:par>
+                      </p:childTnLst>
+                    </p:cTn>
+                  </p:par>
+                  <p:par>
+                    <p:cTn id="28" fill="hold">
+                      <p:stCondLst>
+                        <p:cond delay="indefinite"/>
+                      </p:stCondLst>
+                      <p:childTnLst>
+                        <p:par>
+                          <p:cTn id="29" fill="hold">
+                            <p:stCondLst>
+                              <p:cond delay="0"/>
+                            </p:stCondLst>
+                            <p:childTnLst>
+                              <p:par>
+                                <p:cTn id="30" presetID="10" presetClass="entr" presetSubtype="0" fill="hold" nodeType="clickEffect">
+                                  <p:stCondLst>
+                                    <p:cond delay="0"/>
+                                  </p:stCondLst>
+                                  <p:childTnLst>
+                                    <p:set>
+                                      <p:cBhvr>
+                                        <p:cTn id="31" dur="1" fill="hold">
+                                          <p:stCondLst>
+                                            <p:cond delay="0"/>
+                                          </p:stCondLst>
+                                        </p:cTn>
+                                        <p:tgtEl>
+                                          <p:spTgt spid="3">
+                                            <p:txEl>
+                                              <p:pRg st="6" end="6"/>
+                                            </p:txEl>
+                                          </p:spTgt>
+                                        </p:tgtEl>
+                                        <p:attrNameLst>
+                                          <p:attrName>style.visibility</p:attrName>
+                                        </p:attrNameLst>
+                                      </p:cBhvr>
+                                      <p:to>
+                                        <p:strVal val="visible"/>
+                                      </p:to>
+                                    </p:set>
+                                    <p:animEffect transition="in" filter="fade">
+                                      <p:cBhvr>
+                                        <p:cTn id="32" dur="500"/>
+                                        <p:tgtEl>
+                                          <p:spTgt spid="3">
+                                            <p:txEl>
+                                              <p:pRg st="6" end="6"/>
+                                            </p:txEl>
+                                          </p:spTgt>
+                                        </p:tgtEl>
+                                      </p:cBhvr>
+                                    </p:animEffect>
+                                  </p:childTnLst>
+                                </p:cTn>
+                              </p:par>
+                            </p:childTnLst>
+                          </p:cTn>
+                        </p:par>
+                      </p:childTnLst>
+                    </p:cTn>
+                  </p:par>
+                  <p:par>
+                    <p:cTn id="33" fill="hold">
+                      <p:stCondLst>
+                        <p:cond delay="indefinite"/>
+                      </p:stCondLst>
+                      <p:childTnLst>
+                        <p:par>
+                          <p:cTn id="34" fill="hold">
+                            <p:stCondLst>
+                              <p:cond delay="0"/>
+                            </p:stCondLst>
+                            <p:childTnLst>
+                              <p:par>
+                                <p:cTn id="35" presetID="10" presetClass="entr" presetSubtype="0" fill="hold" nodeType="clickEffect">
+                                  <p:stCondLst>
+                                    <p:cond delay="0"/>
+                                  </p:stCondLst>
+                                  <p:childTnLst>
+                                    <p:set>
+                                      <p:cBhvr>
+                                        <p:cTn id="36" dur="1" fill="hold">
+                                          <p:stCondLst>
+                                            <p:cond delay="0"/>
+                                          </p:stCondLst>
+                                        </p:cTn>
+                                        <p:tgtEl>
+                                          <p:spTgt spid="3">
+                                            <p:txEl>
+                                              <p:pRg st="7" end="7"/>
+                                            </p:txEl>
+                                          </p:spTgt>
+                                        </p:tgtEl>
+                                        <p:attrNameLst>
+                                          <p:attrName>style.visibility</p:attrName>
+                                        </p:attrNameLst>
+                                      </p:cBhvr>
+                                      <p:to>
+                                        <p:strVal val="visible"/>
+                                      </p:to>
+                                    </p:set>
+                                    <p:animEffect transition="in" filter="fade">
+                                      <p:cBhvr>
+                                        <p:cTn id="37" dur="500"/>
+                                        <p:tgtEl>
+                                          <p:spTgt spid="3">
+                                            <p:txEl>
+                                              <p:pRg st="7" end="7"/>
+                                            </p:txEl>
+                                          </p:spTgt>
+                                        </p:tgtEl>
+                                      </p:cBhvr>
+                                    </p:animEffect>
+                                  </p:childTnLst>
+                                </p:cTn>
+                              </p:par>
+                            </p:childTnLst>
+                          </p:cTn>
+                        </p:par>
+                      </p:childTnLst>
+                    </p:cTn>
+                  </p:par>
+                  <p:par>
+                    <p:cTn id="38" fill="hold">
+                      <p:stCondLst>
+                        <p:cond delay="indefinite"/>
+                      </p:stCondLst>
+                      <p:childTnLst>
+                        <p:par>
+                          <p:cTn id="39" fill="hold">
+                            <p:stCondLst>
+                              <p:cond delay="0"/>
+                            </p:stCondLst>
+                            <p:childTnLst>
+                              <p:par>
+                                <p:cTn id="40" presetID="10" presetClass="entr" presetSubtype="0" fill="hold" nodeType="clickEffect">
+                                  <p:stCondLst>
+                                    <p:cond delay="0"/>
+                                  </p:stCondLst>
+                                  <p:childTnLst>
+                                    <p:set>
+                                      <p:cBhvr>
+                                        <p:cTn id="41" dur="1" fill="hold">
+                                          <p:stCondLst>
+                                            <p:cond delay="0"/>
+                                          </p:stCondLst>
+                                        </p:cTn>
+                                        <p:tgtEl>
+                                          <p:spTgt spid="3">
+                                            <p:txEl>
+                                              <p:pRg st="8" end="8"/>
+                                            </p:txEl>
+                                          </p:spTgt>
+                                        </p:tgtEl>
+                                        <p:attrNameLst>
+                                          <p:attrName>style.visibility</p:attrName>
+                                        </p:attrNameLst>
+                                      </p:cBhvr>
+                                      <p:to>
+                                        <p:strVal val="visible"/>
+                                      </p:to>
+                                    </p:set>
+                                    <p:animEffect transition="in" filter="fade">
+                                      <p:cBhvr>
+                                        <p:cTn id="42" dur="500"/>
+                                        <p:tgtEl>
+                                          <p:spTgt spid="3">
+                                            <p:txEl>
+                                              <p:pRg st="8" end="8"/>
+                                            </p:txEl>
+                                          </p:spTgt>
+                                        </p:tgtEl>
+                                      </p:cBhvr>
+                                    </p:animEffect>
+                                  </p:childTnLst>
+                                </p:cTn>
+                              </p:par>
+                            </p:childTnLst>
+                          </p:cTn>
+                        </p:par>
+                      </p:childTnLst>
+                    </p:cTn>
+                  </p:par>
+                </p:childTnLst>
+              </p:cTn>
+              <p:prevCondLst>
+                <p:cond evt="onPrev" delay="0">
+                  <p:tgtEl>
+                    <p:sldTgt/>
+                  </p:tgtEl>
+                </p:cond>
+              </p:prevCondLst>
+              <p:nextCondLst>
+                <p:cond evt="onNext" delay="0">
+                  <p:tgtEl>
+                    <p:sldTgt/>
+                  </p:tgtEl>
+                </p:cond>
+              </p:nextCondLst>
+            </p:seq>
+          </p:childTnLst>
+        </p:cTn>
+      </p:par>
+    </p:tnLst>
+  </p:timing>
+</p:sld>
+</file>
+
+<file path=ppt/slides/slide20.xml><?xml version="1.0" encoding="utf-8"?>
+<p:sld xmlns:a="http://schemas.openxmlformats.org/drawingml/2006/main" xmlns:r="http://schemas.openxmlformats.org/officeDocument/2006/relationships" xmlns:p="http://schemas.openxmlformats.org/presentationml/2006/main">
+  <p:cSld>
+    <p:spTree>
+      <p:nvGrpSpPr>
+        <p:cNvPr id="1" name=""/>
+        <p:cNvGrpSpPr/>
+        <p:nvPr/>
+      </p:nvGrpSpPr>
+      <p:grpSpPr>
+        <a:xfrm>
+          <a:off x="0" y="0"/>
+          <a:ext cx="0" cy="0"/>
+          <a:chOff x="0" y="0"/>
+          <a:chExt cx="0" cy="0"/>
+        </a:xfrm>
+      </p:grpSpPr>
+      <p:pic>
+        <p:nvPicPr>
+          <p:cNvPr id="6" name="Online Media 5" title="Using the Random Walk Metropolis algorithm to sample from a cow surface distribution">
+            <a:hlinkClick r:id="" action="ppaction://media"/>
+            <a:extLst>
+              <a:ext uri="{FF2B5EF4-FFF2-40B4-BE49-F238E27FC236}">
+                <a16:creationId xmlns:a16="http://schemas.microsoft.com/office/drawing/2014/main" id="{6627FBC7-F81F-272D-9A02-5307F83B2C78}"/>
+              </a:ext>
+            </a:extLst>
+          </p:cNvPr>
+          <p:cNvPicPr>
+            <a:picLocks noGrp="1" noRot="1" noChangeAspect="1"/>
+          </p:cNvPicPr>
+          <p:nvPr>
+            <p:ph idx="1"/>
+            <a:videoFile r:link="rId1"/>
+          </p:nvPr>
+        </p:nvPicPr>
+        <p:blipFill>
+          <a:blip r:embed="rId3"/>
+          <a:stretch>
+            <a:fillRect/>
+          </a:stretch>
+        </p:blipFill>
+        <p:spPr>
+          <a:xfrm>
+            <a:off x="2711668" y="1351630"/>
+            <a:ext cx="6217921" cy="4662981"/>
+          </a:xfrm>
+          <a:prstGeom prst="rect">
+            <a:avLst/>
+          </a:prstGeom>
+        </p:spPr>
+      </p:pic>
+      <p:sp>
+        <p:nvSpPr>
+          <p:cNvPr id="8" name="Title 1">
+            <a:extLst>
+              <a:ext uri="{FF2B5EF4-FFF2-40B4-BE49-F238E27FC236}">
+                <a16:creationId xmlns:a16="http://schemas.microsoft.com/office/drawing/2014/main" id="{E18BF72D-DD4D-8AC7-FC0F-B3990827D3B8}"/>
+              </a:ext>
+            </a:extLst>
+          </p:cNvPr>
+          <p:cNvSpPr txBox="1">
+            <a:spLocks/>
+          </p:cNvSpPr>
+          <p:nvPr/>
+        </p:nvSpPr>
+        <p:spPr>
+          <a:xfrm>
+            <a:off x="1249680" y="439003"/>
+            <a:ext cx="10058400" cy="1450757"/>
+          </a:xfrm>
+          <a:prstGeom prst="rect">
+            <a:avLst/>
+          </a:prstGeom>
+        </p:spPr>
+        <p:txBody>
+          <a:bodyPr vert="horz" lIns="91440" tIns="45720" rIns="91440" bIns="45720" rtlCol="0" anchor="b">
+            <a:normAutofit/>
+          </a:bodyPr>
+          <a:lstStyle>
+            <a:lvl1pPr marL="0" algn="l" defTabSz="914400" rtl="0" eaLnBrk="1" latinLnBrk="0" hangingPunct="1">
+              <a:lnSpc>
+                <a:spcPct val="85000"/>
+              </a:lnSpc>
+              <a:spcBef>
+                <a:spcPct val="0"/>
+              </a:spcBef>
+              <a:buNone/>
+              <a:defRPr sz="4800" kern="1200" spc="-50" baseline="0">
+                <a:solidFill>
+                  <a:schemeClr val="tx1">
+                    <a:lumMod val="75000"/>
+                    <a:lumOff val="25000"/>
+                  </a:schemeClr>
+                </a:solidFill>
+                <a:latin typeface="+mj-lt"/>
+                <a:ea typeface="+mj-ea"/>
+                <a:cs typeface="+mj-cs"/>
+              </a:defRPr>
+            </a:lvl1pPr>
+          </a:lstStyle>
+          <a:p>
+            <a:r>
+              <a:rPr lang="en-US"/>
+              <a:t>Markov Chain Monte Carlo</a:t>
+            </a:r>
+            <a:br>
+              <a:rPr lang="en-US"/>
+            </a:br>
+            <a:endParaRPr lang="en-US" dirty="0"/>
+          </a:p>
+        </p:txBody>
+      </p:sp>
+    </p:spTree>
+    <p:extLst>
+      <p:ext uri="{BB962C8B-B14F-4D97-AF65-F5344CB8AC3E}">
+        <p14:creationId xmlns:p14="http://schemas.microsoft.com/office/powerpoint/2010/main" val="3954819104"/>
+      </p:ext>
+    </p:extLst>
+  </p:cSld>
+  <p:clrMapOvr>
+    <a:masterClrMapping/>
+  </p:clrMapOvr>
+  <p:timing>
+    <p:tnLst>
+      <p:par>
+        <p:cTn id="1" dur="indefinite" restart="never" nodeType="tmRoot">
+          <p:childTnLst>
+            <p:seq concurrent="1" nextAc="seek">
+              <p:cTn id="2" dur="indefinite" nodeType="mainSeq">
+                <p:childTnLst>
+                  <p:par>
+                    <p:cTn id="3" fill="hold">
+                      <p:stCondLst>
+                        <p:cond delay="indefinite"/>
+                      </p:stCondLst>
+                      <p:childTnLst>
+                        <p:par>
+                          <p:cTn id="4" fill="hold">
+                            <p:stCondLst>
+                              <p:cond delay="0"/>
+                            </p:stCondLst>
+                            <p:childTnLst>
+                              <p:par>
+                                <p:cTn id="5" presetID="1" presetClass="mediacall" presetSubtype="0" fill="hold" nodeType="clickEffect">
+                                  <p:stCondLst>
+                                    <p:cond delay="0"/>
+                                  </p:stCondLst>
+                                  <p:childTnLst>
+                                    <p:cmd type="call" cmd="playFrom(0.0)">
+                                      <p:cBhvr>
+                                        <p:cTn id="6" dur="1" fill="hold"/>
+                                        <p:tgtEl>
+                                          <p:spTgt spid="6"/>
+                                        </p:tgtEl>
+                                      </p:cBhvr>
+                                    </p:cmd>
+                                  </p:childTnLst>
+                                </p:cTn>
+                              </p:par>
+                            </p:childTnLst>
+                          </p:cTn>
+                        </p:par>
+                      </p:childTnLst>
+                    </p:cTn>
+                  </p:par>
+                </p:childTnLst>
+              </p:cTn>
+              <p:prevCondLst>
+                <p:cond evt="onPrev" delay="0">
+                  <p:tgtEl>
+                    <p:sldTgt/>
+                  </p:tgtEl>
+                </p:cond>
+              </p:prevCondLst>
+              <p:nextCondLst>
+                <p:cond evt="onNext" delay="0">
+                  <p:tgtEl>
+                    <p:sldTgt/>
+                  </p:tgtEl>
+                </p:cond>
+              </p:nextCondLst>
+            </p:seq>
+            <p:video>
+              <p:cMediaNode vol="80000">
+                <p:cTn id="7" fill="hold" display="0">
+                  <p:stCondLst>
+                    <p:cond delay="indefinite"/>
+                  </p:stCondLst>
+                </p:cTn>
+                <p:tgtEl>
+                  <p:spTgt spid="6"/>
+                </p:tgtEl>
+              </p:cMediaNode>
+            </p:video>
+            <p:seq concurrent="1" nextAc="seek">
+              <p:cTn id="8" restart="whenNotActive" fill="hold" evtFilter="cancelBubble" nodeType="interactiveSeq">
+                <p:stCondLst>
+                  <p:cond evt="onClick" delay="0">
+                    <p:tgtEl>
+                      <p:spTgt spid="6"/>
+                    </p:tgtEl>
+                  </p:cond>
+                </p:stCondLst>
+                <p:endSync evt="end" delay="0">
+                  <p:rtn val="all"/>
+                </p:endSync>
+                <p:childTnLst>
+                  <p:par>
+                    <p:cTn id="9" fill="hold">
+                      <p:stCondLst>
+                        <p:cond delay="0"/>
+                      </p:stCondLst>
+                      <p:childTnLst>
+                        <p:par>
+                          <p:cTn id="10" fill="hold">
+                            <p:stCondLst>
+                              <p:cond delay="0"/>
+                            </p:stCondLst>
+                            <p:childTnLst>
+                              <p:par>
+                                <p:cTn id="11" presetID="2" presetClass="mediacall" presetSubtype="0" fill="hold" nodeType="clickEffect">
+                                  <p:stCondLst>
+                                    <p:cond delay="0"/>
+                                  </p:stCondLst>
+                                  <p:childTnLst>
+                                    <p:cmd type="call" cmd="togglePause">
+                                      <p:cBhvr>
+                                        <p:cTn id="12" dur="1" fill="hold"/>
+                                        <p:tgtEl>
+                                          <p:spTgt spid="6"/>
+                                        </p:tgtEl>
+                                      </p:cBhvr>
+                                    </p:cmd>
+                                  </p:childTnLst>
+                                </p:cTn>
+                              </p:par>
+                            </p:childTnLst>
+                          </p:cTn>
+                        </p:par>
+                      </p:childTnLst>
+                    </p:cTn>
+                  </p:par>
+                </p:childTnLst>
+              </p:cTn>
+              <p:nextCondLst>
+                <p:cond evt="onClick" delay="0">
+                  <p:tgtEl>
+                    <p:spTgt spid="6"/>
+                  </p:tgtEl>
+                </p:cond>
+              </p:nextCondLst>
+            </p:seq>
+          </p:childTnLst>
+        </p:cTn>
+      </p:par>
+    </p:tnLst>
+  </p:timing>
+</p:sld>
+</file>
+
+<file path=ppt/slides/slide21.xml><?xml version="1.0" encoding="utf-8"?>
+<p:sld xmlns:a="http://schemas.openxmlformats.org/drawingml/2006/main" xmlns:r="http://schemas.openxmlformats.org/officeDocument/2006/relationships" xmlns:p="http://schemas.openxmlformats.org/presentationml/2006/main">
+  <p:cSld>
+    <p:spTree>
+      <p:nvGrpSpPr>
+        <p:cNvPr id="1" name=""/>
+        <p:cNvGrpSpPr/>
+        <p:nvPr/>
+      </p:nvGrpSpPr>
+      <p:grpSpPr>
+        <a:xfrm>
+          <a:off x="0" y="0"/>
+          <a:ext cx="0" cy="0"/>
+          <a:chOff x="0" y="0"/>
+          <a:chExt cx="0" cy="0"/>
+        </a:xfrm>
+      </p:grpSpPr>
+      <p:sp>
+        <p:nvSpPr>
+          <p:cNvPr id="2" name="Title 1">
+            <a:extLst>
+              <a:ext uri="{FF2B5EF4-FFF2-40B4-BE49-F238E27FC236}">
+                <a16:creationId xmlns:a16="http://schemas.microsoft.com/office/drawing/2014/main" id="{8139AD7A-3345-DE05-BABF-7A1E58AE4ED0}"/>
+              </a:ext>
+            </a:extLst>
+          </p:cNvPr>
+          <p:cNvSpPr>
+            <a:spLocks noGrp="1"/>
+          </p:cNvSpPr>
+          <p:nvPr>
+            <p:ph type="title"/>
+          </p:nvPr>
+        </p:nvSpPr>
+        <p:spPr/>
+        <p:txBody>
+          <a:bodyPr/>
+          <a:lstStyle/>
+          <a:p>
+            <a:r>
+              <a:rPr lang="en-US" dirty="0"/>
+              <a:t>Variational Inference</a:t>
+            </a:r>
+          </a:p>
+        </p:txBody>
+      </p:sp>
+      <p:sp>
+        <p:nvSpPr>
+          <p:cNvPr id="3" name="Content Placeholder 2">
+            <a:extLst>
+              <a:ext uri="{FF2B5EF4-FFF2-40B4-BE49-F238E27FC236}">
+                <a16:creationId xmlns:a16="http://schemas.microsoft.com/office/drawing/2014/main" id="{0EAF131F-219A-71FE-76B3-BBDA85073398}"/>
+              </a:ext>
+            </a:extLst>
+          </p:cNvPr>
+          <p:cNvSpPr>
+            <a:spLocks noGrp="1"/>
+          </p:cNvSpPr>
+          <p:nvPr>
+            <p:ph idx="1"/>
+          </p:nvPr>
+        </p:nvSpPr>
+        <p:spPr/>
+        <p:txBody>
+          <a:bodyPr/>
+          <a:lstStyle/>
+          <a:p>
+            <a:endParaRPr lang="en-US"/>
+          </a:p>
+        </p:txBody>
+      </p:sp>
+      <p:pic>
+        <p:nvPicPr>
+          <p:cNvPr id="5" name="Picture 4">
+            <a:extLst>
+              <a:ext uri="{FF2B5EF4-FFF2-40B4-BE49-F238E27FC236}">
+                <a16:creationId xmlns:a16="http://schemas.microsoft.com/office/drawing/2014/main" id="{803D4E26-9695-B964-672E-3317ED531477}"/>
+              </a:ext>
+            </a:extLst>
+          </p:cNvPr>
+          <p:cNvPicPr>
+            <a:picLocks noChangeAspect="1"/>
+          </p:cNvPicPr>
+          <p:nvPr/>
+        </p:nvPicPr>
+        <p:blipFill>
+          <a:blip r:embed="rId2"/>
+          <a:stretch>
+            <a:fillRect/>
+          </a:stretch>
+        </p:blipFill>
+        <p:spPr>
+          <a:xfrm>
+            <a:off x="2891573" y="1772395"/>
+            <a:ext cx="6469813" cy="4344659"/>
+          </a:xfrm>
+          <a:prstGeom prst="rect">
+            <a:avLst/>
+          </a:prstGeom>
+        </p:spPr>
+      </p:pic>
+      <p:sp>
+        <p:nvSpPr>
+          <p:cNvPr id="6" name="TextBox 5">
+            <a:extLst>
+              <a:ext uri="{FF2B5EF4-FFF2-40B4-BE49-F238E27FC236}">
+                <a16:creationId xmlns:a16="http://schemas.microsoft.com/office/drawing/2014/main" id="{CF8E5312-5531-E39F-6D19-EC500BD40A82}"/>
+              </a:ext>
+            </a:extLst>
+          </p:cNvPr>
+          <p:cNvSpPr txBox="1"/>
+          <p:nvPr/>
+        </p:nvSpPr>
+        <p:spPr>
+          <a:xfrm>
+            <a:off x="0" y="6437181"/>
+            <a:ext cx="4526688" cy="369332"/>
+          </a:xfrm>
+          <a:prstGeom prst="rect">
+            <a:avLst/>
+          </a:prstGeom>
+          <a:noFill/>
+        </p:spPr>
+        <p:txBody>
+          <a:bodyPr wrap="none" rtlCol="0">
+            <a:spAutoFit/>
+          </a:bodyPr>
+          <a:lstStyle/>
+          <a:p>
+            <a:r>
+              <a:rPr lang="en-US" dirty="0">
+                <a:solidFill>
+                  <a:schemeClr val="bg1"/>
+                </a:solidFill>
+              </a:rPr>
+              <a:t>Bishop 2006, Chap. 10, Approximate Inference</a:t>
+            </a:r>
+          </a:p>
+        </p:txBody>
+      </p:sp>
+    </p:spTree>
+    <p:extLst>
+      <p:ext uri="{BB962C8B-B14F-4D97-AF65-F5344CB8AC3E}">
+        <p14:creationId xmlns:p14="http://schemas.microsoft.com/office/powerpoint/2010/main" val="3881790934"/>
+      </p:ext>
+    </p:extLst>
+  </p:cSld>
+  <p:clrMapOvr>
+    <a:masterClrMapping/>
+  </p:clrMapOvr>
+</p:sld>
+</file>
+
+<file path=ppt/slides/slide22.xml><?xml version="1.0" encoding="utf-8"?>
+<p:sld xmlns:a="http://schemas.openxmlformats.org/drawingml/2006/main" xmlns:r="http://schemas.openxmlformats.org/officeDocument/2006/relationships" xmlns:p="http://schemas.openxmlformats.org/presentationml/2006/main">
+  <p:cSld>
+    <p:spTree>
+      <p:nvGrpSpPr>
+        <p:cNvPr id="1" name=""/>
+        <p:cNvGrpSpPr/>
+        <p:nvPr/>
+      </p:nvGrpSpPr>
+      <p:grpSpPr>
+        <a:xfrm>
+          <a:off x="0" y="0"/>
+          <a:ext cx="0" cy="0"/>
+          <a:chOff x="0" y="0"/>
+          <a:chExt cx="0" cy="0"/>
+        </a:xfrm>
+      </p:grpSpPr>
+      <p:sp>
+        <p:nvSpPr>
+          <p:cNvPr id="2" name="Title 1">
+            <a:extLst>
+              <a:ext uri="{FF2B5EF4-FFF2-40B4-BE49-F238E27FC236}">
+                <a16:creationId xmlns:a16="http://schemas.microsoft.com/office/drawing/2014/main" id="{5DB1AAA0-3B00-9CF3-944C-509C2F233932}"/>
+              </a:ext>
+            </a:extLst>
+          </p:cNvPr>
+          <p:cNvSpPr>
+            <a:spLocks noGrp="1"/>
+          </p:cNvSpPr>
+          <p:nvPr>
+            <p:ph type="title"/>
+          </p:nvPr>
+        </p:nvSpPr>
+        <p:spPr/>
+        <p:txBody>
+          <a:bodyPr/>
+          <a:lstStyle/>
+          <a:p>
+            <a:r>
+              <a:rPr lang="en-US" dirty="0"/>
+              <a:t>Back to models!!</a:t>
+            </a:r>
+          </a:p>
+        </p:txBody>
+      </p:sp>
+      <p:sp>
+        <p:nvSpPr>
+          <p:cNvPr id="3" name="Content Placeholder 2">
+            <a:extLst>
+              <a:ext uri="{FF2B5EF4-FFF2-40B4-BE49-F238E27FC236}">
+                <a16:creationId xmlns:a16="http://schemas.microsoft.com/office/drawing/2014/main" id="{2023EE92-98E1-9DF8-A6FD-0553E360FA20}"/>
+              </a:ext>
+            </a:extLst>
+          </p:cNvPr>
+          <p:cNvSpPr>
+            <a:spLocks noGrp="1"/>
+          </p:cNvSpPr>
+          <p:nvPr>
+            <p:ph idx="1"/>
+          </p:nvPr>
+        </p:nvSpPr>
+        <p:spPr/>
+        <p:txBody>
+          <a:bodyPr/>
+          <a:lstStyle/>
+          <a:p>
+            <a:endParaRPr lang="en-US"/>
+          </a:p>
+        </p:txBody>
+      </p:sp>
+    </p:spTree>
+    <p:extLst>
+      <p:ext uri="{BB962C8B-B14F-4D97-AF65-F5344CB8AC3E}">
+        <p14:creationId xmlns:p14="http://schemas.microsoft.com/office/powerpoint/2010/main" val="2334350954"/>
+      </p:ext>
+    </p:extLst>
+  </p:cSld>
+  <p:clrMapOvr>
+    <a:masterClrMapping/>
+  </p:clrMapOvr>
+</p:sld>
+</file>
+
+<file path=ppt/slides/slide23.xml><?xml version="1.0" encoding="utf-8"?>
 <p:sld xmlns:a="http://schemas.openxmlformats.org/drawingml/2006/main" xmlns:r="http://schemas.openxmlformats.org/officeDocument/2006/relationships" xmlns:p="http://schemas.openxmlformats.org/presentationml/2006/main">
   <p:cSld>
     <p:bg>
@@ -13359,7 +15564,7 @@
 </p:sld>
 </file>
 
-<file path=ppt/slides/slide17.xml><?xml version="1.0" encoding="utf-8"?>
+<file path=ppt/slides/slide24.xml><?xml version="1.0" encoding="utf-8"?>
 <p:sld xmlns:a="http://schemas.openxmlformats.org/drawingml/2006/main" xmlns:r="http://schemas.openxmlformats.org/officeDocument/2006/relationships" xmlns:p="http://schemas.openxmlformats.org/presentationml/2006/main">
   <p:cSld>
     <p:spTree>
@@ -14202,7 +16407,7 @@
 </p:sld>
 </file>
 
-<file path=ppt/slides/slide18.xml><?xml version="1.0" encoding="utf-8"?>
+<file path=ppt/slides/slide25.xml><?xml version="1.0" encoding="utf-8"?>
 <p:sld xmlns:a="http://schemas.openxmlformats.org/drawingml/2006/main" xmlns:r="http://schemas.openxmlformats.org/officeDocument/2006/relationships" xmlns:p="http://schemas.openxmlformats.org/presentationml/2006/main">
   <p:cSld>
     <p:spTree>
@@ -14598,7 +16803,7 @@
 </p:sld>
 </file>
 
-<file path=ppt/slides/slide19.xml><?xml version="1.0" encoding="utf-8"?>
+<file path=ppt/slides/slide26.xml><?xml version="1.0" encoding="utf-8"?>
 <p:sld xmlns:a="http://schemas.openxmlformats.org/drawingml/2006/main" xmlns:r="http://schemas.openxmlformats.org/officeDocument/2006/relationships" xmlns:p="http://schemas.openxmlformats.org/presentationml/2006/main">
   <p:cSld>
     <p:spTree>
@@ -14620,7 +16825,7 @@
           <p:cNvPr id="2" name="Title 1">
             <a:extLst>
               <a:ext uri="{FF2B5EF4-FFF2-40B4-BE49-F238E27FC236}">
-                <a16:creationId xmlns:a16="http://schemas.microsoft.com/office/drawing/2014/main" id="{966CEFF8-EB9A-41C2-9220-5A83B2413261}"/>
+                <a16:creationId xmlns:a16="http://schemas.microsoft.com/office/drawing/2014/main" id="{FBA0DFB4-E6FD-C9CC-D8D4-B157C950AC0A}"/>
               </a:ext>
             </a:extLst>
           </p:cNvPr>
@@ -14631,107 +16836,73 @@
             <p:ph type="title"/>
           </p:nvPr>
         </p:nvSpPr>
-        <p:spPr>
-          <a:xfrm>
-            <a:off x="1097280" y="286603"/>
-            <a:ext cx="5151120" cy="1450757"/>
-          </a:xfrm>
-        </p:spPr>
+        <p:spPr/>
         <p:txBody>
           <a:bodyPr/>
           <a:lstStyle/>
           <a:p>
             <a:r>
               <a:rPr lang="en-US" dirty="0"/>
-              <a:t>Bayesian Changepoint Model</a:t>
+              <a:t>What else can we do?</a:t>
             </a:r>
           </a:p>
         </p:txBody>
       </p:sp>
-      <p:pic>
-        <p:nvPicPr>
-          <p:cNvPr id="6146" name="Picture 2">
+      <p:sp>
+        <p:nvSpPr>
+          <p:cNvPr id="3" name="Content Placeholder 2">
             <a:extLst>
               <a:ext uri="{FF2B5EF4-FFF2-40B4-BE49-F238E27FC236}">
-                <a16:creationId xmlns:a16="http://schemas.microsoft.com/office/drawing/2014/main" id="{CF50D25E-67F8-4E39-8973-C1D1BACB4FEE}"/>
+                <a16:creationId xmlns:a16="http://schemas.microsoft.com/office/drawing/2014/main" id="{0E71C956-C0B2-709B-6DBF-823555D1D1B9}"/>
               </a:ext>
             </a:extLst>
           </p:cNvPr>
-          <p:cNvPicPr>
-            <a:picLocks noChangeAspect="1" noChangeArrowheads="1"/>
-          </p:cNvPicPr>
-          <p:nvPr/>
-        </p:nvPicPr>
-        <p:blipFill>
-          <a:blip r:embed="rId3">
-            <a:extLst>
-              <a:ext uri="{28A0092B-C50C-407E-A947-70E740481C1C}">
-                <a14:useLocalDpi xmlns:a14="http://schemas.microsoft.com/office/drawing/2010/main" val="0"/>
-              </a:ext>
-            </a:extLst>
-          </a:blip>
-          <a:srcRect/>
-          <a:stretch>
-            <a:fillRect/>
-          </a:stretch>
-        </p:blipFill>
-        <p:spPr bwMode="auto">
-          <a:xfrm>
-            <a:off x="350520" y="2263139"/>
-            <a:ext cx="5417820" cy="3775183"/>
-          </a:xfrm>
-          <a:prstGeom prst="rect">
-            <a:avLst/>
-          </a:prstGeom>
-          <a:noFill/>
-          <a:extLst>
-            <a:ext uri="{909E8E84-426E-40DD-AFC4-6F175D3DCCD1}">
-              <a14:hiddenFill xmlns:a14="http://schemas.microsoft.com/office/drawing/2010/main">
-                <a:solidFill>
-                  <a:srgbClr val="FFFFFF"/>
-                </a:solidFill>
-              </a14:hiddenFill>
-            </a:ext>
-          </a:extLst>
-        </p:spPr>
-      </p:pic>
-      <p:cxnSp>
-        <p:nvCxnSpPr>
-          <p:cNvPr id="5" name="Straight Connector 4">
-            <a:extLst>
-              <a:ext uri="{FF2B5EF4-FFF2-40B4-BE49-F238E27FC236}">
-                <a16:creationId xmlns:a16="http://schemas.microsoft.com/office/drawing/2014/main" id="{AE73A9FC-C1B9-4BD3-8EA0-1FB392C7661B}"/>
-              </a:ext>
-            </a:extLst>
-          </p:cNvPr>
-          <p:cNvCxnSpPr/>
-          <p:nvPr/>
-        </p:nvCxnSpPr>
-        <p:spPr>
-          <a:xfrm>
-            <a:off x="2689860" y="2545080"/>
-            <a:ext cx="0" cy="2834640"/>
-          </a:xfrm>
-          <a:prstGeom prst="line">
-            <a:avLst/>
-          </a:prstGeom>
-          <a:ln w="76200"/>
-        </p:spPr>
-        <p:style>
-          <a:lnRef idx="1">
-            <a:schemeClr val="dk1"/>
-          </a:lnRef>
-          <a:fillRef idx="0">
-            <a:schemeClr val="dk1"/>
-          </a:fillRef>
-          <a:effectRef idx="0">
-            <a:schemeClr val="dk1"/>
-          </a:effectRef>
-          <a:fontRef idx="minor">
-            <a:schemeClr val="tx1"/>
-          </a:fontRef>
-        </p:style>
-      </p:cxnSp>
+          <p:cNvSpPr>
+            <a:spLocks noGrp="1"/>
+          </p:cNvSpPr>
+          <p:nvPr>
+            <p:ph idx="1"/>
+          </p:nvPr>
+        </p:nvSpPr>
+        <p:spPr/>
+        <p:txBody>
+          <a:bodyPr/>
+          <a:lstStyle/>
+          <a:p>
+            <a:endParaRPr lang="en-US"/>
+          </a:p>
+        </p:txBody>
+      </p:sp>
+    </p:spTree>
+    <p:extLst>
+      <p:ext uri="{BB962C8B-B14F-4D97-AF65-F5344CB8AC3E}">
+        <p14:creationId xmlns:p14="http://schemas.microsoft.com/office/powerpoint/2010/main" val="1824993937"/>
+      </p:ext>
+    </p:extLst>
+  </p:cSld>
+  <p:clrMapOvr>
+    <a:masterClrMapping/>
+  </p:clrMapOvr>
+</p:sld>
+</file>
+
+<file path=ppt/slides/slide27.xml><?xml version="1.0" encoding="utf-8"?>
+<p:sld xmlns:a="http://schemas.openxmlformats.org/drawingml/2006/main" xmlns:r="http://schemas.openxmlformats.org/officeDocument/2006/relationships" xmlns:p="http://schemas.openxmlformats.org/presentationml/2006/main">
+  <p:cSld>
+    <p:spTree>
+      <p:nvGrpSpPr>
+        <p:cNvPr id="1" name=""/>
+        <p:cNvGrpSpPr/>
+        <p:nvPr/>
+      </p:nvGrpSpPr>
+      <p:grpSpPr>
+        <a:xfrm>
+          <a:off x="0" y="0"/>
+          <a:ext cx="0" cy="0"/>
+          <a:chOff x="0" y="0"/>
+          <a:chExt cx="0" cy="0"/>
+        </a:xfrm>
+      </p:grpSpPr>
       <p:sp>
         <p:nvSpPr>
           <p:cNvPr id="7" name="Content Placeholder 2">
@@ -14883,7 +17054,7 @@
             </a:pPr>
             <a:r>
               <a:rPr lang="en-US" sz="2200" dirty="0"/>
-              <a:t>Binomial? Poisson?</a:t>
+              <a:t>Binomial? Poisson? Negative Binomial?</a:t>
             </a:r>
           </a:p>
           <a:p>
@@ -14893,7 +17064,7 @@
             </a:pPr>
             <a:r>
               <a:rPr lang="en-US" sz="2200" u="sng" dirty="0"/>
-              <a:t>Shape looks more Poisson</a:t>
+              <a:t>Poisson is simplest</a:t>
             </a:r>
           </a:p>
           <a:p>
@@ -14940,7 +17111,7 @@
             <p:nvPr/>
           </p:nvPicPr>
           <p:blipFill>
-            <a:blip r:embed="rId4">
+            <a:blip r:embed="rId3">
               <a:extLst>
                 <a:ext uri="{28A0092B-C50C-407E-A947-70E740481C1C}">
                   <a14:useLocalDpi xmlns:a14="http://schemas.microsoft.com/office/drawing/2010/main" val="0"/>
@@ -14987,7 +17158,7 @@
             <p:nvPr/>
           </p:nvPicPr>
           <p:blipFill>
-            <a:blip r:embed="rId5">
+            <a:blip r:embed="rId4">
               <a:extLst>
                 <a:ext uri="{28A0092B-C50C-407E-A947-70E740481C1C}">
                   <a14:useLocalDpi xmlns:a14="http://schemas.microsoft.com/office/drawing/2010/main" val="0"/>
@@ -15109,6 +17280,123 @@
           </p:txBody>
         </p:sp>
       </p:grpSp>
+      <p:sp>
+        <p:nvSpPr>
+          <p:cNvPr id="2" name="Title 1">
+            <a:extLst>
+              <a:ext uri="{FF2B5EF4-FFF2-40B4-BE49-F238E27FC236}">
+                <a16:creationId xmlns:a16="http://schemas.microsoft.com/office/drawing/2014/main" id="{966CEFF8-EB9A-41C2-9220-5A83B2413261}"/>
+              </a:ext>
+            </a:extLst>
+          </p:cNvPr>
+          <p:cNvSpPr>
+            <a:spLocks noGrp="1"/>
+          </p:cNvSpPr>
+          <p:nvPr>
+            <p:ph type="title"/>
+          </p:nvPr>
+        </p:nvSpPr>
+        <p:spPr>
+          <a:xfrm>
+            <a:off x="1097280" y="286603"/>
+            <a:ext cx="5151120" cy="1450757"/>
+          </a:xfrm>
+        </p:spPr>
+        <p:txBody>
+          <a:bodyPr/>
+          <a:lstStyle/>
+          <a:p>
+            <a:r>
+              <a:rPr lang="en-US" dirty="0"/>
+              <a:t>Bayesian Changepoint Model</a:t>
+            </a:r>
+          </a:p>
+        </p:txBody>
+      </p:sp>
+      <p:pic>
+        <p:nvPicPr>
+          <p:cNvPr id="6146" name="Picture 2">
+            <a:extLst>
+              <a:ext uri="{FF2B5EF4-FFF2-40B4-BE49-F238E27FC236}">
+                <a16:creationId xmlns:a16="http://schemas.microsoft.com/office/drawing/2014/main" id="{CF50D25E-67F8-4E39-8973-C1D1BACB4FEE}"/>
+              </a:ext>
+            </a:extLst>
+          </p:cNvPr>
+          <p:cNvPicPr>
+            <a:picLocks noChangeAspect="1" noChangeArrowheads="1"/>
+          </p:cNvPicPr>
+          <p:nvPr/>
+        </p:nvPicPr>
+        <p:blipFill>
+          <a:blip r:embed="rId5">
+            <a:extLst>
+              <a:ext uri="{28A0092B-C50C-407E-A947-70E740481C1C}">
+                <a14:useLocalDpi xmlns:a14="http://schemas.microsoft.com/office/drawing/2010/main" val="0"/>
+              </a:ext>
+            </a:extLst>
+          </a:blip>
+          <a:srcRect/>
+          <a:stretch>
+            <a:fillRect/>
+          </a:stretch>
+        </p:blipFill>
+        <p:spPr bwMode="auto">
+          <a:xfrm>
+            <a:off x="350520" y="2263139"/>
+            <a:ext cx="5417820" cy="3775183"/>
+          </a:xfrm>
+          <a:prstGeom prst="rect">
+            <a:avLst/>
+          </a:prstGeom>
+          <a:noFill/>
+          <a:extLst>
+            <a:ext uri="{909E8E84-426E-40DD-AFC4-6F175D3DCCD1}">
+              <a14:hiddenFill xmlns:a14="http://schemas.microsoft.com/office/drawing/2010/main">
+                <a:solidFill>
+                  <a:srgbClr val="FFFFFF"/>
+                </a:solidFill>
+              </a14:hiddenFill>
+            </a:ext>
+          </a:extLst>
+        </p:spPr>
+      </p:pic>
+      <p:cxnSp>
+        <p:nvCxnSpPr>
+          <p:cNvPr id="5" name="Straight Connector 4">
+            <a:extLst>
+              <a:ext uri="{FF2B5EF4-FFF2-40B4-BE49-F238E27FC236}">
+                <a16:creationId xmlns:a16="http://schemas.microsoft.com/office/drawing/2014/main" id="{AE73A9FC-C1B9-4BD3-8EA0-1FB392C7661B}"/>
+              </a:ext>
+            </a:extLst>
+          </p:cNvPr>
+          <p:cNvCxnSpPr/>
+          <p:nvPr/>
+        </p:nvCxnSpPr>
+        <p:spPr>
+          <a:xfrm>
+            <a:off x="2689860" y="2545080"/>
+            <a:ext cx="0" cy="2834640"/>
+          </a:xfrm>
+          <a:prstGeom prst="line">
+            <a:avLst/>
+          </a:prstGeom>
+          <a:ln w="76200"/>
+        </p:spPr>
+        <p:style>
+          <a:lnRef idx="1">
+            <a:schemeClr val="dk1"/>
+          </a:lnRef>
+          <a:fillRef idx="0">
+            <a:schemeClr val="dk1"/>
+          </a:fillRef>
+          <a:effectRef idx="0">
+            <a:schemeClr val="dk1"/>
+          </a:effectRef>
+          <a:fontRef idx="minor">
+            <a:schemeClr val="tx1"/>
+          </a:fontRef>
+        </p:style>
+      </p:cxnSp>
       <p:pic>
         <p:nvPicPr>
           <p:cNvPr id="6152" name="Picture 8" descr="Poisson Distribution (video lessons, examples and solutions)">
@@ -16487,707 +18775,7 @@
 </p:sld>
 </file>
 
-<file path=ppt/slides/slide2.xml><?xml version="1.0" encoding="utf-8"?>
-<p:sld xmlns:a="http://schemas.openxmlformats.org/drawingml/2006/main" xmlns:r="http://schemas.openxmlformats.org/officeDocument/2006/relationships" xmlns:p="http://schemas.openxmlformats.org/presentationml/2006/main">
-  <p:cSld>
-    <p:spTree>
-      <p:nvGrpSpPr>
-        <p:cNvPr id="1" name=""/>
-        <p:cNvGrpSpPr/>
-        <p:nvPr/>
-      </p:nvGrpSpPr>
-      <p:grpSpPr>
-        <a:xfrm>
-          <a:off x="0" y="0"/>
-          <a:ext cx="0" cy="0"/>
-          <a:chOff x="0" y="0"/>
-          <a:chExt cx="0" cy="0"/>
-        </a:xfrm>
-      </p:grpSpPr>
-      <p:sp>
-        <p:nvSpPr>
-          <p:cNvPr id="2" name="Title 1">
-            <a:extLst>
-              <a:ext uri="{FF2B5EF4-FFF2-40B4-BE49-F238E27FC236}">
-                <a16:creationId xmlns:a16="http://schemas.microsoft.com/office/drawing/2014/main" id="{7E41E50D-7EFA-4CB5-92EC-A0ADE69CDF96}"/>
-              </a:ext>
-            </a:extLst>
-          </p:cNvPr>
-          <p:cNvSpPr>
-            <a:spLocks noGrp="1"/>
-          </p:cNvSpPr>
-          <p:nvPr>
-            <p:ph type="title"/>
-          </p:nvPr>
-        </p:nvSpPr>
-        <p:spPr/>
-        <p:txBody>
-          <a:bodyPr/>
-          <a:lstStyle/>
-          <a:p>
-            <a:r>
-              <a:rPr lang="en-US" dirty="0"/>
-              <a:t>Layout of lecture</a:t>
-            </a:r>
-          </a:p>
-        </p:txBody>
-      </p:sp>
-      <p:sp>
-        <p:nvSpPr>
-          <p:cNvPr id="3" name="Content Placeholder 2">
-            <a:extLst>
-              <a:ext uri="{FF2B5EF4-FFF2-40B4-BE49-F238E27FC236}">
-                <a16:creationId xmlns:a16="http://schemas.microsoft.com/office/drawing/2014/main" id="{5565E78A-76DF-48DD-A598-907793873C67}"/>
-              </a:ext>
-            </a:extLst>
-          </p:cNvPr>
-          <p:cNvSpPr>
-            <a:spLocks noGrp="1"/>
-          </p:cNvSpPr>
-          <p:nvPr>
-            <p:ph idx="1"/>
-          </p:nvPr>
-        </p:nvSpPr>
-        <p:spPr>
-          <a:xfrm>
-            <a:off x="1097280" y="1845734"/>
-            <a:ext cx="10058400" cy="4295986"/>
-          </a:xfrm>
-        </p:spPr>
-        <p:txBody>
-          <a:bodyPr>
-            <a:normAutofit/>
-          </a:bodyPr>
-          <a:lstStyle/>
-          <a:p>
-            <a:pPr>
-              <a:buFont typeface="Wingdings" panose="05000000000000000000" pitchFamily="2" charset="2"/>
-              <a:buChar char="v"/>
-            </a:pPr>
-            <a:r>
-              <a:rPr lang="en-US" sz="2400" dirty="0"/>
-              <a:t>What is Bayesian Modeling?</a:t>
-            </a:r>
-          </a:p>
-          <a:p>
-            <a:pPr>
-              <a:buFont typeface="Wingdings" panose="05000000000000000000" pitchFamily="2" charset="2"/>
-              <a:buChar char="v"/>
-            </a:pPr>
-            <a:r>
-              <a:rPr lang="en-US" sz="2400" dirty="0"/>
-              <a:t>Why do Bayesian Modeling?</a:t>
-            </a:r>
-          </a:p>
-          <a:p>
-            <a:pPr>
-              <a:buFont typeface="Wingdings" panose="05000000000000000000" pitchFamily="2" charset="2"/>
-              <a:buChar char="v"/>
-            </a:pPr>
-            <a:r>
-              <a:rPr lang="en-US" sz="2400" dirty="0"/>
-              <a:t>What is probabilistic programming?</a:t>
-            </a:r>
-          </a:p>
-          <a:p>
-            <a:pPr>
-              <a:buFont typeface="Wingdings" panose="05000000000000000000" pitchFamily="2" charset="2"/>
-              <a:buChar char="v"/>
-            </a:pPr>
-            <a:r>
-              <a:rPr lang="en-US" sz="2400" dirty="0"/>
-              <a:t>How do we do Bayesian modeling using probabilistic programming?</a:t>
-            </a:r>
-          </a:p>
-          <a:p>
-            <a:pPr lvl="1">
-              <a:buFont typeface="Wingdings" panose="05000000000000000000" pitchFamily="2" charset="2"/>
-              <a:buChar char="v"/>
-            </a:pPr>
-            <a:r>
-              <a:rPr lang="en-US" sz="2200" dirty="0"/>
-              <a:t>PyMC3</a:t>
-            </a:r>
-          </a:p>
-          <a:p>
-            <a:pPr marL="0" indent="0">
-              <a:buNone/>
-            </a:pPr>
-            <a:endParaRPr lang="en-US" sz="2400" dirty="0"/>
-          </a:p>
-          <a:p>
-            <a:pPr>
-              <a:buFont typeface="Wingdings" panose="05000000000000000000" pitchFamily="2" charset="2"/>
-              <a:buChar char="v"/>
-            </a:pPr>
-            <a:r>
-              <a:rPr lang="en-US" sz="2400" dirty="0"/>
-              <a:t>Interactive…building 3 different “models”</a:t>
-            </a:r>
-          </a:p>
-          <a:p>
-            <a:pPr>
-              <a:buFont typeface="Wingdings" panose="05000000000000000000" pitchFamily="2" charset="2"/>
-              <a:buChar char="v"/>
-            </a:pPr>
-            <a:r>
-              <a:rPr lang="en-US" sz="2400" dirty="0" err="1"/>
-              <a:t>Jupyter</a:t>
-            </a:r>
-            <a:r>
-              <a:rPr lang="en-US" sz="2400" dirty="0"/>
-              <a:t> notebooks</a:t>
-            </a:r>
-          </a:p>
-          <a:p>
-            <a:pPr lvl="1">
-              <a:buFont typeface="Wingdings" panose="05000000000000000000" pitchFamily="2" charset="2"/>
-              <a:buChar char="v"/>
-            </a:pPr>
-            <a:r>
-              <a:rPr lang="en-US" sz="2200" dirty="0"/>
-              <a:t>Locally or on google </a:t>
-            </a:r>
-            <a:r>
-              <a:rPr lang="en-US" sz="2200" dirty="0" err="1"/>
-              <a:t>colab</a:t>
-            </a:r>
-            <a:endParaRPr lang="en-US" sz="2200" dirty="0"/>
-          </a:p>
-        </p:txBody>
-      </p:sp>
-    </p:spTree>
-    <p:extLst>
-      <p:ext uri="{BB962C8B-B14F-4D97-AF65-F5344CB8AC3E}">
-        <p14:creationId xmlns:p14="http://schemas.microsoft.com/office/powerpoint/2010/main" val="383548447"/>
-      </p:ext>
-    </p:extLst>
-  </p:cSld>
-  <p:clrMapOvr>
-    <a:masterClrMapping/>
-  </p:clrMapOvr>
-  <p:timing>
-    <p:tnLst>
-      <p:par>
-        <p:cTn id="1" dur="indefinite" restart="never" nodeType="tmRoot">
-          <p:childTnLst>
-            <p:seq concurrent="1" nextAc="seek">
-              <p:cTn id="2" dur="indefinite" nodeType="mainSeq">
-                <p:childTnLst>
-                  <p:par>
-                    <p:cTn id="3" fill="hold">
-                      <p:stCondLst>
-                        <p:cond delay="indefinite"/>
-                      </p:stCondLst>
-                      <p:childTnLst>
-                        <p:par>
-                          <p:cTn id="4" fill="hold">
-                            <p:stCondLst>
-                              <p:cond delay="0"/>
-                            </p:stCondLst>
-                            <p:childTnLst>
-                              <p:par>
-                                <p:cTn id="5" presetID="10" presetClass="entr" presetSubtype="0" fill="hold" nodeType="clickEffect">
-                                  <p:stCondLst>
-                                    <p:cond delay="0"/>
-                                  </p:stCondLst>
-                                  <p:childTnLst>
-                                    <p:set>
-                                      <p:cBhvr>
-                                        <p:cTn id="6" dur="1" fill="hold">
-                                          <p:stCondLst>
-                                            <p:cond delay="0"/>
-                                          </p:stCondLst>
-                                        </p:cTn>
-                                        <p:tgtEl>
-                                          <p:spTgt spid="3">
-                                            <p:txEl>
-                                              <p:pRg st="0" end="0"/>
-                                            </p:txEl>
-                                          </p:spTgt>
-                                        </p:tgtEl>
-                                        <p:attrNameLst>
-                                          <p:attrName>style.visibility</p:attrName>
-                                        </p:attrNameLst>
-                                      </p:cBhvr>
-                                      <p:to>
-                                        <p:strVal val="visible"/>
-                                      </p:to>
-                                    </p:set>
-                                    <p:animEffect transition="in" filter="fade">
-                                      <p:cBhvr>
-                                        <p:cTn id="7" dur="500"/>
-                                        <p:tgtEl>
-                                          <p:spTgt spid="3">
-                                            <p:txEl>
-                                              <p:pRg st="0" end="0"/>
-                                            </p:txEl>
-                                          </p:spTgt>
-                                        </p:tgtEl>
-                                      </p:cBhvr>
-                                    </p:animEffect>
-                                  </p:childTnLst>
-                                </p:cTn>
-                              </p:par>
-                            </p:childTnLst>
-                          </p:cTn>
-                        </p:par>
-                      </p:childTnLst>
-                    </p:cTn>
-                  </p:par>
-                  <p:par>
-                    <p:cTn id="8" fill="hold">
-                      <p:stCondLst>
-                        <p:cond delay="indefinite"/>
-                      </p:stCondLst>
-                      <p:childTnLst>
-                        <p:par>
-                          <p:cTn id="9" fill="hold">
-                            <p:stCondLst>
-                              <p:cond delay="0"/>
-                            </p:stCondLst>
-                            <p:childTnLst>
-                              <p:par>
-                                <p:cTn id="10" presetID="10" presetClass="entr" presetSubtype="0" fill="hold" nodeType="clickEffect">
-                                  <p:stCondLst>
-                                    <p:cond delay="0"/>
-                                  </p:stCondLst>
-                                  <p:childTnLst>
-                                    <p:set>
-                                      <p:cBhvr>
-                                        <p:cTn id="11" dur="1" fill="hold">
-                                          <p:stCondLst>
-                                            <p:cond delay="0"/>
-                                          </p:stCondLst>
-                                        </p:cTn>
-                                        <p:tgtEl>
-                                          <p:spTgt spid="3">
-                                            <p:txEl>
-                                              <p:pRg st="1" end="1"/>
-                                            </p:txEl>
-                                          </p:spTgt>
-                                        </p:tgtEl>
-                                        <p:attrNameLst>
-                                          <p:attrName>style.visibility</p:attrName>
-                                        </p:attrNameLst>
-                                      </p:cBhvr>
-                                      <p:to>
-                                        <p:strVal val="visible"/>
-                                      </p:to>
-                                    </p:set>
-                                    <p:animEffect transition="in" filter="fade">
-                                      <p:cBhvr>
-                                        <p:cTn id="12" dur="500"/>
-                                        <p:tgtEl>
-                                          <p:spTgt spid="3">
-                                            <p:txEl>
-                                              <p:pRg st="1" end="1"/>
-                                            </p:txEl>
-                                          </p:spTgt>
-                                        </p:tgtEl>
-                                      </p:cBhvr>
-                                    </p:animEffect>
-                                  </p:childTnLst>
-                                </p:cTn>
-                              </p:par>
-                            </p:childTnLst>
-                          </p:cTn>
-                        </p:par>
-                      </p:childTnLst>
-                    </p:cTn>
-                  </p:par>
-                  <p:par>
-                    <p:cTn id="13" fill="hold">
-                      <p:stCondLst>
-                        <p:cond delay="indefinite"/>
-                      </p:stCondLst>
-                      <p:childTnLst>
-                        <p:par>
-                          <p:cTn id="14" fill="hold">
-                            <p:stCondLst>
-                              <p:cond delay="0"/>
-                            </p:stCondLst>
-                            <p:childTnLst>
-                              <p:par>
-                                <p:cTn id="15" presetID="10" presetClass="entr" presetSubtype="0" fill="hold" nodeType="clickEffect">
-                                  <p:stCondLst>
-                                    <p:cond delay="0"/>
-                                  </p:stCondLst>
-                                  <p:childTnLst>
-                                    <p:set>
-                                      <p:cBhvr>
-                                        <p:cTn id="16" dur="1" fill="hold">
-                                          <p:stCondLst>
-                                            <p:cond delay="0"/>
-                                          </p:stCondLst>
-                                        </p:cTn>
-                                        <p:tgtEl>
-                                          <p:spTgt spid="3">
-                                            <p:txEl>
-                                              <p:pRg st="2" end="2"/>
-                                            </p:txEl>
-                                          </p:spTgt>
-                                        </p:tgtEl>
-                                        <p:attrNameLst>
-                                          <p:attrName>style.visibility</p:attrName>
-                                        </p:attrNameLst>
-                                      </p:cBhvr>
-                                      <p:to>
-                                        <p:strVal val="visible"/>
-                                      </p:to>
-                                    </p:set>
-                                    <p:animEffect transition="in" filter="fade">
-                                      <p:cBhvr>
-                                        <p:cTn id="17" dur="500"/>
-                                        <p:tgtEl>
-                                          <p:spTgt spid="3">
-                                            <p:txEl>
-                                              <p:pRg st="2" end="2"/>
-                                            </p:txEl>
-                                          </p:spTgt>
-                                        </p:tgtEl>
-                                      </p:cBhvr>
-                                    </p:animEffect>
-                                  </p:childTnLst>
-                                </p:cTn>
-                              </p:par>
-                            </p:childTnLst>
-                          </p:cTn>
-                        </p:par>
-                      </p:childTnLst>
-                    </p:cTn>
-                  </p:par>
-                  <p:par>
-                    <p:cTn id="18" fill="hold">
-                      <p:stCondLst>
-                        <p:cond delay="indefinite"/>
-                      </p:stCondLst>
-                      <p:childTnLst>
-                        <p:par>
-                          <p:cTn id="19" fill="hold">
-                            <p:stCondLst>
-                              <p:cond delay="0"/>
-                            </p:stCondLst>
-                            <p:childTnLst>
-                              <p:par>
-                                <p:cTn id="20" presetID="10" presetClass="entr" presetSubtype="0" fill="hold" nodeType="clickEffect">
-                                  <p:stCondLst>
-                                    <p:cond delay="0"/>
-                                  </p:stCondLst>
-                                  <p:childTnLst>
-                                    <p:set>
-                                      <p:cBhvr>
-                                        <p:cTn id="21" dur="1" fill="hold">
-                                          <p:stCondLst>
-                                            <p:cond delay="0"/>
-                                          </p:stCondLst>
-                                        </p:cTn>
-                                        <p:tgtEl>
-                                          <p:spTgt spid="3">
-                                            <p:txEl>
-                                              <p:pRg st="3" end="3"/>
-                                            </p:txEl>
-                                          </p:spTgt>
-                                        </p:tgtEl>
-                                        <p:attrNameLst>
-                                          <p:attrName>style.visibility</p:attrName>
-                                        </p:attrNameLst>
-                                      </p:cBhvr>
-                                      <p:to>
-                                        <p:strVal val="visible"/>
-                                      </p:to>
-                                    </p:set>
-                                    <p:animEffect transition="in" filter="fade">
-                                      <p:cBhvr>
-                                        <p:cTn id="22" dur="500"/>
-                                        <p:tgtEl>
-                                          <p:spTgt spid="3">
-                                            <p:txEl>
-                                              <p:pRg st="3" end="3"/>
-                                            </p:txEl>
-                                          </p:spTgt>
-                                        </p:tgtEl>
-                                      </p:cBhvr>
-                                    </p:animEffect>
-                                  </p:childTnLst>
-                                </p:cTn>
-                              </p:par>
-                            </p:childTnLst>
-                          </p:cTn>
-                        </p:par>
-                      </p:childTnLst>
-                    </p:cTn>
-                  </p:par>
-                  <p:par>
-                    <p:cTn id="23" fill="hold">
-                      <p:stCondLst>
-                        <p:cond delay="indefinite"/>
-                      </p:stCondLst>
-                      <p:childTnLst>
-                        <p:par>
-                          <p:cTn id="24" fill="hold">
-                            <p:stCondLst>
-                              <p:cond delay="0"/>
-                            </p:stCondLst>
-                            <p:childTnLst>
-                              <p:par>
-                                <p:cTn id="25" presetID="10" presetClass="entr" presetSubtype="0" fill="hold" nodeType="clickEffect">
-                                  <p:stCondLst>
-                                    <p:cond delay="0"/>
-                                  </p:stCondLst>
-                                  <p:childTnLst>
-                                    <p:set>
-                                      <p:cBhvr>
-                                        <p:cTn id="26" dur="1" fill="hold">
-                                          <p:stCondLst>
-                                            <p:cond delay="0"/>
-                                          </p:stCondLst>
-                                        </p:cTn>
-                                        <p:tgtEl>
-                                          <p:spTgt spid="3">
-                                            <p:txEl>
-                                              <p:pRg st="4" end="4"/>
-                                            </p:txEl>
-                                          </p:spTgt>
-                                        </p:tgtEl>
-                                        <p:attrNameLst>
-                                          <p:attrName>style.visibility</p:attrName>
-                                        </p:attrNameLst>
-                                      </p:cBhvr>
-                                      <p:to>
-                                        <p:strVal val="visible"/>
-                                      </p:to>
-                                    </p:set>
-                                    <p:animEffect transition="in" filter="fade">
-                                      <p:cBhvr>
-                                        <p:cTn id="27" dur="500"/>
-                                        <p:tgtEl>
-                                          <p:spTgt spid="3">
-                                            <p:txEl>
-                                              <p:pRg st="4" end="4"/>
-                                            </p:txEl>
-                                          </p:spTgt>
-                                        </p:tgtEl>
-                                      </p:cBhvr>
-                                    </p:animEffect>
-                                  </p:childTnLst>
-                                </p:cTn>
-                              </p:par>
-                            </p:childTnLst>
-                          </p:cTn>
-                        </p:par>
-                      </p:childTnLst>
-                    </p:cTn>
-                  </p:par>
-                  <p:par>
-                    <p:cTn id="28" fill="hold">
-                      <p:stCondLst>
-                        <p:cond delay="indefinite"/>
-                      </p:stCondLst>
-                      <p:childTnLst>
-                        <p:par>
-                          <p:cTn id="29" fill="hold">
-                            <p:stCondLst>
-                              <p:cond delay="0"/>
-                            </p:stCondLst>
-                            <p:childTnLst>
-                              <p:par>
-                                <p:cTn id="30" presetID="10" presetClass="entr" presetSubtype="0" fill="hold" nodeType="clickEffect">
-                                  <p:stCondLst>
-                                    <p:cond delay="0"/>
-                                  </p:stCondLst>
-                                  <p:childTnLst>
-                                    <p:set>
-                                      <p:cBhvr>
-                                        <p:cTn id="31" dur="1" fill="hold">
-                                          <p:stCondLst>
-                                            <p:cond delay="0"/>
-                                          </p:stCondLst>
-                                        </p:cTn>
-                                        <p:tgtEl>
-                                          <p:spTgt spid="3">
-                                            <p:txEl>
-                                              <p:pRg st="6" end="6"/>
-                                            </p:txEl>
-                                          </p:spTgt>
-                                        </p:tgtEl>
-                                        <p:attrNameLst>
-                                          <p:attrName>style.visibility</p:attrName>
-                                        </p:attrNameLst>
-                                      </p:cBhvr>
-                                      <p:to>
-                                        <p:strVal val="visible"/>
-                                      </p:to>
-                                    </p:set>
-                                    <p:animEffect transition="in" filter="fade">
-                                      <p:cBhvr>
-                                        <p:cTn id="32" dur="500"/>
-                                        <p:tgtEl>
-                                          <p:spTgt spid="3">
-                                            <p:txEl>
-                                              <p:pRg st="6" end="6"/>
-                                            </p:txEl>
-                                          </p:spTgt>
-                                        </p:tgtEl>
-                                      </p:cBhvr>
-                                    </p:animEffect>
-                                  </p:childTnLst>
-                                </p:cTn>
-                              </p:par>
-                            </p:childTnLst>
-                          </p:cTn>
-                        </p:par>
-                      </p:childTnLst>
-                    </p:cTn>
-                  </p:par>
-                  <p:par>
-                    <p:cTn id="33" fill="hold">
-                      <p:stCondLst>
-                        <p:cond delay="indefinite"/>
-                      </p:stCondLst>
-                      <p:childTnLst>
-                        <p:par>
-                          <p:cTn id="34" fill="hold">
-                            <p:stCondLst>
-                              <p:cond delay="0"/>
-                            </p:stCondLst>
-                            <p:childTnLst>
-                              <p:par>
-                                <p:cTn id="35" presetID="10" presetClass="entr" presetSubtype="0" fill="hold" nodeType="clickEffect">
-                                  <p:stCondLst>
-                                    <p:cond delay="0"/>
-                                  </p:stCondLst>
-                                  <p:childTnLst>
-                                    <p:set>
-                                      <p:cBhvr>
-                                        <p:cTn id="36" dur="1" fill="hold">
-                                          <p:stCondLst>
-                                            <p:cond delay="0"/>
-                                          </p:stCondLst>
-                                        </p:cTn>
-                                        <p:tgtEl>
-                                          <p:spTgt spid="3">
-                                            <p:txEl>
-                                              <p:pRg st="7" end="7"/>
-                                            </p:txEl>
-                                          </p:spTgt>
-                                        </p:tgtEl>
-                                        <p:attrNameLst>
-                                          <p:attrName>style.visibility</p:attrName>
-                                        </p:attrNameLst>
-                                      </p:cBhvr>
-                                      <p:to>
-                                        <p:strVal val="visible"/>
-                                      </p:to>
-                                    </p:set>
-                                    <p:animEffect transition="in" filter="fade">
-                                      <p:cBhvr>
-                                        <p:cTn id="37" dur="500"/>
-                                        <p:tgtEl>
-                                          <p:spTgt spid="3">
-                                            <p:txEl>
-                                              <p:pRg st="7" end="7"/>
-                                            </p:txEl>
-                                          </p:spTgt>
-                                        </p:tgtEl>
-                                      </p:cBhvr>
-                                    </p:animEffect>
-                                  </p:childTnLst>
-                                </p:cTn>
-                              </p:par>
-                            </p:childTnLst>
-                          </p:cTn>
-                        </p:par>
-                      </p:childTnLst>
-                    </p:cTn>
-                  </p:par>
-                  <p:par>
-                    <p:cTn id="38" fill="hold">
-                      <p:stCondLst>
-                        <p:cond delay="indefinite"/>
-                      </p:stCondLst>
-                      <p:childTnLst>
-                        <p:par>
-                          <p:cTn id="39" fill="hold">
-                            <p:stCondLst>
-                              <p:cond delay="0"/>
-                            </p:stCondLst>
-                            <p:childTnLst>
-                              <p:par>
-                                <p:cTn id="40" presetID="10" presetClass="entr" presetSubtype="0" fill="hold" nodeType="clickEffect">
-                                  <p:stCondLst>
-                                    <p:cond delay="0"/>
-                                  </p:stCondLst>
-                                  <p:childTnLst>
-                                    <p:set>
-                                      <p:cBhvr>
-                                        <p:cTn id="41" dur="1" fill="hold">
-                                          <p:stCondLst>
-                                            <p:cond delay="0"/>
-                                          </p:stCondLst>
-                                        </p:cTn>
-                                        <p:tgtEl>
-                                          <p:spTgt spid="3">
-                                            <p:txEl>
-                                              <p:pRg st="8" end="8"/>
-                                            </p:txEl>
-                                          </p:spTgt>
-                                        </p:tgtEl>
-                                        <p:attrNameLst>
-                                          <p:attrName>style.visibility</p:attrName>
-                                        </p:attrNameLst>
-                                      </p:cBhvr>
-                                      <p:to>
-                                        <p:strVal val="visible"/>
-                                      </p:to>
-                                    </p:set>
-                                    <p:animEffect transition="in" filter="fade">
-                                      <p:cBhvr>
-                                        <p:cTn id="42" dur="500"/>
-                                        <p:tgtEl>
-                                          <p:spTgt spid="3">
-                                            <p:txEl>
-                                              <p:pRg st="8" end="8"/>
-                                            </p:txEl>
-                                          </p:spTgt>
-                                        </p:tgtEl>
-                                      </p:cBhvr>
-                                    </p:animEffect>
-                                  </p:childTnLst>
-                                </p:cTn>
-                              </p:par>
-                            </p:childTnLst>
-                          </p:cTn>
-                        </p:par>
-                      </p:childTnLst>
-                    </p:cTn>
-                  </p:par>
-                </p:childTnLst>
-              </p:cTn>
-              <p:prevCondLst>
-                <p:cond evt="onPrev" delay="0">
-                  <p:tgtEl>
-                    <p:sldTgt/>
-                  </p:tgtEl>
-                </p:cond>
-              </p:prevCondLst>
-              <p:nextCondLst>
-                <p:cond evt="onNext" delay="0">
-                  <p:tgtEl>
-                    <p:sldTgt/>
-                  </p:tgtEl>
-                </p:cond>
-              </p:nextCondLst>
-            </p:seq>
-          </p:childTnLst>
-        </p:cTn>
-      </p:par>
-    </p:tnLst>
-  </p:timing>
-</p:sld>
-</file>
-
-<file path=ppt/slides/slide20.xml><?xml version="1.0" encoding="utf-8"?>
+<file path=ppt/slides/slide28.xml><?xml version="1.0" encoding="utf-8"?>
 <p:sld xmlns:a="http://schemas.openxmlformats.org/drawingml/2006/main" xmlns:r="http://schemas.openxmlformats.org/officeDocument/2006/relationships" xmlns:p="http://schemas.openxmlformats.org/presentationml/2006/main">
   <p:cSld>
     <p:spTree>

</xml_diff>

<commit_message>
Add "real-world" examples of using probabilistic programming
</commit_message>
<xml_diff>
--- a/Bayesian_Modeling_Lecture/Adv_Data_Analysis_Bayesian_Modeling.pptx
+++ b/Bayesian_Modeling_Lecture/Adv_Data_Analysis_Bayesian_Modeling.pptx
@@ -5,7 +5,7 @@
     <p:sldMasterId id="2147483712" r:id="rId1"/>
   </p:sldMasterIdLst>
   <p:notesMasterIdLst>
-    <p:notesMasterId r:id="rId30"/>
+    <p:notesMasterId r:id="rId37"/>
   </p:notesMasterIdLst>
   <p:sldIdLst>
     <p:sldId id="256" r:id="rId2"/>
@@ -36,6 +36,13 @@
     <p:sldId id="287" r:id="rId27"/>
     <p:sldId id="274" r:id="rId28"/>
     <p:sldId id="275" r:id="rId29"/>
+    <p:sldId id="289" r:id="rId30"/>
+    <p:sldId id="288" r:id="rId31"/>
+    <p:sldId id="290" r:id="rId32"/>
+    <p:sldId id="291" r:id="rId33"/>
+    <p:sldId id="292" r:id="rId34"/>
+    <p:sldId id="293" r:id="rId35"/>
+    <p:sldId id="294" r:id="rId36"/>
   </p:sldIdLst>
   <p:sldSz cx="12192000" cy="6858000"/>
   <p:notesSz cx="6858000" cy="9144000"/>
@@ -235,7 +242,7 @@
           <a:p>
             <a:fld id="{10D9A30E-5D9F-4D60-9956-127E77FCC0DB}" type="datetimeFigureOut">
               <a:rPr lang="en-US" smtClean="0"/>
-              <a:t>8/17/2022</a:t>
+              <a:t>8/18/2022</a:t>
             </a:fld>
             <a:endParaRPr lang="en-US"/>
           </a:p>
@@ -1844,7 +1851,7 @@
           <a:p>
             <a:fld id="{9184DA70-C731-4C70-880D-CCD4705E623C}" type="datetime1">
               <a:rPr lang="en-US" smtClean="0"/>
-              <a:t>8/17/2022</a:t>
+              <a:t>8/18/2022</a:t>
             </a:fld>
             <a:endParaRPr lang="en-US" dirty="0"/>
           </a:p>
@@ -2052,7 +2059,7 @@
           <a:p>
             <a:fld id="{B612A279-0833-481D-8C56-F67FD0AC6C50}" type="datetime1">
               <a:rPr lang="en-US" smtClean="0"/>
-              <a:t>8/17/2022</a:t>
+              <a:t>8/18/2022</a:t>
             </a:fld>
             <a:endParaRPr lang="en-US" dirty="0"/>
           </a:p>
@@ -2308,7 +2315,7 @@
           <a:p>
             <a:fld id="{6587DA83-5663-4C9C-B9AA-0B40A3DAFF81}" type="datetime1">
               <a:rPr lang="en-US" smtClean="0"/>
-              <a:t>8/17/2022</a:t>
+              <a:t>8/18/2022</a:t>
             </a:fld>
             <a:endParaRPr lang="en-US" dirty="0"/>
           </a:p>
@@ -2482,7 +2489,7 @@
           <a:p>
             <a:fld id="{4BE1D723-8F53-4F53-90B0-1982A396982E}" type="datetime1">
               <a:rPr lang="en-US" smtClean="0"/>
-              <a:t>8/17/2022</a:t>
+              <a:t>8/18/2022</a:t>
             </a:fld>
             <a:endParaRPr lang="en-US" dirty="0"/>
           </a:p>
@@ -2825,7 +2832,7 @@
           <a:p>
             <a:fld id="{97669AF7-7BEB-44E4-9852-375E34362B5B}" type="datetime1">
               <a:rPr lang="en-US" smtClean="0"/>
-              <a:t>8/17/2022</a:t>
+              <a:t>8/18/2022</a:t>
             </a:fld>
             <a:endParaRPr lang="en-US" dirty="0"/>
           </a:p>
@@ -3100,7 +3107,7 @@
           <a:p>
             <a:fld id="{BAAAC38D-0552-4C82-B593-E6124DFADBE2}" type="datetime1">
               <a:rPr lang="en-US" smtClean="0"/>
-              <a:t>8/17/2022</a:t>
+              <a:t>8/18/2022</a:t>
             </a:fld>
             <a:endParaRPr lang="en-US" dirty="0"/>
           </a:p>
@@ -3479,7 +3486,7 @@
           <a:p>
             <a:fld id="{D9DF0F1C-5577-4ACB-BB62-DF8F3C494C7E}" type="datetime1">
               <a:rPr lang="en-US" smtClean="0"/>
-              <a:t>8/17/2022</a:t>
+              <a:t>8/18/2022</a:t>
             </a:fld>
             <a:endParaRPr lang="en-US" dirty="0"/>
           </a:p>
@@ -3597,7 +3604,7 @@
           <a:p>
             <a:fld id="{1775B394-D9F9-4F0C-B15D-605F45CB9E9F}" type="datetime1">
               <a:rPr lang="en-US" smtClean="0"/>
-              <a:t>8/17/2022</a:t>
+              <a:t>8/18/2022</a:t>
             </a:fld>
             <a:endParaRPr lang="en-US" dirty="0"/>
           </a:p>
@@ -3768,7 +3775,7 @@
           <a:p>
             <a:fld id="{39667345-2558-425A-8533-9BFDBCE15005}" type="datetime1">
               <a:rPr lang="en-US" smtClean="0"/>
-              <a:t>8/17/2022</a:t>
+              <a:t>8/18/2022</a:t>
             </a:fld>
             <a:endParaRPr lang="en-US" dirty="0"/>
           </a:p>
@@ -4122,7 +4129,7 @@
           <a:p>
             <a:fld id="{92BEA474-078D-4E9B-9B14-09A87B19DC46}" type="datetime1">
               <a:rPr lang="en-US" smtClean="0"/>
-              <a:t>8/17/2022</a:t>
+              <a:t>8/18/2022</a:t>
             </a:fld>
             <a:endParaRPr lang="en-US" dirty="0"/>
           </a:p>
@@ -4505,7 +4512,7 @@
           <a:p>
             <a:fld id="{4907D986-8816-4272-A432-0437A28A9828}" type="datetime1">
               <a:rPr lang="en-US" smtClean="0"/>
-              <a:t>8/17/2022</a:t>
+              <a:t>8/18/2022</a:t>
             </a:fld>
             <a:endParaRPr lang="en-US" dirty="0"/>
           </a:p>
@@ -4793,7 +4800,7 @@
           <a:p>
             <a:fld id="{62D6E202-B606-4609-B914-27C9371A1F6D}" type="datetime1">
               <a:rPr lang="en-US" smtClean="0"/>
-              <a:t>8/17/2022</a:t>
+              <a:t>8/18/2022</a:t>
             </a:fld>
             <a:endParaRPr lang="en-US" dirty="0"/>
           </a:p>
@@ -12695,11 +12702,6 @@
               <a:rPr lang="en-US" sz="2200" dirty="0"/>
               <a:t>PyMC3</a:t>
             </a:r>
-          </a:p>
-          <a:p>
-            <a:pPr marL="0" indent="0">
-              <a:buNone/>
-            </a:pPr>
             <a:endParaRPr lang="en-US" sz="2400" dirty="0"/>
           </a:p>
           <a:p>
@@ -12740,6 +12742,16 @@
               <a:t>colab</a:t>
             </a:r>
             <a:endParaRPr lang="en-US" sz="2200" dirty="0"/>
+          </a:p>
+          <a:p>
+            <a:pPr>
+              <a:buFont typeface="Wingdings" panose="05000000000000000000" pitchFamily="2" charset="2"/>
+              <a:buChar char="v"/>
+            </a:pPr>
+            <a:r>
+              <a:rPr lang="en-US" sz="2400" dirty="0"/>
+              <a:t>Real-world use cases</a:t>
+            </a:r>
           </a:p>
         </p:txBody>
       </p:sp>
@@ -13094,7 +13106,7 @@
                                         <p:tgtEl>
                                           <p:spTgt spid="3">
                                             <p:txEl>
-                                              <p:pRg st="6" end="6"/>
+                                              <p:pRg st="5" end="5"/>
                                             </p:txEl>
                                           </p:spTgt>
                                         </p:tgtEl>
@@ -13112,7 +13124,7 @@
                                         <p:tgtEl>
                                           <p:spTgt spid="3">
                                             <p:txEl>
-                                              <p:pRg st="6" end="6"/>
+                                              <p:pRg st="5" end="5"/>
                                             </p:txEl>
                                           </p:spTgt>
                                         </p:tgtEl>
@@ -13155,7 +13167,7 @@
                                         <p:tgtEl>
                                           <p:spTgt spid="3">
                                             <p:txEl>
-                                              <p:pRg st="7" end="7"/>
+                                              <p:pRg st="6" end="6"/>
                                             </p:txEl>
                                           </p:spTgt>
                                         </p:tgtEl>
@@ -13173,7 +13185,7 @@
                                         <p:tgtEl>
                                           <p:spTgt spid="3">
                                             <p:txEl>
-                                              <p:pRg st="7" end="7"/>
+                                              <p:pRg st="6" end="6"/>
                                             </p:txEl>
                                           </p:spTgt>
                                         </p:tgtEl>
@@ -13216,7 +13228,7 @@
                                         <p:tgtEl>
                                           <p:spTgt spid="3">
                                             <p:txEl>
-                                              <p:pRg st="8" end="8"/>
+                                              <p:pRg st="7" end="7"/>
                                             </p:txEl>
                                           </p:spTgt>
                                         </p:tgtEl>
@@ -13231,6 +13243,67 @@
                                     <p:animEffect transition="in" filter="fade">
                                       <p:cBhvr>
                                         <p:cTn id="42" dur="500"/>
+                                        <p:tgtEl>
+                                          <p:spTgt spid="3">
+                                            <p:txEl>
+                                              <p:pRg st="7" end="7"/>
+                                            </p:txEl>
+                                          </p:spTgt>
+                                        </p:tgtEl>
+                                      </p:cBhvr>
+                                    </p:animEffect>
+                                  </p:childTnLst>
+                                </p:cTn>
+                              </p:par>
+                            </p:childTnLst>
+                          </p:cTn>
+                        </p:par>
+                      </p:childTnLst>
+                    </p:cTn>
+                  </p:par>
+                  <p:par>
+                    <p:cTn id="43" fill="hold">
+                      <p:stCondLst>
+                        <p:cond delay="indefinite"/>
+                      </p:stCondLst>
+                      <p:childTnLst>
+                        <p:par>
+                          <p:cTn id="44" fill="hold">
+                            <p:stCondLst>
+                              <p:cond delay="0"/>
+                            </p:stCondLst>
+                            <p:childTnLst>
+                              <p:par>
+                                <p:cTn id="45" presetID="10" presetClass="entr" presetSubtype="0" fill="hold" nodeType="clickEffect">
+                                  <p:stCondLst>
+                                    <p:cond delay="0"/>
+                                  </p:stCondLst>
+                                  <p:childTnLst>
+                                    <p:set>
+                                      <p:cBhvr>
+                                        <p:cTn id="46" dur="1" fill="hold">
+                                          <p:stCondLst>
+                                            <p:cond delay="0"/>
+                                          </p:stCondLst>
+                                        </p:cTn>
+                                        <p:tgtEl>
+                                          <p:spTgt spid="3">
+                                            <p:txEl>
+                                              <p:pRg st="8" end="8"/>
+                                            </p:txEl>
+                                          </p:spTgt>
+                                        </p:tgtEl>
+                                        <p:attrNameLst>
+                                          <p:attrName>style.visibility</p:attrName>
+                                        </p:attrNameLst>
+                                      </p:cBhvr>
+                                      <p:to>
+                                        <p:strVal val="visible"/>
+                                      </p:to>
+                                    </p:set>
+                                    <p:animEffect transition="in" filter="fade">
+                                      <p:cBhvr>
+                                        <p:cTn id="47" dur="500"/>
                                         <p:tgtEl>
                                           <p:spTgt spid="3">
                                             <p:txEl>
@@ -19476,6 +19549,107 @@
 </p:sld>
 </file>
 
+<file path=ppt/slides/slide29.xml><?xml version="1.0" encoding="utf-8"?>
+<p:sld xmlns:a="http://schemas.openxmlformats.org/drawingml/2006/main" xmlns:r="http://schemas.openxmlformats.org/officeDocument/2006/relationships" xmlns:p="http://schemas.openxmlformats.org/presentationml/2006/main">
+  <p:cSld>
+    <p:spTree>
+      <p:nvGrpSpPr>
+        <p:cNvPr id="1" name=""/>
+        <p:cNvGrpSpPr/>
+        <p:nvPr/>
+      </p:nvGrpSpPr>
+      <p:grpSpPr>
+        <a:xfrm>
+          <a:off x="0" y="0"/>
+          <a:ext cx="0" cy="0"/>
+          <a:chOff x="0" y="0"/>
+          <a:chExt cx="0" cy="0"/>
+        </a:xfrm>
+      </p:grpSpPr>
+      <p:sp>
+        <p:nvSpPr>
+          <p:cNvPr id="3" name="Content Placeholder 2">
+            <a:extLst>
+              <a:ext uri="{FF2B5EF4-FFF2-40B4-BE49-F238E27FC236}">
+                <a16:creationId xmlns:a16="http://schemas.microsoft.com/office/drawing/2014/main" id="{EF0F79F4-3051-6643-ACD9-C523D339290A}"/>
+              </a:ext>
+            </a:extLst>
+          </p:cNvPr>
+          <p:cNvSpPr>
+            <a:spLocks noGrp="1"/>
+          </p:cNvSpPr>
+          <p:nvPr>
+            <p:ph idx="1"/>
+          </p:nvPr>
+        </p:nvSpPr>
+        <p:spPr/>
+        <p:txBody>
+          <a:bodyPr>
+            <a:normAutofit/>
+          </a:bodyPr>
+          <a:lstStyle/>
+          <a:p>
+            <a:pPr lvl="1"/>
+            <a:r>
+              <a:rPr lang="en-US" sz="2400" dirty="0"/>
+              <a:t>Why should I write my own code for linear regression when I can just use a package?</a:t>
+            </a:r>
+          </a:p>
+          <a:p>
+            <a:pPr lvl="1"/>
+            <a:r>
+              <a:rPr lang="en-US" sz="2400" dirty="0"/>
+              <a:t>Same applies to other common models, e.g. time-series forecasting</a:t>
+            </a:r>
+          </a:p>
+        </p:txBody>
+      </p:sp>
+      <p:sp>
+        <p:nvSpPr>
+          <p:cNvPr id="4" name="Title 1">
+            <a:extLst>
+              <a:ext uri="{FF2B5EF4-FFF2-40B4-BE49-F238E27FC236}">
+                <a16:creationId xmlns:a16="http://schemas.microsoft.com/office/drawing/2014/main" id="{A406C298-D504-1D59-FB00-EDCAD48E3932}"/>
+              </a:ext>
+            </a:extLst>
+          </p:cNvPr>
+          <p:cNvSpPr>
+            <a:spLocks noGrp="1"/>
+          </p:cNvSpPr>
+          <p:nvPr>
+            <p:ph type="title"/>
+          </p:nvPr>
+        </p:nvSpPr>
+        <p:spPr>
+          <a:xfrm>
+            <a:off x="1097280" y="286603"/>
+            <a:ext cx="10058400" cy="1450757"/>
+          </a:xfrm>
+        </p:spPr>
+        <p:txBody>
+          <a:bodyPr/>
+          <a:lstStyle/>
+          <a:p>
+            <a:r>
+              <a:rPr lang="en-US" dirty="0"/>
+              <a:t>Real-World Use Cases</a:t>
+            </a:r>
+          </a:p>
+        </p:txBody>
+      </p:sp>
+    </p:spTree>
+    <p:extLst>
+      <p:ext uri="{BB962C8B-B14F-4D97-AF65-F5344CB8AC3E}">
+        <p14:creationId xmlns:p14="http://schemas.microsoft.com/office/powerpoint/2010/main" val="819303162"/>
+      </p:ext>
+    </p:extLst>
+  </p:cSld>
+  <p:clrMapOvr>
+    <a:masterClrMapping/>
+  </p:clrMapOvr>
+</p:sld>
+</file>
+
 <file path=ppt/slides/slide3.xml><?xml version="1.0" encoding="utf-8"?>
 <p:sld xmlns:a="http://schemas.openxmlformats.org/drawingml/2006/main" xmlns:r="http://schemas.openxmlformats.org/officeDocument/2006/relationships" xmlns:p="http://schemas.openxmlformats.org/presentationml/2006/main">
   <p:cSld>
@@ -19666,6 +19840,1303 @@
       </p:par>
     </p:tnLst>
   </p:timing>
+</p:sld>
+</file>
+
+<file path=ppt/slides/slide30.xml><?xml version="1.0" encoding="utf-8"?>
+<p:sld xmlns:a="http://schemas.openxmlformats.org/drawingml/2006/main" xmlns:r="http://schemas.openxmlformats.org/officeDocument/2006/relationships" xmlns:p="http://schemas.openxmlformats.org/presentationml/2006/main">
+  <p:cSld>
+    <p:spTree>
+      <p:nvGrpSpPr>
+        <p:cNvPr id="1" name=""/>
+        <p:cNvGrpSpPr/>
+        <p:nvPr/>
+      </p:nvGrpSpPr>
+      <p:grpSpPr>
+        <a:xfrm>
+          <a:off x="0" y="0"/>
+          <a:ext cx="0" cy="0"/>
+          <a:chOff x="0" y="0"/>
+          <a:chExt cx="0" cy="0"/>
+        </a:xfrm>
+      </p:grpSpPr>
+      <p:sp>
+        <p:nvSpPr>
+          <p:cNvPr id="2" name="Title 1">
+            <a:extLst>
+              <a:ext uri="{FF2B5EF4-FFF2-40B4-BE49-F238E27FC236}">
+                <a16:creationId xmlns:a16="http://schemas.microsoft.com/office/drawing/2014/main" id="{F3730634-F5F8-9A18-37E7-20D21E9EC376}"/>
+              </a:ext>
+            </a:extLst>
+          </p:cNvPr>
+          <p:cNvSpPr>
+            <a:spLocks noGrp="1"/>
+          </p:cNvSpPr>
+          <p:nvPr>
+            <p:ph type="title"/>
+          </p:nvPr>
+        </p:nvSpPr>
+        <p:spPr/>
+        <p:txBody>
+          <a:bodyPr/>
+          <a:lstStyle/>
+          <a:p>
+            <a:r>
+              <a:rPr lang="en-US" dirty="0"/>
+              <a:t>Real-World Use Cases</a:t>
+            </a:r>
+            <a:br>
+              <a:rPr lang="en-US" dirty="0"/>
+            </a:br>
+            <a:r>
+              <a:rPr lang="en-US" sz="4000" dirty="0"/>
+              <a:t>Linear Regression</a:t>
+            </a:r>
+            <a:endParaRPr lang="en-US" dirty="0"/>
+          </a:p>
+        </p:txBody>
+      </p:sp>
+      <p:sp>
+        <p:nvSpPr>
+          <p:cNvPr id="3" name="Content Placeholder 2">
+            <a:extLst>
+              <a:ext uri="{FF2B5EF4-FFF2-40B4-BE49-F238E27FC236}">
+                <a16:creationId xmlns:a16="http://schemas.microsoft.com/office/drawing/2014/main" id="{99C5B72F-9F20-5F4D-CF65-08DF841339EA}"/>
+              </a:ext>
+            </a:extLst>
+          </p:cNvPr>
+          <p:cNvSpPr>
+            <a:spLocks noGrp="1"/>
+          </p:cNvSpPr>
+          <p:nvPr>
+            <p:ph idx="1"/>
+          </p:nvPr>
+        </p:nvSpPr>
+        <p:spPr>
+          <a:xfrm>
+            <a:off x="3937544" y="2927605"/>
+            <a:ext cx="6738863" cy="2695545"/>
+          </a:xfrm>
+        </p:spPr>
+        <p:txBody>
+          <a:bodyPr>
+            <a:normAutofit/>
+          </a:bodyPr>
+          <a:lstStyle/>
+          <a:p>
+            <a:pPr lvl="1"/>
+            <a:r>
+              <a:rPr lang="en-US" sz="2400" dirty="0"/>
+              <a:t>We don’t have to write our own code for linear regression to use probabilistic models</a:t>
+            </a:r>
+          </a:p>
+          <a:p>
+            <a:pPr lvl="1"/>
+            <a:endParaRPr lang="en-US" sz="2000" dirty="0"/>
+          </a:p>
+        </p:txBody>
+      </p:sp>
+      <p:pic>
+        <p:nvPicPr>
+          <p:cNvPr id="1026" name="Picture 2" descr="Logo image">
+            <a:extLst>
+              <a:ext uri="{FF2B5EF4-FFF2-40B4-BE49-F238E27FC236}">
+                <a16:creationId xmlns:a16="http://schemas.microsoft.com/office/drawing/2014/main" id="{3B636708-4AE6-517A-9731-BFADDBFECEF1}"/>
+              </a:ext>
+            </a:extLst>
+          </p:cNvPr>
+          <p:cNvPicPr>
+            <a:picLocks noChangeAspect="1" noChangeArrowheads="1"/>
+          </p:cNvPicPr>
+          <p:nvPr/>
+        </p:nvPicPr>
+        <p:blipFill>
+          <a:blip r:embed="rId2">
+            <a:extLst>
+              <a:ext uri="{28A0092B-C50C-407E-A947-70E740481C1C}">
+                <a14:useLocalDpi xmlns:a14="http://schemas.microsoft.com/office/drawing/2010/main" val="0"/>
+              </a:ext>
+            </a:extLst>
+          </a:blip>
+          <a:srcRect/>
+          <a:stretch>
+            <a:fillRect/>
+          </a:stretch>
+        </p:blipFill>
+        <p:spPr bwMode="auto">
+          <a:xfrm>
+            <a:off x="1288257" y="2578895"/>
+            <a:ext cx="1800223" cy="900112"/>
+          </a:xfrm>
+          <a:prstGeom prst="rect">
+            <a:avLst/>
+          </a:prstGeom>
+          <a:noFill/>
+          <a:extLst>
+            <a:ext uri="{909E8E84-426E-40DD-AFC4-6F175D3DCCD1}">
+              <a14:hiddenFill xmlns:a14="http://schemas.microsoft.com/office/drawing/2010/main">
+                <a:solidFill>
+                  <a:srgbClr val="FFFFFF"/>
+                </a:solidFill>
+              </a14:hiddenFill>
+            </a:ext>
+          </a:extLst>
+        </p:spPr>
+      </p:pic>
+      <p:sp>
+        <p:nvSpPr>
+          <p:cNvPr id="5" name="TextBox 4">
+            <a:extLst>
+              <a:ext uri="{FF2B5EF4-FFF2-40B4-BE49-F238E27FC236}">
+                <a16:creationId xmlns:a16="http://schemas.microsoft.com/office/drawing/2014/main" id="{8D126D9B-339D-705F-0C6A-E8C71DDF0980}"/>
+              </a:ext>
+            </a:extLst>
+          </p:cNvPr>
+          <p:cNvSpPr txBox="1"/>
+          <p:nvPr/>
+        </p:nvSpPr>
+        <p:spPr>
+          <a:xfrm>
+            <a:off x="172965" y="6417589"/>
+            <a:ext cx="7526914" cy="369332"/>
+          </a:xfrm>
+          <a:prstGeom prst="rect">
+            <a:avLst/>
+          </a:prstGeom>
+          <a:noFill/>
+        </p:spPr>
+        <p:txBody>
+          <a:bodyPr wrap="square">
+            <a:spAutoFit/>
+          </a:bodyPr>
+          <a:lstStyle/>
+          <a:p>
+            <a:r>
+              <a:rPr lang="en-US" dirty="0">
+                <a:solidFill>
+                  <a:schemeClr val="bg1"/>
+                </a:solidFill>
+              </a:rPr>
+              <a:t>https://bambinos.github.io/bambi/main/notebooks/sleepstudy.html</a:t>
+            </a:r>
+          </a:p>
+        </p:txBody>
+      </p:sp>
+      <p:pic>
+        <p:nvPicPr>
+          <p:cNvPr id="1028" name="Picture 4">
+            <a:extLst>
+              <a:ext uri="{FF2B5EF4-FFF2-40B4-BE49-F238E27FC236}">
+                <a16:creationId xmlns:a16="http://schemas.microsoft.com/office/drawing/2014/main" id="{F73C9FBD-6D04-1096-67AF-E79ECA0C131D}"/>
+              </a:ext>
+            </a:extLst>
+          </p:cNvPr>
+          <p:cNvPicPr>
+            <a:picLocks noChangeAspect="1" noChangeArrowheads="1"/>
+          </p:cNvPicPr>
+          <p:nvPr/>
+        </p:nvPicPr>
+        <p:blipFill>
+          <a:blip r:embed="rId3">
+            <a:extLst>
+              <a:ext uri="{28A0092B-C50C-407E-A947-70E740481C1C}">
+                <a14:useLocalDpi xmlns:a14="http://schemas.microsoft.com/office/drawing/2010/main" val="0"/>
+              </a:ext>
+            </a:extLst>
+          </a:blip>
+          <a:srcRect/>
+          <a:stretch>
+            <a:fillRect/>
+          </a:stretch>
+        </p:blipFill>
+        <p:spPr bwMode="auto">
+          <a:xfrm>
+            <a:off x="3544410" y="2415276"/>
+            <a:ext cx="8168317" cy="3871442"/>
+          </a:xfrm>
+          <a:prstGeom prst="rect">
+            <a:avLst/>
+          </a:prstGeom>
+          <a:noFill/>
+          <a:extLst>
+            <a:ext uri="{909E8E84-426E-40DD-AFC4-6F175D3DCCD1}">
+              <a14:hiddenFill xmlns:a14="http://schemas.microsoft.com/office/drawing/2010/main">
+                <a:solidFill>
+                  <a:srgbClr val="FFFFFF"/>
+                </a:solidFill>
+              </a14:hiddenFill>
+            </a:ext>
+          </a:extLst>
+        </p:spPr>
+      </p:pic>
+      <p:pic>
+        <p:nvPicPr>
+          <p:cNvPr id="9" name="Picture 8">
+            <a:extLst>
+              <a:ext uri="{FF2B5EF4-FFF2-40B4-BE49-F238E27FC236}">
+                <a16:creationId xmlns:a16="http://schemas.microsoft.com/office/drawing/2014/main" id="{81780991-C8C6-5E40-2B95-FFC290433C06}"/>
+              </a:ext>
+            </a:extLst>
+          </p:cNvPr>
+          <p:cNvPicPr>
+            <a:picLocks noChangeAspect="1"/>
+          </p:cNvPicPr>
+          <p:nvPr/>
+        </p:nvPicPr>
+        <p:blipFill>
+          <a:blip r:embed="rId4"/>
+          <a:stretch>
+            <a:fillRect/>
+          </a:stretch>
+        </p:blipFill>
+        <p:spPr>
+          <a:xfrm>
+            <a:off x="4528578" y="1778973"/>
+            <a:ext cx="6147829" cy="380278"/>
+          </a:xfrm>
+          <a:prstGeom prst="rect">
+            <a:avLst/>
+          </a:prstGeom>
+        </p:spPr>
+      </p:pic>
+    </p:spTree>
+    <p:extLst>
+      <p:ext uri="{BB962C8B-B14F-4D97-AF65-F5344CB8AC3E}">
+        <p14:creationId xmlns:p14="http://schemas.microsoft.com/office/powerpoint/2010/main" val="429139397"/>
+      </p:ext>
+    </p:extLst>
+  </p:cSld>
+  <p:clrMapOvr>
+    <a:masterClrMapping/>
+  </p:clrMapOvr>
+</p:sld>
+</file>
+
+<file path=ppt/slides/slide31.xml><?xml version="1.0" encoding="utf-8"?>
+<p:sld xmlns:a="http://schemas.openxmlformats.org/drawingml/2006/main" xmlns:r="http://schemas.openxmlformats.org/officeDocument/2006/relationships" xmlns:p="http://schemas.openxmlformats.org/presentationml/2006/main">
+  <p:cSld>
+    <p:spTree>
+      <p:nvGrpSpPr>
+        <p:cNvPr id="1" name=""/>
+        <p:cNvGrpSpPr/>
+        <p:nvPr/>
+      </p:nvGrpSpPr>
+      <p:grpSpPr>
+        <a:xfrm>
+          <a:off x="0" y="0"/>
+          <a:ext cx="0" cy="0"/>
+          <a:chOff x="0" y="0"/>
+          <a:chExt cx="0" cy="0"/>
+        </a:xfrm>
+      </p:grpSpPr>
+      <p:sp>
+        <p:nvSpPr>
+          <p:cNvPr id="3" name="Content Placeholder 2">
+            <a:extLst>
+              <a:ext uri="{FF2B5EF4-FFF2-40B4-BE49-F238E27FC236}">
+                <a16:creationId xmlns:a16="http://schemas.microsoft.com/office/drawing/2014/main" id="{B3FD5328-6D7A-2308-C455-FE70BD9CEBB8}"/>
+              </a:ext>
+            </a:extLst>
+          </p:cNvPr>
+          <p:cNvSpPr>
+            <a:spLocks noGrp="1"/>
+          </p:cNvSpPr>
+          <p:nvPr>
+            <p:ph idx="1"/>
+          </p:nvPr>
+        </p:nvSpPr>
+        <p:spPr/>
+        <p:txBody>
+          <a:bodyPr/>
+          <a:lstStyle/>
+          <a:p>
+            <a:endParaRPr lang="en-US" dirty="0"/>
+          </a:p>
+        </p:txBody>
+      </p:sp>
+      <p:sp>
+        <p:nvSpPr>
+          <p:cNvPr id="4" name="Title 1">
+            <a:extLst>
+              <a:ext uri="{FF2B5EF4-FFF2-40B4-BE49-F238E27FC236}">
+                <a16:creationId xmlns:a16="http://schemas.microsoft.com/office/drawing/2014/main" id="{CE5265B1-B704-374B-C673-8C389ECB1575}"/>
+              </a:ext>
+            </a:extLst>
+          </p:cNvPr>
+          <p:cNvSpPr>
+            <a:spLocks noGrp="1"/>
+          </p:cNvSpPr>
+          <p:nvPr>
+            <p:ph type="title"/>
+          </p:nvPr>
+        </p:nvSpPr>
+        <p:spPr>
+          <a:xfrm>
+            <a:off x="1097280" y="286603"/>
+            <a:ext cx="10058400" cy="1450757"/>
+          </a:xfrm>
+        </p:spPr>
+        <p:txBody>
+          <a:bodyPr/>
+          <a:lstStyle/>
+          <a:p>
+            <a:r>
+              <a:rPr lang="en-US" dirty="0"/>
+              <a:t>Real-World Use Cases</a:t>
+            </a:r>
+            <a:br>
+              <a:rPr lang="en-US" dirty="0"/>
+            </a:br>
+            <a:r>
+              <a:rPr lang="en-US" sz="4000" dirty="0"/>
+              <a:t>Time Series Prediction</a:t>
+            </a:r>
+            <a:endParaRPr lang="en-US" dirty="0"/>
+          </a:p>
+        </p:txBody>
+      </p:sp>
+      <p:pic>
+        <p:nvPicPr>
+          <p:cNvPr id="5" name="Picture 4">
+            <a:extLst>
+              <a:ext uri="{FF2B5EF4-FFF2-40B4-BE49-F238E27FC236}">
+                <a16:creationId xmlns:a16="http://schemas.microsoft.com/office/drawing/2014/main" id="{B8D8D760-8368-6642-966B-45F1188441C6}"/>
+              </a:ext>
+            </a:extLst>
+          </p:cNvPr>
+          <p:cNvPicPr>
+            <a:picLocks noChangeAspect="1"/>
+          </p:cNvPicPr>
+          <p:nvPr/>
+        </p:nvPicPr>
+        <p:blipFill>
+          <a:blip r:embed="rId2"/>
+          <a:stretch>
+            <a:fillRect/>
+          </a:stretch>
+        </p:blipFill>
+        <p:spPr>
+          <a:xfrm>
+            <a:off x="657225" y="1901190"/>
+            <a:ext cx="2496953" cy="589788"/>
+          </a:xfrm>
+          <a:prstGeom prst="rect">
+            <a:avLst/>
+          </a:prstGeom>
+        </p:spPr>
+      </p:pic>
+      <p:pic>
+        <p:nvPicPr>
+          <p:cNvPr id="2052" name="Picture 4" descr="Model">
+            <a:extLst>
+              <a:ext uri="{FF2B5EF4-FFF2-40B4-BE49-F238E27FC236}">
+                <a16:creationId xmlns:a16="http://schemas.microsoft.com/office/drawing/2014/main" id="{6D3D2E1F-583F-AE6E-BE09-BB288C0073E2}"/>
+              </a:ext>
+            </a:extLst>
+          </p:cNvPr>
+          <p:cNvPicPr>
+            <a:picLocks noChangeAspect="1" noChangeArrowheads="1"/>
+          </p:cNvPicPr>
+          <p:nvPr/>
+        </p:nvPicPr>
+        <p:blipFill>
+          <a:blip r:embed="rId3">
+            <a:extLst>
+              <a:ext uri="{28A0092B-C50C-407E-A947-70E740481C1C}">
+                <a14:useLocalDpi xmlns:a14="http://schemas.microsoft.com/office/drawing/2010/main" val="0"/>
+              </a:ext>
+            </a:extLst>
+          </a:blip>
+          <a:srcRect/>
+          <a:stretch>
+            <a:fillRect/>
+          </a:stretch>
+        </p:blipFill>
+        <p:spPr bwMode="auto">
+          <a:xfrm>
+            <a:off x="3532797" y="2490978"/>
+            <a:ext cx="8386214" cy="4023360"/>
+          </a:xfrm>
+          <a:prstGeom prst="rect">
+            <a:avLst/>
+          </a:prstGeom>
+          <a:noFill/>
+          <a:extLst>
+            <a:ext uri="{909E8E84-426E-40DD-AFC4-6F175D3DCCD1}">
+              <a14:hiddenFill xmlns:a14="http://schemas.microsoft.com/office/drawing/2010/main">
+                <a:solidFill>
+                  <a:srgbClr val="FFFFFF"/>
+                </a:solidFill>
+              </a14:hiddenFill>
+            </a:ext>
+          </a:extLst>
+        </p:spPr>
+      </p:pic>
+      <p:sp>
+        <p:nvSpPr>
+          <p:cNvPr id="8" name="TextBox 7">
+            <a:extLst>
+              <a:ext uri="{FF2B5EF4-FFF2-40B4-BE49-F238E27FC236}">
+                <a16:creationId xmlns:a16="http://schemas.microsoft.com/office/drawing/2014/main" id="{9035F102-ABB2-1A25-EC11-9435EC2268C3}"/>
+              </a:ext>
+            </a:extLst>
+          </p:cNvPr>
+          <p:cNvSpPr txBox="1"/>
+          <p:nvPr/>
+        </p:nvSpPr>
+        <p:spPr>
+          <a:xfrm>
+            <a:off x="3773158" y="1737360"/>
+            <a:ext cx="7025777" cy="769441"/>
+          </a:xfrm>
+          <a:prstGeom prst="rect">
+            <a:avLst/>
+          </a:prstGeom>
+          <a:solidFill>
+            <a:schemeClr val="tx1"/>
+          </a:solidFill>
+        </p:spPr>
+        <p:txBody>
+          <a:bodyPr wrap="square">
+            <a:spAutoFit/>
+          </a:bodyPr>
+          <a:lstStyle/>
+          <a:p>
+            <a:r>
+              <a:rPr lang="en-US" sz="1100" dirty="0">
+                <a:solidFill>
+                  <a:schemeClr val="bg1"/>
+                </a:solidFill>
+              </a:rPr>
+              <a:t>m = </a:t>
+            </a:r>
+            <a:r>
+              <a:rPr lang="en-US" sz="1100" dirty="0" err="1">
+                <a:solidFill>
+                  <a:schemeClr val="bg1"/>
+                </a:solidFill>
+              </a:rPr>
+              <a:t>PMProphet</a:t>
+            </a:r>
+            <a:r>
+              <a:rPr lang="en-US" sz="1100" dirty="0">
+                <a:solidFill>
+                  <a:schemeClr val="bg1"/>
+                </a:solidFill>
+              </a:rPr>
+              <a:t>(</a:t>
+            </a:r>
+            <a:r>
+              <a:rPr lang="en-US" sz="1100" dirty="0" err="1">
+                <a:solidFill>
+                  <a:schemeClr val="bg1"/>
+                </a:solidFill>
+              </a:rPr>
+              <a:t>df</a:t>
+            </a:r>
+            <a:r>
+              <a:rPr lang="en-US" sz="1100" dirty="0">
+                <a:solidFill>
+                  <a:schemeClr val="bg1"/>
+                </a:solidFill>
+              </a:rPr>
+              <a:t>, growth=True, intercept=True, </a:t>
+            </a:r>
+            <a:r>
+              <a:rPr lang="en-US" sz="1100" dirty="0" err="1">
+                <a:solidFill>
+                  <a:schemeClr val="bg1"/>
+                </a:solidFill>
+              </a:rPr>
+              <a:t>n_changepoints</a:t>
+            </a:r>
+            <a:r>
+              <a:rPr lang="en-US" sz="1100" dirty="0">
+                <a:solidFill>
+                  <a:schemeClr val="bg1"/>
+                </a:solidFill>
+              </a:rPr>
+              <a:t>=25, </a:t>
+            </a:r>
+            <a:r>
+              <a:rPr lang="en-US" sz="1100" dirty="0" err="1">
+                <a:solidFill>
+                  <a:schemeClr val="bg1"/>
+                </a:solidFill>
+              </a:rPr>
+              <a:t>changepoints_prior_scale</a:t>
+            </a:r>
+            <a:r>
+              <a:rPr lang="en-US" sz="1100" dirty="0">
+                <a:solidFill>
+                  <a:schemeClr val="bg1"/>
+                </a:solidFill>
+              </a:rPr>
+              <a:t>=.01, name='model')</a:t>
+            </a:r>
+          </a:p>
+          <a:p>
+            <a:r>
+              <a:rPr lang="en-US" sz="1100" dirty="0" err="1">
+                <a:solidFill>
+                  <a:schemeClr val="bg1"/>
+                </a:solidFill>
+              </a:rPr>
+              <a:t>m.add_seasonality</a:t>
+            </a:r>
+            <a:r>
+              <a:rPr lang="en-US" sz="1100" dirty="0">
+                <a:solidFill>
+                  <a:schemeClr val="bg1"/>
+                </a:solidFill>
+              </a:rPr>
+              <a:t>(seasonality=30, </a:t>
+            </a:r>
+            <a:r>
+              <a:rPr lang="en-US" sz="1100" dirty="0" err="1">
+                <a:solidFill>
+                  <a:schemeClr val="bg1"/>
+                </a:solidFill>
+              </a:rPr>
+              <a:t>fourier_order</a:t>
+            </a:r>
+            <a:r>
+              <a:rPr lang="en-US" sz="1100" dirty="0">
+                <a:solidFill>
+                  <a:schemeClr val="bg1"/>
+                </a:solidFill>
+              </a:rPr>
+              <a:t>=3)</a:t>
+            </a:r>
+          </a:p>
+          <a:p>
+            <a:r>
+              <a:rPr lang="en-US" sz="1100" dirty="0" err="1">
+                <a:solidFill>
+                  <a:schemeClr val="bg1"/>
+                </a:solidFill>
+              </a:rPr>
+              <a:t>m.add_seasonality</a:t>
+            </a:r>
+            <a:r>
+              <a:rPr lang="en-US" sz="1100" dirty="0">
+                <a:solidFill>
+                  <a:schemeClr val="bg1"/>
+                </a:solidFill>
+              </a:rPr>
+              <a:t>(seasonality=7, </a:t>
+            </a:r>
+            <a:r>
+              <a:rPr lang="en-US" sz="1100" dirty="0" err="1">
+                <a:solidFill>
+                  <a:schemeClr val="bg1"/>
+                </a:solidFill>
+              </a:rPr>
+              <a:t>fourier_order</a:t>
+            </a:r>
+            <a:r>
+              <a:rPr lang="en-US" sz="1100" dirty="0">
+                <a:solidFill>
+                  <a:schemeClr val="bg1"/>
+                </a:solidFill>
+              </a:rPr>
+              <a:t>=3)</a:t>
+            </a:r>
+          </a:p>
+          <a:p>
+            <a:r>
+              <a:rPr lang="en-US" sz="1100" dirty="0" err="1">
+                <a:solidFill>
+                  <a:schemeClr val="bg1"/>
+                </a:solidFill>
+              </a:rPr>
+              <a:t>m.fit</a:t>
+            </a:r>
+            <a:r>
+              <a:rPr lang="en-US" sz="1100" dirty="0">
+                <a:solidFill>
+                  <a:schemeClr val="bg1"/>
+                </a:solidFill>
+              </a:rPr>
+              <a:t>(method=</a:t>
+            </a:r>
+            <a:r>
+              <a:rPr lang="en-US" sz="1100" dirty="0" err="1">
+                <a:solidFill>
+                  <a:schemeClr val="bg1"/>
+                </a:solidFill>
+              </a:rPr>
+              <a:t>Sampler.NUTS</a:t>
+            </a:r>
+            <a:r>
+              <a:rPr lang="en-US" sz="1100" dirty="0">
+                <a:solidFill>
+                  <a:schemeClr val="bg1"/>
+                </a:solidFill>
+              </a:rPr>
+              <a:t>)</a:t>
+            </a:r>
+          </a:p>
+        </p:txBody>
+      </p:sp>
+    </p:spTree>
+    <p:extLst>
+      <p:ext uri="{BB962C8B-B14F-4D97-AF65-F5344CB8AC3E}">
+        <p14:creationId xmlns:p14="http://schemas.microsoft.com/office/powerpoint/2010/main" val="4281930790"/>
+      </p:ext>
+    </p:extLst>
+  </p:cSld>
+  <p:clrMapOvr>
+    <a:masterClrMapping/>
+  </p:clrMapOvr>
+</p:sld>
+</file>
+
+<file path=ppt/slides/slide32.xml><?xml version="1.0" encoding="utf-8"?>
+<p:sld xmlns:a="http://schemas.openxmlformats.org/drawingml/2006/main" xmlns:r="http://schemas.openxmlformats.org/officeDocument/2006/relationships" xmlns:p="http://schemas.openxmlformats.org/presentationml/2006/main">
+  <p:cSld>
+    <p:spTree>
+      <p:nvGrpSpPr>
+        <p:cNvPr id="1" name=""/>
+        <p:cNvGrpSpPr/>
+        <p:nvPr/>
+      </p:nvGrpSpPr>
+      <p:grpSpPr>
+        <a:xfrm>
+          <a:off x="0" y="0"/>
+          <a:ext cx="0" cy="0"/>
+          <a:chOff x="0" y="0"/>
+          <a:chExt cx="0" cy="0"/>
+        </a:xfrm>
+      </p:grpSpPr>
+      <p:pic>
+        <p:nvPicPr>
+          <p:cNvPr id="5" name="Content Placeholder 4">
+            <a:extLst>
+              <a:ext uri="{FF2B5EF4-FFF2-40B4-BE49-F238E27FC236}">
+                <a16:creationId xmlns:a16="http://schemas.microsoft.com/office/drawing/2014/main" id="{9BFE31D1-364F-ED4B-A882-79D348C7B578}"/>
+              </a:ext>
+            </a:extLst>
+          </p:cNvPr>
+          <p:cNvPicPr>
+            <a:picLocks noGrp="1" noChangeAspect="1"/>
+          </p:cNvPicPr>
+          <p:nvPr>
+            <p:ph idx="1"/>
+          </p:nvPr>
+        </p:nvPicPr>
+        <p:blipFill>
+          <a:blip r:embed="rId2">
+            <a:extLst>
+              <a:ext uri="{28A0092B-C50C-407E-A947-70E740481C1C}">
+                <a14:useLocalDpi xmlns:a14="http://schemas.microsoft.com/office/drawing/2010/main" val="0"/>
+              </a:ext>
+            </a:extLst>
+          </a:blip>
+          <a:stretch>
+            <a:fillRect/>
+          </a:stretch>
+        </p:blipFill>
+        <p:spPr>
+          <a:xfrm>
+            <a:off x="557772" y="2068302"/>
+            <a:ext cx="5486411" cy="3657607"/>
+          </a:xfrm>
+        </p:spPr>
+      </p:pic>
+      <p:pic>
+        <p:nvPicPr>
+          <p:cNvPr id="7" name="Picture 6">
+            <a:extLst>
+              <a:ext uri="{FF2B5EF4-FFF2-40B4-BE49-F238E27FC236}">
+                <a16:creationId xmlns:a16="http://schemas.microsoft.com/office/drawing/2014/main" id="{AEEDFFF7-F140-D365-85A1-F22AED0135D6}"/>
+              </a:ext>
+            </a:extLst>
+          </p:cNvPr>
+          <p:cNvPicPr>
+            <a:picLocks noChangeAspect="1"/>
+          </p:cNvPicPr>
+          <p:nvPr/>
+        </p:nvPicPr>
+        <p:blipFill>
+          <a:blip r:embed="rId3">
+            <a:extLst>
+              <a:ext uri="{28A0092B-C50C-407E-A947-70E740481C1C}">
+                <a14:useLocalDpi xmlns:a14="http://schemas.microsoft.com/office/drawing/2010/main" val="0"/>
+              </a:ext>
+            </a:extLst>
+          </a:blip>
+          <a:stretch>
+            <a:fillRect/>
+          </a:stretch>
+        </p:blipFill>
+        <p:spPr>
+          <a:xfrm>
+            <a:off x="6096000" y="2068302"/>
+            <a:ext cx="5486411" cy="3657607"/>
+          </a:xfrm>
+          <a:prstGeom prst="rect">
+            <a:avLst/>
+          </a:prstGeom>
+        </p:spPr>
+      </p:pic>
+      <p:sp>
+        <p:nvSpPr>
+          <p:cNvPr id="10" name="Title 1">
+            <a:extLst>
+              <a:ext uri="{FF2B5EF4-FFF2-40B4-BE49-F238E27FC236}">
+                <a16:creationId xmlns:a16="http://schemas.microsoft.com/office/drawing/2014/main" id="{6A9E45F4-D62B-678C-54AE-CE051F26D8B8}"/>
+              </a:ext>
+            </a:extLst>
+          </p:cNvPr>
+          <p:cNvSpPr>
+            <a:spLocks noGrp="1"/>
+          </p:cNvSpPr>
+          <p:nvPr>
+            <p:ph type="title"/>
+          </p:nvPr>
+        </p:nvSpPr>
+        <p:spPr>
+          <a:xfrm>
+            <a:off x="1097280" y="286603"/>
+            <a:ext cx="10058400" cy="1450757"/>
+          </a:xfrm>
+        </p:spPr>
+        <p:txBody>
+          <a:bodyPr/>
+          <a:lstStyle/>
+          <a:p>
+            <a:r>
+              <a:rPr lang="en-US" dirty="0"/>
+              <a:t>Real-World Use Cases</a:t>
+            </a:r>
+            <a:br>
+              <a:rPr lang="en-US" dirty="0"/>
+            </a:br>
+            <a:r>
+              <a:rPr lang="en-US" sz="4000" dirty="0"/>
+              <a:t>Trial-Switch Changepoint</a:t>
+            </a:r>
+            <a:endParaRPr lang="en-US" dirty="0"/>
+          </a:p>
+        </p:txBody>
+      </p:sp>
+      <p:cxnSp>
+        <p:nvCxnSpPr>
+          <p:cNvPr id="13" name="Straight Connector 12">
+            <a:extLst>
+              <a:ext uri="{FF2B5EF4-FFF2-40B4-BE49-F238E27FC236}">
+                <a16:creationId xmlns:a16="http://schemas.microsoft.com/office/drawing/2014/main" id="{45176F75-0EFB-1C9C-5D64-65C72C561679}"/>
+              </a:ext>
+            </a:extLst>
+          </p:cNvPr>
+          <p:cNvCxnSpPr/>
+          <p:nvPr/>
+        </p:nvCxnSpPr>
+        <p:spPr>
+          <a:xfrm>
+            <a:off x="4687910" y="3581400"/>
+            <a:ext cx="0" cy="1042115"/>
+          </a:xfrm>
+          <a:prstGeom prst="line">
+            <a:avLst/>
+          </a:prstGeom>
+          <a:ln w="57150">
+            <a:solidFill>
+              <a:srgbClr val="F72E3D"/>
+            </a:solidFill>
+          </a:ln>
+        </p:spPr>
+        <p:style>
+          <a:lnRef idx="1">
+            <a:schemeClr val="accent1"/>
+          </a:lnRef>
+          <a:fillRef idx="0">
+            <a:schemeClr val="accent1"/>
+          </a:fillRef>
+          <a:effectRef idx="0">
+            <a:schemeClr val="accent1"/>
+          </a:effectRef>
+          <a:fontRef idx="minor">
+            <a:schemeClr val="tx1"/>
+          </a:fontRef>
+        </p:style>
+      </p:cxnSp>
+      <p:cxnSp>
+        <p:nvCxnSpPr>
+          <p:cNvPr id="15" name="Straight Connector 14">
+            <a:extLst>
+              <a:ext uri="{FF2B5EF4-FFF2-40B4-BE49-F238E27FC236}">
+                <a16:creationId xmlns:a16="http://schemas.microsoft.com/office/drawing/2014/main" id="{5D300890-81B3-3D94-B6EC-DC73C3EDBB4E}"/>
+              </a:ext>
+            </a:extLst>
+          </p:cNvPr>
+          <p:cNvCxnSpPr/>
+          <p:nvPr/>
+        </p:nvCxnSpPr>
+        <p:spPr>
+          <a:xfrm>
+            <a:off x="10249437" y="3581400"/>
+            <a:ext cx="0" cy="1042115"/>
+          </a:xfrm>
+          <a:prstGeom prst="line">
+            <a:avLst/>
+          </a:prstGeom>
+          <a:ln w="57150">
+            <a:solidFill>
+              <a:srgbClr val="F72E3D"/>
+            </a:solidFill>
+          </a:ln>
+        </p:spPr>
+        <p:style>
+          <a:lnRef idx="1">
+            <a:schemeClr val="accent1"/>
+          </a:lnRef>
+          <a:fillRef idx="0">
+            <a:schemeClr val="accent1"/>
+          </a:fillRef>
+          <a:effectRef idx="0">
+            <a:schemeClr val="accent1"/>
+          </a:effectRef>
+          <a:fontRef idx="minor">
+            <a:schemeClr val="tx1"/>
+          </a:fontRef>
+        </p:style>
+      </p:cxnSp>
+    </p:spTree>
+    <p:extLst>
+      <p:ext uri="{BB962C8B-B14F-4D97-AF65-F5344CB8AC3E}">
+        <p14:creationId xmlns:p14="http://schemas.microsoft.com/office/powerpoint/2010/main" val="671803563"/>
+      </p:ext>
+    </p:extLst>
+  </p:cSld>
+  <p:clrMapOvr>
+    <a:masterClrMapping/>
+  </p:clrMapOvr>
+  <p:timing>
+    <p:tnLst>
+      <p:par>
+        <p:cTn id="1" dur="indefinite" restart="never" nodeType="tmRoot">
+          <p:childTnLst>
+            <p:seq concurrent="1" nextAc="seek">
+              <p:cTn id="2" dur="indefinite" nodeType="mainSeq">
+                <p:childTnLst>
+                  <p:par>
+                    <p:cTn id="3" fill="hold">
+                      <p:stCondLst>
+                        <p:cond delay="indefinite"/>
+                      </p:stCondLst>
+                      <p:childTnLst>
+                        <p:par>
+                          <p:cTn id="4" fill="hold">
+                            <p:stCondLst>
+                              <p:cond delay="0"/>
+                            </p:stCondLst>
+                            <p:childTnLst>
+                              <p:par>
+                                <p:cTn id="5" presetID="10" presetClass="entr" presetSubtype="0" fill="hold" nodeType="clickEffect">
+                                  <p:stCondLst>
+                                    <p:cond delay="0"/>
+                                  </p:stCondLst>
+                                  <p:childTnLst>
+                                    <p:set>
+                                      <p:cBhvr>
+                                        <p:cTn id="6" dur="1" fill="hold">
+                                          <p:stCondLst>
+                                            <p:cond delay="0"/>
+                                          </p:stCondLst>
+                                        </p:cTn>
+                                        <p:tgtEl>
+                                          <p:spTgt spid="15"/>
+                                        </p:tgtEl>
+                                        <p:attrNameLst>
+                                          <p:attrName>style.visibility</p:attrName>
+                                        </p:attrNameLst>
+                                      </p:cBhvr>
+                                      <p:to>
+                                        <p:strVal val="visible"/>
+                                      </p:to>
+                                    </p:set>
+                                    <p:animEffect transition="in" filter="fade">
+                                      <p:cBhvr>
+                                        <p:cTn id="7" dur="500"/>
+                                        <p:tgtEl>
+                                          <p:spTgt spid="15"/>
+                                        </p:tgtEl>
+                                      </p:cBhvr>
+                                    </p:animEffect>
+                                  </p:childTnLst>
+                                </p:cTn>
+                              </p:par>
+                              <p:par>
+                                <p:cTn id="8" presetID="10" presetClass="entr" presetSubtype="0" fill="hold" nodeType="withEffect">
+                                  <p:stCondLst>
+                                    <p:cond delay="0"/>
+                                  </p:stCondLst>
+                                  <p:childTnLst>
+                                    <p:set>
+                                      <p:cBhvr>
+                                        <p:cTn id="9" dur="1" fill="hold">
+                                          <p:stCondLst>
+                                            <p:cond delay="0"/>
+                                          </p:stCondLst>
+                                        </p:cTn>
+                                        <p:tgtEl>
+                                          <p:spTgt spid="13"/>
+                                        </p:tgtEl>
+                                        <p:attrNameLst>
+                                          <p:attrName>style.visibility</p:attrName>
+                                        </p:attrNameLst>
+                                      </p:cBhvr>
+                                      <p:to>
+                                        <p:strVal val="visible"/>
+                                      </p:to>
+                                    </p:set>
+                                    <p:animEffect transition="in" filter="fade">
+                                      <p:cBhvr>
+                                        <p:cTn id="10" dur="500"/>
+                                        <p:tgtEl>
+                                          <p:spTgt spid="13"/>
+                                        </p:tgtEl>
+                                      </p:cBhvr>
+                                    </p:animEffect>
+                                  </p:childTnLst>
+                                </p:cTn>
+                              </p:par>
+                            </p:childTnLst>
+                          </p:cTn>
+                        </p:par>
+                      </p:childTnLst>
+                    </p:cTn>
+                  </p:par>
+                </p:childTnLst>
+              </p:cTn>
+              <p:prevCondLst>
+                <p:cond evt="onPrev" delay="0">
+                  <p:tgtEl>
+                    <p:sldTgt/>
+                  </p:tgtEl>
+                </p:cond>
+              </p:prevCondLst>
+              <p:nextCondLst>
+                <p:cond evt="onNext" delay="0">
+                  <p:tgtEl>
+                    <p:sldTgt/>
+                  </p:tgtEl>
+                </p:cond>
+              </p:nextCondLst>
+            </p:seq>
+          </p:childTnLst>
+        </p:cTn>
+      </p:par>
+    </p:tnLst>
+  </p:timing>
+</p:sld>
+</file>
+
+<file path=ppt/slides/slide33.xml><?xml version="1.0" encoding="utf-8"?>
+<p:sld xmlns:a="http://schemas.openxmlformats.org/drawingml/2006/main" xmlns:r="http://schemas.openxmlformats.org/officeDocument/2006/relationships" xmlns:p="http://schemas.openxmlformats.org/presentationml/2006/main">
+  <p:cSld>
+    <p:spTree>
+      <p:nvGrpSpPr>
+        <p:cNvPr id="1" name=""/>
+        <p:cNvGrpSpPr/>
+        <p:nvPr/>
+      </p:nvGrpSpPr>
+      <p:grpSpPr>
+        <a:xfrm>
+          <a:off x="0" y="0"/>
+          <a:ext cx="0" cy="0"/>
+          <a:chOff x="0" y="0"/>
+          <a:chExt cx="0" cy="0"/>
+        </a:xfrm>
+      </p:grpSpPr>
+      <p:pic>
+        <p:nvPicPr>
+          <p:cNvPr id="5" name="Content Placeholder 4" descr="Chart, histogram&#10;&#10;Description automatically generated">
+            <a:extLst>
+              <a:ext uri="{FF2B5EF4-FFF2-40B4-BE49-F238E27FC236}">
+                <a16:creationId xmlns:a16="http://schemas.microsoft.com/office/drawing/2014/main" id="{26AEC815-596B-4245-F04D-EEEAE1B1A9EF}"/>
+              </a:ext>
+            </a:extLst>
+          </p:cNvPr>
+          <p:cNvPicPr>
+            <a:picLocks noGrp="1" noChangeAspect="1"/>
+          </p:cNvPicPr>
+          <p:nvPr>
+            <p:ph idx="1"/>
+          </p:nvPr>
+        </p:nvPicPr>
+        <p:blipFill>
+          <a:blip r:embed="rId2">
+            <a:extLst>
+              <a:ext uri="{28A0092B-C50C-407E-A947-70E740481C1C}">
+                <a14:useLocalDpi xmlns:a14="http://schemas.microsoft.com/office/drawing/2010/main" val="0"/>
+              </a:ext>
+            </a:extLst>
+          </a:blip>
+          <a:stretch>
+            <a:fillRect/>
+          </a:stretch>
+        </p:blipFill>
+        <p:spPr>
+          <a:xfrm>
+            <a:off x="3383274" y="2247763"/>
+            <a:ext cx="5486411" cy="3657607"/>
+          </a:xfrm>
+        </p:spPr>
+      </p:pic>
+      <p:sp>
+        <p:nvSpPr>
+          <p:cNvPr id="6" name="Title 1">
+            <a:extLst>
+              <a:ext uri="{FF2B5EF4-FFF2-40B4-BE49-F238E27FC236}">
+                <a16:creationId xmlns:a16="http://schemas.microsoft.com/office/drawing/2014/main" id="{1EBCA094-559B-4C21-A29B-45C179CCD88F}"/>
+              </a:ext>
+            </a:extLst>
+          </p:cNvPr>
+          <p:cNvSpPr>
+            <a:spLocks noGrp="1"/>
+          </p:cNvSpPr>
+          <p:nvPr>
+            <p:ph type="title"/>
+          </p:nvPr>
+        </p:nvSpPr>
+        <p:spPr>
+          <a:xfrm>
+            <a:off x="1097280" y="286603"/>
+            <a:ext cx="10058400" cy="1450757"/>
+          </a:xfrm>
+        </p:spPr>
+        <p:txBody>
+          <a:bodyPr/>
+          <a:lstStyle/>
+          <a:p>
+            <a:r>
+              <a:rPr lang="en-US" dirty="0"/>
+              <a:t>Real-World Use Cases</a:t>
+            </a:r>
+            <a:br>
+              <a:rPr lang="en-US" dirty="0"/>
+            </a:br>
+            <a:r>
+              <a:rPr lang="en-US" sz="4000" dirty="0"/>
+              <a:t>Trial-Switch Changepoint</a:t>
+            </a:r>
+            <a:endParaRPr lang="en-US" dirty="0"/>
+          </a:p>
+        </p:txBody>
+      </p:sp>
+    </p:spTree>
+    <p:extLst>
+      <p:ext uri="{BB962C8B-B14F-4D97-AF65-F5344CB8AC3E}">
+        <p14:creationId xmlns:p14="http://schemas.microsoft.com/office/powerpoint/2010/main" val="1571364483"/>
+      </p:ext>
+    </p:extLst>
+  </p:cSld>
+  <p:clrMapOvr>
+    <a:masterClrMapping/>
+  </p:clrMapOvr>
+</p:sld>
+</file>
+
+<file path=ppt/slides/slide34.xml><?xml version="1.0" encoding="utf-8"?>
+<p:sld xmlns:a="http://schemas.openxmlformats.org/drawingml/2006/main" xmlns:r="http://schemas.openxmlformats.org/officeDocument/2006/relationships" xmlns:p="http://schemas.openxmlformats.org/presentationml/2006/main">
+  <p:cSld>
+    <p:spTree>
+      <p:nvGrpSpPr>
+        <p:cNvPr id="1" name=""/>
+        <p:cNvGrpSpPr/>
+        <p:nvPr/>
+      </p:nvGrpSpPr>
+      <p:grpSpPr>
+        <a:xfrm>
+          <a:off x="0" y="0"/>
+          <a:ext cx="0" cy="0"/>
+          <a:chOff x="0" y="0"/>
+          <a:chExt cx="0" cy="0"/>
+        </a:xfrm>
+      </p:grpSpPr>
+      <p:sp>
+        <p:nvSpPr>
+          <p:cNvPr id="4" name="Title 1">
+            <a:extLst>
+              <a:ext uri="{FF2B5EF4-FFF2-40B4-BE49-F238E27FC236}">
+                <a16:creationId xmlns:a16="http://schemas.microsoft.com/office/drawing/2014/main" id="{5825FB26-EECF-B630-7121-358FB6ACD68D}"/>
+              </a:ext>
+            </a:extLst>
+          </p:cNvPr>
+          <p:cNvSpPr>
+            <a:spLocks noGrp="1"/>
+          </p:cNvSpPr>
+          <p:nvPr>
+            <p:ph type="title"/>
+          </p:nvPr>
+        </p:nvSpPr>
+        <p:spPr>
+          <a:xfrm>
+            <a:off x="1097280" y="286603"/>
+            <a:ext cx="10058400" cy="1450757"/>
+          </a:xfrm>
+        </p:spPr>
+        <p:txBody>
+          <a:bodyPr/>
+          <a:lstStyle/>
+          <a:p>
+            <a:r>
+              <a:rPr lang="en-US" dirty="0"/>
+              <a:t>Real-World Use Cases</a:t>
+            </a:r>
+            <a:br>
+              <a:rPr lang="en-US" dirty="0"/>
+            </a:br>
+            <a:r>
+              <a:rPr lang="en-US" sz="4000" dirty="0"/>
+              <a:t>Trial-Switch Changepoint</a:t>
+            </a:r>
+            <a:endParaRPr lang="en-US" dirty="0"/>
+          </a:p>
+        </p:txBody>
+      </p:sp>
+      <p:pic>
+        <p:nvPicPr>
+          <p:cNvPr id="8" name="Picture 7" descr="Graphical user interface&#10;&#10;Description automatically generated">
+            <a:extLst>
+              <a:ext uri="{FF2B5EF4-FFF2-40B4-BE49-F238E27FC236}">
+                <a16:creationId xmlns:a16="http://schemas.microsoft.com/office/drawing/2014/main" id="{A20B532E-03AE-2C98-1736-1BFCE06C7F65}"/>
+              </a:ext>
+            </a:extLst>
+          </p:cNvPr>
+          <p:cNvPicPr>
+            <a:picLocks noChangeAspect="1"/>
+          </p:cNvPicPr>
+          <p:nvPr/>
+        </p:nvPicPr>
+        <p:blipFill rotWithShape="1">
+          <a:blip r:embed="rId2">
+            <a:extLst>
+              <a:ext uri="{28A0092B-C50C-407E-A947-70E740481C1C}">
+                <a14:useLocalDpi xmlns:a14="http://schemas.microsoft.com/office/drawing/2010/main" val="0"/>
+              </a:ext>
+            </a:extLst>
+          </a:blip>
+          <a:srcRect l="9000" t="7579" r="7598" b="6289"/>
+          <a:stretch/>
+        </p:blipFill>
+        <p:spPr>
+          <a:xfrm>
+            <a:off x="1391840" y="1556921"/>
+            <a:ext cx="9408319" cy="4858167"/>
+          </a:xfrm>
+          <a:prstGeom prst="rect">
+            <a:avLst/>
+          </a:prstGeom>
+        </p:spPr>
+      </p:pic>
+    </p:spTree>
+    <p:extLst>
+      <p:ext uri="{BB962C8B-B14F-4D97-AF65-F5344CB8AC3E}">
+        <p14:creationId xmlns:p14="http://schemas.microsoft.com/office/powerpoint/2010/main" val="328186273"/>
+      </p:ext>
+    </p:extLst>
+  </p:cSld>
+  <p:clrMapOvr>
+    <a:masterClrMapping/>
+  </p:clrMapOvr>
+</p:sld>
+</file>
+
+<file path=ppt/slides/slide35.xml><?xml version="1.0" encoding="utf-8"?>
+<p:sld xmlns:a="http://schemas.openxmlformats.org/drawingml/2006/main" xmlns:r="http://schemas.openxmlformats.org/officeDocument/2006/relationships" xmlns:p="http://schemas.openxmlformats.org/presentationml/2006/main">
+  <p:cSld>
+    <p:spTree>
+      <p:nvGrpSpPr>
+        <p:cNvPr id="1" name=""/>
+        <p:cNvGrpSpPr/>
+        <p:nvPr/>
+      </p:nvGrpSpPr>
+      <p:grpSpPr>
+        <a:xfrm>
+          <a:off x="0" y="0"/>
+          <a:ext cx="0" cy="0"/>
+          <a:chOff x="0" y="0"/>
+          <a:chExt cx="0" cy="0"/>
+        </a:xfrm>
+      </p:grpSpPr>
+      <p:sp>
+        <p:nvSpPr>
+          <p:cNvPr id="2" name="Title 1">
+            <a:extLst>
+              <a:ext uri="{FF2B5EF4-FFF2-40B4-BE49-F238E27FC236}">
+                <a16:creationId xmlns:a16="http://schemas.microsoft.com/office/drawing/2014/main" id="{407AB265-8A1D-9F14-BD96-03F3A26A2618}"/>
+              </a:ext>
+            </a:extLst>
+          </p:cNvPr>
+          <p:cNvSpPr>
+            <a:spLocks noGrp="1"/>
+          </p:cNvSpPr>
+          <p:nvPr>
+            <p:ph type="title"/>
+          </p:nvPr>
+        </p:nvSpPr>
+        <p:spPr/>
+        <p:txBody>
+          <a:bodyPr/>
+          <a:lstStyle/>
+          <a:p>
+            <a:r>
+              <a:rPr lang="en-US" dirty="0"/>
+              <a:t>Real-World Use Cases</a:t>
+            </a:r>
+          </a:p>
+        </p:txBody>
+      </p:sp>
+      <p:sp>
+        <p:nvSpPr>
+          <p:cNvPr id="3" name="Content Placeholder 2">
+            <a:extLst>
+              <a:ext uri="{FF2B5EF4-FFF2-40B4-BE49-F238E27FC236}">
+                <a16:creationId xmlns:a16="http://schemas.microsoft.com/office/drawing/2014/main" id="{00DE3C9C-8326-877A-6E55-6BF487B8B2DA}"/>
+              </a:ext>
+            </a:extLst>
+          </p:cNvPr>
+          <p:cNvSpPr>
+            <a:spLocks noGrp="1"/>
+          </p:cNvSpPr>
+          <p:nvPr>
+            <p:ph idx="1"/>
+          </p:nvPr>
+        </p:nvSpPr>
+        <p:spPr/>
+        <p:txBody>
+          <a:bodyPr>
+            <a:normAutofit/>
+          </a:bodyPr>
+          <a:lstStyle/>
+          <a:p>
+            <a:r>
+              <a:rPr lang="en-US" sz="2800" dirty="0"/>
+              <a:t>More examples at </a:t>
+            </a:r>
+          </a:p>
+          <a:p>
+            <a:r>
+              <a:rPr lang="en-US" sz="2800" dirty="0"/>
+              <a:t>https://www.pymc.io/projects/examples/en/latest/gallery.html</a:t>
+            </a:r>
+          </a:p>
+        </p:txBody>
+      </p:sp>
+    </p:spTree>
+    <p:extLst>
+      <p:ext uri="{BB962C8B-B14F-4D97-AF65-F5344CB8AC3E}">
+        <p14:creationId xmlns:p14="http://schemas.microsoft.com/office/powerpoint/2010/main" val="3355011781"/>
+      </p:ext>
+    </p:extLst>
+  </p:cSld>
+  <p:clrMapOvr>
+    <a:masterClrMapping/>
+  </p:clrMapOvr>
 </p:sld>
 </file>
 

</xml_diff>